<commit_message>
Ganeshan helped me to rectify some errors
</commit_message>
<xml_diff>
--- a/document/Presentation Password Generator.pptx
+++ b/document/Presentation Password Generator.pptx
@@ -8,17 +8,18 @@
     <p:sldId id="256" r:id="rId2"/>
     <p:sldId id="257" r:id="rId3"/>
     <p:sldId id="258" r:id="rId4"/>
-    <p:sldId id="259" r:id="rId5"/>
-    <p:sldId id="260" r:id="rId6"/>
-    <p:sldId id="261" r:id="rId7"/>
-    <p:sldId id="262" r:id="rId8"/>
-    <p:sldId id="263" r:id="rId9"/>
-    <p:sldId id="266" r:id="rId10"/>
-    <p:sldId id="264" r:id="rId11"/>
-    <p:sldId id="265" r:id="rId12"/>
-    <p:sldId id="267" r:id="rId13"/>
-    <p:sldId id="268" r:id="rId14"/>
-    <p:sldId id="269" r:id="rId15"/>
+    <p:sldId id="270" r:id="rId5"/>
+    <p:sldId id="259" r:id="rId6"/>
+    <p:sldId id="260" r:id="rId7"/>
+    <p:sldId id="261" r:id="rId8"/>
+    <p:sldId id="262" r:id="rId9"/>
+    <p:sldId id="263" r:id="rId10"/>
+    <p:sldId id="266" r:id="rId11"/>
+    <p:sldId id="264" r:id="rId12"/>
+    <p:sldId id="265" r:id="rId13"/>
+    <p:sldId id="267" r:id="rId14"/>
+    <p:sldId id="268" r:id="rId15"/>
+    <p:sldId id="269" r:id="rId16"/>
   </p:sldIdLst>
   <p:sldSz cx="12192000" cy="6858000"/>
   <p:notesSz cx="6858000" cy="9144000"/>
@@ -119,7 +120,18 @@
   </p:defaultTextStyle>
   <p:extLst>
     <p:ext uri="{EFAFB233-063F-42B5-8137-9DF3F51BA10A}">
-      <p15:sldGuideLst xmlns:p15="http://schemas.microsoft.com/office/powerpoint/2012/main" xmlns=""/>
+      <p15:sldGuideLst xmlns:p15="http://schemas.microsoft.com/office/powerpoint/2012/main">
+        <p15:guide id="1" orient="horz" pos="2160">
+          <p15:clr>
+            <a:srgbClr val="A4A3A4"/>
+          </p15:clr>
+        </p15:guide>
+        <p15:guide id="2" pos="3840">
+          <p15:clr>
+            <a:srgbClr val="A4A3A4"/>
+          </p15:clr>
+        </p15:guide>
+      </p15:sldGuideLst>
     </p:ext>
   </p:extLst>
 </p:presentation>
@@ -154,7 +166,7 @@
           <a:blip r:embed="rId2">
             <a:extLst>
               <a:ext uri="{28A0092B-C50C-407E-A947-70E740481C1C}">
-                <a14:useLocalDpi xmlns:a14="http://schemas.microsoft.com/office/drawing/2010/main" xmlns="" val="0"/>
+                <a14:useLocalDpi xmlns:a14="http://schemas.microsoft.com/office/drawing/2010/main" val="0"/>
               </a:ext>
             </a:extLst>
           </a:blip>
@@ -296,7 +308,7 @@
             <a:fld id="{F1FEB44C-43DA-42AA-B9E9-395B842E5567}" type="datetimeFigureOut">
               <a:rPr lang="en-NZ" smtClean="0"/>
               <a:pPr/>
-              <a:t>31/08/2022</a:t>
+              <a:t>7/09/2022</a:t>
             </a:fld>
             <a:endParaRPr lang="en-NZ"/>
           </a:p>
@@ -358,7 +370,7 @@
     </p:spTree>
     <p:extLst>
       <p:ext uri="{BB962C8B-B14F-4D97-AF65-F5344CB8AC3E}">
-        <p14:creationId xmlns:p14="http://schemas.microsoft.com/office/powerpoint/2010/main" xmlns="" val="3646990326"/>
+        <p14:creationId xmlns:p14="http://schemas.microsoft.com/office/powerpoint/2010/main" val="3646990326"/>
       </p:ext>
     </p:extLst>
   </p:cSld>
@@ -565,7 +577,7 @@
             <a:fld id="{F1FEB44C-43DA-42AA-B9E9-395B842E5567}" type="datetimeFigureOut">
               <a:rPr lang="en-NZ" smtClean="0"/>
               <a:pPr/>
-              <a:t>31/08/2022</a:t>
+              <a:t>7/09/2022</a:t>
             </a:fld>
             <a:endParaRPr lang="en-NZ"/>
           </a:p>
@@ -617,7 +629,7 @@
     </p:spTree>
     <p:extLst>
       <p:ext uri="{BB962C8B-B14F-4D97-AF65-F5344CB8AC3E}">
-        <p14:creationId xmlns:p14="http://schemas.microsoft.com/office/powerpoint/2010/main" xmlns="" val="71176386"/>
+        <p14:creationId xmlns:p14="http://schemas.microsoft.com/office/powerpoint/2010/main" val="71176386"/>
       </p:ext>
     </p:extLst>
   </p:cSld>
@@ -656,7 +668,7 @@
           <a:blip r:embed="rId2">
             <a:extLst>
               <a:ext uri="{28A0092B-C50C-407E-A947-70E740481C1C}">
-                <a14:useLocalDpi xmlns:a14="http://schemas.microsoft.com/office/drawing/2010/main" xmlns="" val="0"/>
+                <a14:useLocalDpi xmlns:a14="http://schemas.microsoft.com/office/drawing/2010/main" val="0"/>
               </a:ext>
             </a:extLst>
           </a:blip>
@@ -798,7 +810,7 @@
             <a:fld id="{F1FEB44C-43DA-42AA-B9E9-395B842E5567}" type="datetimeFigureOut">
               <a:rPr lang="en-NZ" smtClean="0"/>
               <a:pPr/>
-              <a:t>31/08/2022</a:t>
+              <a:t>7/09/2022</a:t>
             </a:fld>
             <a:endParaRPr lang="en-NZ"/>
           </a:p>
@@ -860,7 +872,7 @@
     </p:spTree>
     <p:extLst>
       <p:ext uri="{BB962C8B-B14F-4D97-AF65-F5344CB8AC3E}">
-        <p14:creationId xmlns:p14="http://schemas.microsoft.com/office/powerpoint/2010/main" xmlns="" val="1798571661"/>
+        <p14:creationId xmlns:p14="http://schemas.microsoft.com/office/powerpoint/2010/main" val="1798571661"/>
       </p:ext>
     </p:extLst>
   </p:cSld>
@@ -899,7 +911,7 @@
           <a:blip r:embed="rId2">
             <a:extLst>
               <a:ext uri="{28A0092B-C50C-407E-A947-70E740481C1C}">
-                <a14:useLocalDpi xmlns:a14="http://schemas.microsoft.com/office/drawing/2010/main" xmlns="" val="0"/>
+                <a14:useLocalDpi xmlns:a14="http://schemas.microsoft.com/office/drawing/2010/main" val="0"/>
               </a:ext>
             </a:extLst>
           </a:blip>
@@ -1110,7 +1122,7 @@
             <a:fld id="{F1FEB44C-43DA-42AA-B9E9-395B842E5567}" type="datetimeFigureOut">
               <a:rPr lang="en-NZ" smtClean="0"/>
               <a:pPr/>
-              <a:t>31/08/2022</a:t>
+              <a:t>7/09/2022</a:t>
             </a:fld>
             <a:endParaRPr lang="en-NZ"/>
           </a:p>
@@ -1404,7 +1416,7 @@
     </p:spTree>
     <p:extLst>
       <p:ext uri="{BB962C8B-B14F-4D97-AF65-F5344CB8AC3E}">
-        <p14:creationId xmlns:p14="http://schemas.microsoft.com/office/powerpoint/2010/main" xmlns="" val="2241860457"/>
+        <p14:creationId xmlns:p14="http://schemas.microsoft.com/office/powerpoint/2010/main" val="2241860457"/>
       </p:ext>
     </p:extLst>
   </p:cSld>
@@ -1443,7 +1455,7 @@
           <a:blip r:embed="rId2">
             <a:extLst>
               <a:ext uri="{28A0092B-C50C-407E-A947-70E740481C1C}">
-                <a14:useLocalDpi xmlns:a14="http://schemas.microsoft.com/office/drawing/2010/main" xmlns="" val="0"/>
+                <a14:useLocalDpi xmlns:a14="http://schemas.microsoft.com/office/drawing/2010/main" val="0"/>
               </a:ext>
             </a:extLst>
           </a:blip>
@@ -1585,7 +1597,7 @@
             <a:fld id="{F1FEB44C-43DA-42AA-B9E9-395B842E5567}" type="datetimeFigureOut">
               <a:rPr lang="en-NZ" smtClean="0"/>
               <a:pPr/>
-              <a:t>31/08/2022</a:t>
+              <a:t>7/09/2022</a:t>
             </a:fld>
             <a:endParaRPr lang="en-NZ"/>
           </a:p>
@@ -1647,7 +1659,7 @@
     </p:spTree>
     <p:extLst>
       <p:ext uri="{BB962C8B-B14F-4D97-AF65-F5344CB8AC3E}">
-        <p14:creationId xmlns:p14="http://schemas.microsoft.com/office/powerpoint/2010/main" xmlns="" val="3785431333"/>
+        <p14:creationId xmlns:p14="http://schemas.microsoft.com/office/powerpoint/2010/main" val="3785431333"/>
       </p:ext>
     </p:extLst>
   </p:cSld>
@@ -2134,7 +2146,7 @@
             <a:fld id="{F1FEB44C-43DA-42AA-B9E9-395B842E5567}" type="datetimeFigureOut">
               <a:rPr lang="en-NZ" smtClean="0"/>
               <a:pPr/>
-              <a:t>31/08/2022</a:t>
+              <a:t>7/09/2022</a:t>
             </a:fld>
             <a:endParaRPr lang="en-NZ"/>
           </a:p>
@@ -2186,7 +2198,7 @@
     </p:spTree>
     <p:extLst>
       <p:ext uri="{BB962C8B-B14F-4D97-AF65-F5344CB8AC3E}">
-        <p14:creationId xmlns:p14="http://schemas.microsoft.com/office/powerpoint/2010/main" xmlns="" val="3188093362"/>
+        <p14:creationId xmlns:p14="http://schemas.microsoft.com/office/powerpoint/2010/main" val="3188093362"/>
       </p:ext>
     </p:extLst>
   </p:cSld>
@@ -2910,7 +2922,7 @@
             <a:fld id="{F1FEB44C-43DA-42AA-B9E9-395B842E5567}" type="datetimeFigureOut">
               <a:rPr lang="en-NZ" smtClean="0"/>
               <a:pPr/>
-              <a:t>31/08/2022</a:t>
+              <a:t>7/09/2022</a:t>
             </a:fld>
             <a:endParaRPr lang="en-NZ"/>
           </a:p>
@@ -2962,7 +2974,7 @@
     </p:spTree>
     <p:extLst>
       <p:ext uri="{BB962C8B-B14F-4D97-AF65-F5344CB8AC3E}">
-        <p14:creationId xmlns:p14="http://schemas.microsoft.com/office/powerpoint/2010/main" xmlns="" val="1247721429"/>
+        <p14:creationId xmlns:p14="http://schemas.microsoft.com/office/powerpoint/2010/main" val="1247721429"/>
       </p:ext>
     </p:extLst>
   </p:cSld>
@@ -3087,7 +3099,7 @@
             <a:fld id="{F1FEB44C-43DA-42AA-B9E9-395B842E5567}" type="datetimeFigureOut">
               <a:rPr lang="en-NZ" smtClean="0"/>
               <a:pPr/>
-              <a:t>31/08/2022</a:t>
+              <a:t>7/09/2022</a:t>
             </a:fld>
             <a:endParaRPr lang="en-NZ"/>
           </a:p>
@@ -3139,7 +3151,7 @@
     </p:spTree>
     <p:extLst>
       <p:ext uri="{BB962C8B-B14F-4D97-AF65-F5344CB8AC3E}">
-        <p14:creationId xmlns:p14="http://schemas.microsoft.com/office/powerpoint/2010/main" xmlns="" val="1314504317"/>
+        <p14:creationId xmlns:p14="http://schemas.microsoft.com/office/powerpoint/2010/main" val="1314504317"/>
       </p:ext>
     </p:extLst>
   </p:cSld>
@@ -3178,7 +3190,7 @@
           <a:blip r:embed="rId2">
             <a:extLst>
               <a:ext uri="{28A0092B-C50C-407E-A947-70E740481C1C}">
-                <a14:useLocalDpi xmlns:a14="http://schemas.microsoft.com/office/drawing/2010/main" xmlns="" val="0"/>
+                <a14:useLocalDpi xmlns:a14="http://schemas.microsoft.com/office/drawing/2010/main" val="0"/>
               </a:ext>
             </a:extLst>
           </a:blip>
@@ -3312,7 +3324,7 @@
             <a:fld id="{F1FEB44C-43DA-42AA-B9E9-395B842E5567}" type="datetimeFigureOut">
               <a:rPr lang="en-NZ" smtClean="0"/>
               <a:pPr/>
-              <a:t>31/08/2022</a:t>
+              <a:t>7/09/2022</a:t>
             </a:fld>
             <a:endParaRPr lang="en-NZ"/>
           </a:p>
@@ -3374,7 +3386,7 @@
     </p:spTree>
     <p:extLst>
       <p:ext uri="{BB962C8B-B14F-4D97-AF65-F5344CB8AC3E}">
-        <p14:creationId xmlns:p14="http://schemas.microsoft.com/office/powerpoint/2010/main" xmlns="" val="3268017753"/>
+        <p14:creationId xmlns:p14="http://schemas.microsoft.com/office/powerpoint/2010/main" val="3268017753"/>
       </p:ext>
     </p:extLst>
   </p:cSld>
@@ -3494,7 +3506,7 @@
             <a:fld id="{F1FEB44C-43DA-42AA-B9E9-395B842E5567}" type="datetimeFigureOut">
               <a:rPr lang="en-NZ" smtClean="0"/>
               <a:pPr/>
-              <a:t>31/08/2022</a:t>
+              <a:t>7/09/2022</a:t>
             </a:fld>
             <a:endParaRPr lang="en-NZ"/>
           </a:p>
@@ -3546,7 +3558,7 @@
     </p:spTree>
     <p:extLst>
       <p:ext uri="{BB962C8B-B14F-4D97-AF65-F5344CB8AC3E}">
-        <p14:creationId xmlns:p14="http://schemas.microsoft.com/office/powerpoint/2010/main" xmlns="" val="900410543"/>
+        <p14:creationId xmlns:p14="http://schemas.microsoft.com/office/powerpoint/2010/main" val="900410543"/>
       </p:ext>
     </p:extLst>
   </p:cSld>
@@ -3585,7 +3597,7 @@
           <a:blip r:embed="rId2">
             <a:extLst>
               <a:ext uri="{28A0092B-C50C-407E-A947-70E740481C1C}">
-                <a14:useLocalDpi xmlns:a14="http://schemas.microsoft.com/office/drawing/2010/main" xmlns="" val="0"/>
+                <a14:useLocalDpi xmlns:a14="http://schemas.microsoft.com/office/drawing/2010/main" val="0"/>
               </a:ext>
             </a:extLst>
           </a:blip>
@@ -3785,7 +3797,7 @@
             <a:fld id="{F1FEB44C-43DA-42AA-B9E9-395B842E5567}" type="datetimeFigureOut">
               <a:rPr lang="en-NZ" smtClean="0"/>
               <a:pPr/>
-              <a:t>31/08/2022</a:t>
+              <a:t>7/09/2022</a:t>
             </a:fld>
             <a:endParaRPr lang="en-NZ"/>
           </a:p>
@@ -3847,7 +3859,7 @@
     </p:spTree>
     <p:extLst>
       <p:ext uri="{BB962C8B-B14F-4D97-AF65-F5344CB8AC3E}">
-        <p14:creationId xmlns:p14="http://schemas.microsoft.com/office/powerpoint/2010/main" xmlns="" val="2811421413"/>
+        <p14:creationId xmlns:p14="http://schemas.microsoft.com/office/powerpoint/2010/main" val="2811421413"/>
       </p:ext>
     </p:extLst>
   </p:cSld>
@@ -4029,7 +4041,7 @@
             <a:fld id="{F1FEB44C-43DA-42AA-B9E9-395B842E5567}" type="datetimeFigureOut">
               <a:rPr lang="en-NZ" smtClean="0"/>
               <a:pPr/>
-              <a:t>31/08/2022</a:t>
+              <a:t>7/09/2022</a:t>
             </a:fld>
             <a:endParaRPr lang="en-NZ"/>
           </a:p>
@@ -4081,7 +4093,7 @@
     </p:spTree>
     <p:extLst>
       <p:ext uri="{BB962C8B-B14F-4D97-AF65-F5344CB8AC3E}">
-        <p14:creationId xmlns:p14="http://schemas.microsoft.com/office/powerpoint/2010/main" xmlns="" val="2818974999"/>
+        <p14:creationId xmlns:p14="http://schemas.microsoft.com/office/powerpoint/2010/main" val="2818974999"/>
       </p:ext>
     </p:extLst>
   </p:cSld>
@@ -4410,7 +4422,7 @@
             <a:fld id="{F1FEB44C-43DA-42AA-B9E9-395B842E5567}" type="datetimeFigureOut">
               <a:rPr lang="en-NZ" smtClean="0"/>
               <a:pPr/>
-              <a:t>31/08/2022</a:t>
+              <a:t>7/09/2022</a:t>
             </a:fld>
             <a:endParaRPr lang="en-NZ"/>
           </a:p>
@@ -4462,7 +4474,7 @@
     </p:spTree>
     <p:extLst>
       <p:ext uri="{BB962C8B-B14F-4D97-AF65-F5344CB8AC3E}">
-        <p14:creationId xmlns:p14="http://schemas.microsoft.com/office/powerpoint/2010/main" xmlns="" val="3602584676"/>
+        <p14:creationId xmlns:p14="http://schemas.microsoft.com/office/powerpoint/2010/main" val="3602584676"/>
       </p:ext>
     </p:extLst>
   </p:cSld>
@@ -4530,7 +4542,7 @@
             <a:fld id="{F1FEB44C-43DA-42AA-B9E9-395B842E5567}" type="datetimeFigureOut">
               <a:rPr lang="en-NZ" smtClean="0"/>
               <a:pPr/>
-              <a:t>31/08/2022</a:t>
+              <a:t>7/09/2022</a:t>
             </a:fld>
             <a:endParaRPr lang="en-NZ"/>
           </a:p>
@@ -4582,7 +4594,7 @@
     </p:spTree>
     <p:extLst>
       <p:ext uri="{BB962C8B-B14F-4D97-AF65-F5344CB8AC3E}">
-        <p14:creationId xmlns:p14="http://schemas.microsoft.com/office/powerpoint/2010/main" xmlns="" val="3525800094"/>
+        <p14:creationId xmlns:p14="http://schemas.microsoft.com/office/powerpoint/2010/main" val="3525800094"/>
       </p:ext>
     </p:extLst>
   </p:cSld>
@@ -4627,7 +4639,7 @@
             <a:fld id="{F1FEB44C-43DA-42AA-B9E9-395B842E5567}" type="datetimeFigureOut">
               <a:rPr lang="en-NZ" smtClean="0"/>
               <a:pPr/>
-              <a:t>31/08/2022</a:t>
+              <a:t>7/09/2022</a:t>
             </a:fld>
             <a:endParaRPr lang="en-NZ"/>
           </a:p>
@@ -4679,7 +4691,7 @@
     </p:spTree>
     <p:extLst>
       <p:ext uri="{BB962C8B-B14F-4D97-AF65-F5344CB8AC3E}">
-        <p14:creationId xmlns:p14="http://schemas.microsoft.com/office/powerpoint/2010/main" xmlns="" val="900002222"/>
+        <p14:creationId xmlns:p14="http://schemas.microsoft.com/office/powerpoint/2010/main" val="900002222"/>
       </p:ext>
     </p:extLst>
   </p:cSld>
@@ -4878,7 +4890,7 @@
             <a:fld id="{F1FEB44C-43DA-42AA-B9E9-395B842E5567}" type="datetimeFigureOut">
               <a:rPr lang="en-NZ" smtClean="0"/>
               <a:pPr/>
-              <a:t>31/08/2022</a:t>
+              <a:t>7/09/2022</a:t>
             </a:fld>
             <a:endParaRPr lang="en-NZ"/>
           </a:p>
@@ -4930,7 +4942,7 @@
     </p:spTree>
     <p:extLst>
       <p:ext uri="{BB962C8B-B14F-4D97-AF65-F5344CB8AC3E}">
-        <p14:creationId xmlns:p14="http://schemas.microsoft.com/office/powerpoint/2010/main" xmlns="" val="1979681908"/>
+        <p14:creationId xmlns:p14="http://schemas.microsoft.com/office/powerpoint/2010/main" val="1979681908"/>
       </p:ext>
     </p:extLst>
   </p:cSld>
@@ -5137,7 +5149,7 @@
             <a:fld id="{F1FEB44C-43DA-42AA-B9E9-395B842E5567}" type="datetimeFigureOut">
               <a:rPr lang="en-NZ" smtClean="0"/>
               <a:pPr/>
-              <a:t>31/08/2022</a:t>
+              <a:t>7/09/2022</a:t>
             </a:fld>
             <a:endParaRPr lang="en-NZ"/>
           </a:p>
@@ -5189,7 +5201,7 @@
     </p:spTree>
     <p:extLst>
       <p:ext uri="{BB962C8B-B14F-4D97-AF65-F5344CB8AC3E}">
-        <p14:creationId xmlns:p14="http://schemas.microsoft.com/office/powerpoint/2010/main" xmlns="" val="3490336120"/>
+        <p14:creationId xmlns:p14="http://schemas.microsoft.com/office/powerpoint/2010/main" val="3490336120"/>
       </p:ext>
     </p:extLst>
   </p:cSld>
@@ -5233,7 +5245,7 @@
           <a:blip r:embed="rId19">
             <a:extLst>
               <a:ext uri="{28A0092B-C50C-407E-A947-70E740481C1C}">
-                <a14:useLocalDpi xmlns:a14="http://schemas.microsoft.com/office/drawing/2010/main" xmlns="" val="0"/>
+                <a14:useLocalDpi xmlns:a14="http://schemas.microsoft.com/office/drawing/2010/main" val="0"/>
               </a:ext>
             </a:extLst>
           </a:blip>
@@ -5382,7 +5394,7 @@
             <a:fld id="{F1FEB44C-43DA-42AA-B9E9-395B842E5567}" type="datetimeFigureOut">
               <a:rPr lang="en-NZ" smtClean="0"/>
               <a:pPr/>
-              <a:t>31/08/2022</a:t>
+              <a:t>7/09/2022</a:t>
             </a:fld>
             <a:endParaRPr lang="en-NZ"/>
           </a:p>
@@ -5470,7 +5482,7 @@
     </p:spTree>
     <p:extLst>
       <p:ext uri="{BB962C8B-B14F-4D97-AF65-F5344CB8AC3E}">
-        <p14:creationId xmlns:p14="http://schemas.microsoft.com/office/powerpoint/2010/main" xmlns="" val="475220722"/>
+        <p14:creationId xmlns:p14="http://schemas.microsoft.com/office/powerpoint/2010/main" val="475220722"/>
       </p:ext>
     </p:extLst>
   </p:cSld>
@@ -5799,7 +5811,7 @@
           <p:cNvPr id="2" name="标题 1">
             <a:extLst>
               <a:ext uri="{FF2B5EF4-FFF2-40B4-BE49-F238E27FC236}">
-                <a16:creationId xmlns:a16="http://schemas.microsoft.com/office/drawing/2014/main" xmlns="" id="{9378BB5D-5C77-1E3D-912F-AA79F30B85B4}"/>
+                <a16:creationId xmlns:a16="http://schemas.microsoft.com/office/drawing/2014/main" id="{9378BB5D-5C77-1E3D-912F-AA79F30B85B4}"/>
               </a:ext>
             </a:extLst>
           </p:cNvPr>
@@ -5830,7 +5842,7 @@
           <p:cNvPr id="3" name="副标题 2">
             <a:extLst>
               <a:ext uri="{FF2B5EF4-FFF2-40B4-BE49-F238E27FC236}">
-                <a16:creationId xmlns:a16="http://schemas.microsoft.com/office/drawing/2014/main" xmlns="" id="{BE25738F-A275-37A7-AD92-00E90E767875}"/>
+                <a16:creationId xmlns:a16="http://schemas.microsoft.com/office/drawing/2014/main" id="{BE25738F-A275-37A7-AD92-00E90E767875}"/>
               </a:ext>
             </a:extLst>
           </p:cNvPr>
@@ -5859,8 +5871,19 @@
                 <a:latin typeface="Times New Roman" panose="02020603050405020304" pitchFamily="18" charset="0"/>
                 <a:cs typeface="Times New Roman" panose="02020603050405020304" pitchFamily="18" charset="0"/>
               </a:rPr>
-              <a:t>Maribeth</a:t>
-            </a:r>
+              <a:t>Maribeth </a:t>
+            </a:r>
+            <a:r>
+              <a:rPr lang="en-NZ" sz="3200" dirty="0" err="1">
+                <a:latin typeface="Times New Roman" panose="02020603050405020304" pitchFamily="18" charset="0"/>
+                <a:cs typeface="Times New Roman" panose="02020603050405020304" pitchFamily="18" charset="0"/>
+              </a:rPr>
+              <a:t>Estimos</a:t>
+            </a:r>
+            <a:endParaRPr lang="en-NZ" sz="3200" dirty="0">
+              <a:latin typeface="Times New Roman" panose="02020603050405020304" pitchFamily="18" charset="0"/>
+              <a:cs typeface="Times New Roman" panose="02020603050405020304" pitchFamily="18" charset="0"/>
+            </a:endParaRPr>
           </a:p>
           <a:p>
             <a:r>
@@ -5868,16 +5891,23 @@
                 <a:latin typeface="Times New Roman" panose="02020603050405020304" pitchFamily="18" charset="0"/>
                 <a:cs typeface="Times New Roman" panose="02020603050405020304" pitchFamily="18" charset="0"/>
               </a:rPr>
-              <a:t>Richard</a:t>
-            </a:r>
-          </a:p>
-          <a:p>
+              <a:t>Xian (Richard) Zhang</a:t>
+            </a:r>
+          </a:p>
+          <a:p>
+            <a:r>
+              <a:rPr lang="en-NZ" sz="3200" dirty="0" err="1">
+                <a:latin typeface="Times New Roman" panose="02020603050405020304" pitchFamily="18" charset="0"/>
+                <a:cs typeface="Times New Roman" panose="02020603050405020304" pitchFamily="18" charset="0"/>
+              </a:rPr>
+              <a:t>Zhengwen</a:t>
+            </a:r>
             <a:r>
               <a:rPr lang="en-NZ" sz="3200" dirty="0">
                 <a:latin typeface="Times New Roman" panose="02020603050405020304" pitchFamily="18" charset="0"/>
                 <a:cs typeface="Times New Roman" panose="02020603050405020304" pitchFamily="18" charset="0"/>
               </a:rPr>
-              <a:t>Steven</a:t>
+              <a:t> (Steven) Lei</a:t>
             </a:r>
           </a:p>
         </p:txBody>
@@ -5885,7 +5915,7 @@
     </p:spTree>
     <p:extLst>
       <p:ext uri="{BB962C8B-B14F-4D97-AF65-F5344CB8AC3E}">
-        <p14:creationId xmlns:p14="http://schemas.microsoft.com/office/powerpoint/2010/main" xmlns="" val="467902368"/>
+        <p14:creationId xmlns:p14="http://schemas.microsoft.com/office/powerpoint/2010/main" val="467902368"/>
       </p:ext>
     </p:extLst>
   </p:cSld>
@@ -5917,7 +5947,7 @@
           <p:cNvPr id="2" name="标题 1">
             <a:extLst>
               <a:ext uri="{FF2B5EF4-FFF2-40B4-BE49-F238E27FC236}">
-                <a16:creationId xmlns:a16="http://schemas.microsoft.com/office/drawing/2014/main" xmlns="" id="{B26EBC45-122C-5FE6-01A0-0B6F24E25785}"/>
+                <a16:creationId xmlns:a16="http://schemas.microsoft.com/office/drawing/2014/main" id="{594441FE-9332-F0E4-7AE1-3123F39EBF02}"/>
               </a:ext>
             </a:extLst>
           </p:cNvPr>
@@ -5935,50 +5965,333 @@
           <a:p>
             <a:r>
               <a:rPr lang="en-NZ" dirty="0"/>
-              <a:t>TEAM WORK</a:t>
-            </a:r>
-          </a:p>
-        </p:txBody>
-      </p:sp>
-      <p:pic>
-        <p:nvPicPr>
-          <p:cNvPr id="5" name="内容占位符 4">
+              <a:t>methodology</a:t>
+            </a:r>
+          </a:p>
+        </p:txBody>
+      </p:sp>
+      <p:sp>
+        <p:nvSpPr>
+          <p:cNvPr id="3" name="内容占位符 2">
             <a:extLst>
               <a:ext uri="{FF2B5EF4-FFF2-40B4-BE49-F238E27FC236}">
-                <a16:creationId xmlns:a16="http://schemas.microsoft.com/office/drawing/2014/main" xmlns="" id="{B34579D3-B1D0-FFDD-242D-00F815568178}"/>
+                <a16:creationId xmlns:a16="http://schemas.microsoft.com/office/drawing/2014/main" id="{C1BFAA36-BAFA-2A56-98AB-CC6300CECA0C}"/>
               </a:ext>
             </a:extLst>
           </p:cNvPr>
-          <p:cNvPicPr>
-            <a:picLocks noGrp="1" noChangeAspect="1"/>
-          </p:cNvPicPr>
+          <p:cNvSpPr>
+            <a:spLocks noGrp="1"/>
+          </p:cNvSpPr>
           <p:nvPr>
             <p:ph idx="1"/>
           </p:nvPr>
-        </p:nvPicPr>
-        <p:blipFill>
-          <a:blip r:embed="rId2">
+        </p:nvSpPr>
+        <p:spPr>
+          <a:xfrm>
+            <a:off x="704851" y="2232542"/>
+            <a:ext cx="5410200" cy="3082290"/>
+          </a:xfrm>
+        </p:spPr>
+        <p:txBody>
+          <a:bodyPr>
+            <a:normAutofit/>
+          </a:bodyPr>
+          <a:lstStyle/>
+          <a:p>
+            <a:r>
+              <a:rPr lang="en-NZ" sz="2800" dirty="0">
+                <a:effectLst/>
+                <a:latin typeface="Times New Roman" panose="02020603050405020304" pitchFamily="18" charset="0"/>
+                <a:cs typeface="Times New Roman" panose="02020603050405020304" pitchFamily="18" charset="0"/>
+              </a:rPr>
+              <a:t>4 reasons for  using waterfall methodology </a:t>
+            </a:r>
+          </a:p>
+          <a:p>
+            <a:pPr lvl="1"/>
+            <a:r>
+              <a:rPr lang="en-NZ" sz="2800" dirty="0">
+                <a:effectLst/>
+                <a:latin typeface="Times New Roman" panose="02020603050405020304" pitchFamily="18" charset="0"/>
+                <a:cs typeface="Times New Roman" panose="02020603050405020304" pitchFamily="18" charset="0"/>
+              </a:rPr>
+              <a:t>The requirements are clear. </a:t>
+            </a:r>
+          </a:p>
+          <a:p>
+            <a:pPr lvl="1"/>
+            <a:r>
+              <a:rPr lang="en-US" altLang="zh-CN" sz="2800" dirty="0">
+                <a:effectLst/>
+                <a:latin typeface="Times New Roman" panose="02020603050405020304" pitchFamily="18" charset="0"/>
+                <a:cs typeface="Times New Roman" panose="02020603050405020304" pitchFamily="18" charset="0"/>
+              </a:rPr>
+              <a:t>Relatively </a:t>
+            </a:r>
+            <a:r>
+              <a:rPr lang="en-NZ" sz="2800" dirty="0">
+                <a:effectLst/>
+                <a:latin typeface="Times New Roman" panose="02020603050405020304" pitchFamily="18" charset="0"/>
+                <a:cs typeface="Times New Roman" panose="02020603050405020304" pitchFamily="18" charset="0"/>
+              </a:rPr>
+              <a:t>simple system. </a:t>
+            </a:r>
+          </a:p>
+          <a:p>
+            <a:pPr lvl="1"/>
+            <a:r>
+              <a:rPr lang="en-NZ" sz="2800" dirty="0">
+                <a:effectLst/>
+                <a:latin typeface="Times New Roman" panose="02020603050405020304" pitchFamily="18" charset="0"/>
+                <a:cs typeface="Times New Roman" panose="02020603050405020304" pitchFamily="18" charset="0"/>
+              </a:rPr>
+              <a:t>Only used in certain circumstances </a:t>
+            </a:r>
+          </a:p>
+          <a:p>
+            <a:pPr lvl="1"/>
+            <a:r>
+              <a:rPr lang="en-US" altLang="zh-CN" sz="2800" dirty="0">
+                <a:effectLst/>
+                <a:latin typeface="Times New Roman" panose="02020603050405020304" pitchFamily="18" charset="0"/>
+                <a:cs typeface="Times New Roman" panose="02020603050405020304" pitchFamily="18" charset="0"/>
+              </a:rPr>
+              <a:t>U</a:t>
+            </a:r>
+            <a:r>
+              <a:rPr lang="en-NZ" sz="2800" dirty="0" err="1">
+                <a:effectLst/>
+                <a:latin typeface="Times New Roman" panose="02020603050405020304" pitchFamily="18" charset="0"/>
+                <a:cs typeface="Times New Roman" panose="02020603050405020304" pitchFamily="18" charset="0"/>
+              </a:rPr>
+              <a:t>nlikely</a:t>
+            </a:r>
+            <a:r>
+              <a:rPr lang="en-NZ" sz="2800" dirty="0">
+                <a:effectLst/>
+                <a:latin typeface="Times New Roman" panose="02020603050405020304" pitchFamily="18" charset="0"/>
+                <a:cs typeface="Times New Roman" panose="02020603050405020304" pitchFamily="18" charset="0"/>
+              </a:rPr>
+              <a:t> to be changed.</a:t>
+            </a:r>
+            <a:endParaRPr lang="en-NZ" sz="2800" dirty="0">
+              <a:latin typeface="Times New Roman" panose="02020603050405020304" pitchFamily="18" charset="0"/>
+              <a:cs typeface="Times New Roman" panose="02020603050405020304" pitchFamily="18" charset="0"/>
+            </a:endParaRPr>
+          </a:p>
+        </p:txBody>
+      </p:sp>
+      <p:sp>
+        <p:nvSpPr>
+          <p:cNvPr id="5" name="文本框 4">
             <a:extLst>
-              <a:ext uri="{28A0092B-C50C-407E-A947-70E740481C1C}">
-                <a14:useLocalDpi xmlns:a14="http://schemas.microsoft.com/office/drawing/2010/main" xmlns="" val="0"/>
+              <a:ext uri="{FF2B5EF4-FFF2-40B4-BE49-F238E27FC236}">
+                <a16:creationId xmlns:a16="http://schemas.microsoft.com/office/drawing/2014/main" id="{D233536E-5C4E-5A22-114B-E507F99608AF}"/>
               </a:ext>
             </a:extLst>
-          </a:blip>
-          <a:stretch>
-            <a:fillRect/>
-          </a:stretch>
-        </p:blipFill>
-        <p:spPr>
-          <a:xfrm>
-            <a:off x="2644663" y="2193925"/>
-            <a:ext cx="6902674" cy="4024313"/>
-          </a:xfrm>
-        </p:spPr>
-      </p:pic>
+          </p:cNvPr>
+          <p:cNvSpPr txBox="1"/>
+          <p:nvPr/>
+        </p:nvSpPr>
+        <p:spPr>
+          <a:xfrm>
+            <a:off x="6661150" y="2232542"/>
+            <a:ext cx="5099050" cy="2585323"/>
+          </a:xfrm>
+          <a:prstGeom prst="rect">
+            <a:avLst/>
+          </a:prstGeom>
+          <a:noFill/>
+        </p:spPr>
+        <p:txBody>
+          <a:bodyPr wrap="square" rtlCol="0">
+            <a:spAutoFit/>
+          </a:bodyPr>
+          <a:lstStyle/>
+          <a:p>
+            <a:pPr marL="0" algn="l" rtl="0" eaLnBrk="1" fontAlgn="b" latinLnBrk="0" hangingPunct="1">
+              <a:spcBef>
+                <a:spcPts val="0"/>
+              </a:spcBef>
+              <a:spcAft>
+                <a:spcPts val="0"/>
+              </a:spcAft>
+            </a:pPr>
+            <a:r>
+              <a:rPr lang="en-NZ" sz="1800" b="0" i="0" u="none" strike="noStrike" kern="1200" dirty="0">
+                <a:solidFill>
+                  <a:schemeClr val="tx2">
+                    <a:lumMod val="90000"/>
+                  </a:schemeClr>
+                </a:solidFill>
+                <a:effectLst/>
+                <a:latin typeface="Times New Roman" panose="02020603050405020304" pitchFamily="18" charset="0"/>
+                <a:cs typeface="Times New Roman" panose="02020603050405020304" pitchFamily="18" charset="0"/>
+              </a:rPr>
+              <a:t>1.    Allow input of various input parameters on password such as Password Length, Include Special Characters, Numbers, Lower/Upper case Characters</a:t>
+            </a:r>
+          </a:p>
+          <a:p>
+            <a:pPr marL="0" algn="l" rtl="0" eaLnBrk="1" fontAlgn="b" latinLnBrk="0" hangingPunct="1">
+              <a:spcBef>
+                <a:spcPts val="0"/>
+              </a:spcBef>
+              <a:spcAft>
+                <a:spcPts val="0"/>
+              </a:spcAft>
+            </a:pPr>
+            <a:r>
+              <a:rPr lang="en-NZ" sz="1800" b="0" i="0" u="none" strike="noStrike" kern="1200" dirty="0">
+                <a:solidFill>
+                  <a:schemeClr val="tx2">
+                    <a:lumMod val="90000"/>
+                  </a:schemeClr>
+                </a:solidFill>
+                <a:effectLst/>
+                <a:latin typeface="Times New Roman" panose="02020603050405020304" pitchFamily="18" charset="0"/>
+                <a:cs typeface="Times New Roman" panose="02020603050405020304" pitchFamily="18" charset="0"/>
+              </a:rPr>
+              <a:t>2.    Save the settings for future use</a:t>
+            </a:r>
+            <a:endParaRPr lang="en-NZ" sz="1800" b="0" i="0" u="none" strike="noStrike" dirty="0">
+              <a:solidFill>
+                <a:schemeClr val="tx2">
+                  <a:lumMod val="90000"/>
+                </a:schemeClr>
+              </a:solidFill>
+              <a:effectLst/>
+              <a:latin typeface="Times New Roman" panose="02020603050405020304" pitchFamily="18" charset="0"/>
+              <a:cs typeface="Times New Roman" panose="02020603050405020304" pitchFamily="18" charset="0"/>
+            </a:endParaRPr>
+          </a:p>
+          <a:p>
+            <a:pPr marL="0" algn="l" rtl="0" eaLnBrk="1" fontAlgn="b" latinLnBrk="0" hangingPunct="1">
+              <a:spcBef>
+                <a:spcPts val="0"/>
+              </a:spcBef>
+              <a:spcAft>
+                <a:spcPts val="0"/>
+              </a:spcAft>
+            </a:pPr>
+            <a:r>
+              <a:rPr lang="en-NZ" sz="1800" b="0" i="0" u="none" strike="noStrike" kern="1200" dirty="0">
+                <a:solidFill>
+                  <a:schemeClr val="tx2">
+                    <a:lumMod val="90000"/>
+                  </a:schemeClr>
+                </a:solidFill>
+                <a:effectLst/>
+                <a:latin typeface="Times New Roman" panose="02020603050405020304" pitchFamily="18" charset="0"/>
+                <a:cs typeface="Times New Roman" panose="02020603050405020304" pitchFamily="18" charset="0"/>
+              </a:rPr>
+              <a:t>3.    Generate a random password based on the above parameters</a:t>
+            </a:r>
+            <a:endParaRPr lang="en-NZ" sz="1800" b="0" i="0" u="none" strike="noStrike" dirty="0">
+              <a:solidFill>
+                <a:schemeClr val="tx2">
+                  <a:lumMod val="90000"/>
+                </a:schemeClr>
+              </a:solidFill>
+              <a:effectLst/>
+              <a:latin typeface="Times New Roman" panose="02020603050405020304" pitchFamily="18" charset="0"/>
+              <a:cs typeface="Times New Roman" panose="02020603050405020304" pitchFamily="18" charset="0"/>
+            </a:endParaRPr>
+          </a:p>
+          <a:p>
+            <a:pPr marL="0" algn="l" rtl="0" eaLnBrk="1" fontAlgn="b" latinLnBrk="0" hangingPunct="1">
+              <a:spcBef>
+                <a:spcPts val="0"/>
+              </a:spcBef>
+              <a:spcAft>
+                <a:spcPts val="0"/>
+              </a:spcAft>
+            </a:pPr>
+            <a:r>
+              <a:rPr lang="en-NZ" sz="1800" b="0" i="0" u="none" strike="noStrike" kern="1200" dirty="0">
+                <a:solidFill>
+                  <a:schemeClr val="tx2">
+                    <a:lumMod val="90000"/>
+                  </a:schemeClr>
+                </a:solidFill>
+                <a:effectLst/>
+                <a:latin typeface="Times New Roman" panose="02020603050405020304" pitchFamily="18" charset="0"/>
+                <a:cs typeface="Times New Roman" panose="02020603050405020304" pitchFamily="18" charset="0"/>
+              </a:rPr>
+              <a:t>4.    Copy function to copy the generated password to the buffer (like Control + C)</a:t>
+            </a:r>
+            <a:endParaRPr lang="en-NZ" sz="1800" b="0" i="0" u="none" strike="noStrike" dirty="0">
+              <a:solidFill>
+                <a:schemeClr val="tx2">
+                  <a:lumMod val="90000"/>
+                </a:schemeClr>
+              </a:solidFill>
+              <a:effectLst/>
+              <a:latin typeface="Times New Roman" panose="02020603050405020304" pitchFamily="18" charset="0"/>
+              <a:cs typeface="Times New Roman" panose="02020603050405020304" pitchFamily="18" charset="0"/>
+            </a:endParaRPr>
+          </a:p>
+          <a:p>
+            <a:endParaRPr lang="en-NZ" dirty="0">
+              <a:solidFill>
+                <a:schemeClr val="tx2">
+                  <a:lumMod val="90000"/>
+                </a:schemeClr>
+              </a:solidFill>
+              <a:latin typeface="Times New Roman" panose="02020603050405020304" pitchFamily="18" charset="0"/>
+              <a:cs typeface="Times New Roman" panose="02020603050405020304" pitchFamily="18" charset="0"/>
+            </a:endParaRPr>
+          </a:p>
+        </p:txBody>
+      </p:sp>
+      <p:sp>
+        <p:nvSpPr>
+          <p:cNvPr id="6" name="文本框 5">
+            <a:extLst>
+              <a:ext uri="{FF2B5EF4-FFF2-40B4-BE49-F238E27FC236}">
+                <a16:creationId xmlns:a16="http://schemas.microsoft.com/office/drawing/2014/main" id="{4432D91B-110E-9A16-F8F5-9DE69295486D}"/>
+              </a:ext>
+            </a:extLst>
+          </p:cNvPr>
+          <p:cNvSpPr txBox="1"/>
+          <p:nvPr/>
+        </p:nvSpPr>
+        <p:spPr>
+          <a:xfrm>
+            <a:off x="6572250" y="5638800"/>
+            <a:ext cx="4724400" cy="338554"/>
+          </a:xfrm>
+          <a:prstGeom prst="rect">
+            <a:avLst/>
+          </a:prstGeom>
+          <a:noFill/>
+        </p:spPr>
+        <p:txBody>
+          <a:bodyPr wrap="square" rtlCol="0">
+            <a:spAutoFit/>
+          </a:bodyPr>
+          <a:lstStyle/>
+          <a:p>
+            <a:r>
+              <a:rPr lang="en-NZ" sz="1600" dirty="0" err="1">
+                <a:latin typeface="Times New Roman" panose="02020603050405020304" pitchFamily="18" charset="0"/>
+                <a:cs typeface="Times New Roman" panose="02020603050405020304" pitchFamily="18" charset="0"/>
+              </a:rPr>
+              <a:t>Retrived</a:t>
+            </a:r>
+            <a:r>
+              <a:rPr lang="en-NZ" sz="1600" dirty="0">
+                <a:latin typeface="Times New Roman" panose="02020603050405020304" pitchFamily="18" charset="0"/>
+                <a:cs typeface="Times New Roman" panose="02020603050405020304" pitchFamily="18" charset="0"/>
+              </a:rPr>
+              <a:t> from: project list</a:t>
+            </a:r>
+          </a:p>
+        </p:txBody>
+      </p:sp>
     </p:spTree>
     <p:extLst>
       <p:ext uri="{BB962C8B-B14F-4D97-AF65-F5344CB8AC3E}">
-        <p14:creationId xmlns:p14="http://schemas.microsoft.com/office/powerpoint/2010/main" xmlns="" val="3123407964"/>
+        <p14:creationId xmlns:p14="http://schemas.microsoft.com/office/powerpoint/2010/main" val="2361374323"/>
       </p:ext>
     </p:extLst>
   </p:cSld>
@@ -6010,7 +6323,7 @@
           <p:cNvPr id="2" name="标题 1">
             <a:extLst>
               <a:ext uri="{FF2B5EF4-FFF2-40B4-BE49-F238E27FC236}">
-                <a16:creationId xmlns:a16="http://schemas.microsoft.com/office/drawing/2014/main" xmlns="" id="{083AE34A-2EE8-6BAE-70F0-3E8DBE525781}"/>
+                <a16:creationId xmlns:a16="http://schemas.microsoft.com/office/drawing/2014/main" id="{B26EBC45-122C-5FE6-01A0-0B6F24E25785}"/>
               </a:ext>
             </a:extLst>
           </p:cNvPr>
@@ -6033,141 +6346,45 @@
           </a:p>
         </p:txBody>
       </p:sp>
-      <p:sp>
-        <p:nvSpPr>
-          <p:cNvPr id="3" name="内容占位符 2">
+      <p:pic>
+        <p:nvPicPr>
+          <p:cNvPr id="5" name="内容占位符 4">
             <a:extLst>
               <a:ext uri="{FF2B5EF4-FFF2-40B4-BE49-F238E27FC236}">
-                <a16:creationId xmlns:a16="http://schemas.microsoft.com/office/drawing/2014/main" xmlns="" id="{D1631241-63E7-CCA1-C041-9CEE6DF91618}"/>
+                <a16:creationId xmlns:a16="http://schemas.microsoft.com/office/drawing/2014/main" id="{B34579D3-B1D0-FFDD-242D-00F815568178}"/>
               </a:ext>
             </a:extLst>
           </p:cNvPr>
-          <p:cNvSpPr>
-            <a:spLocks noGrp="1"/>
-          </p:cNvSpPr>
+          <p:cNvPicPr>
+            <a:picLocks noGrp="1" noChangeAspect="1"/>
+          </p:cNvPicPr>
           <p:nvPr>
             <p:ph idx="1"/>
           </p:nvPr>
-        </p:nvSpPr>
-        <p:spPr/>
-        <p:txBody>
-          <a:bodyPr/>
-          <a:lstStyle/>
-          <a:p>
-            <a:r>
-              <a:rPr lang="en-NZ" dirty="0"/>
-              <a:t>Client (Richard)</a:t>
-            </a:r>
-          </a:p>
-          <a:p>
-            <a:pPr lvl="1"/>
-            <a:r>
-              <a:rPr lang="en-NZ" dirty="0"/>
-              <a:t>User Interface (Html/</a:t>
-            </a:r>
-            <a:r>
-              <a:rPr lang="en-NZ" dirty="0" err="1"/>
-              <a:t>ejs</a:t>
-            </a:r>
-            <a:r>
-              <a:rPr lang="en-NZ" dirty="0"/>
-              <a:t>, </a:t>
-            </a:r>
-            <a:r>
-              <a:rPr lang="en-NZ" dirty="0" err="1"/>
-              <a:t>css</a:t>
-            </a:r>
-            <a:r>
-              <a:rPr lang="en-NZ" dirty="0"/>
-              <a:t>, embedded </a:t>
-            </a:r>
-            <a:r>
-              <a:rPr lang="en-NZ" dirty="0" err="1"/>
-              <a:t>javascript</a:t>
-            </a:r>
-            <a:r>
-              <a:rPr lang="en-NZ" dirty="0"/>
-              <a:t>)</a:t>
-            </a:r>
-          </a:p>
-          <a:p>
-            <a:r>
-              <a:rPr lang="en-US" altLang="zh-CN" dirty="0"/>
-              <a:t>Server (Steven)</a:t>
-            </a:r>
-          </a:p>
-          <a:p>
-            <a:pPr lvl="1"/>
-            <a:r>
-              <a:rPr lang="en-US" altLang="zh-CN" dirty="0"/>
-              <a:t>request process (</a:t>
-            </a:r>
-            <a:r>
-              <a:rPr lang="en-US" altLang="zh-CN" dirty="0" err="1"/>
-              <a:t>javascript</a:t>
-            </a:r>
-            <a:r>
-              <a:rPr lang="en-US" altLang="zh-CN" dirty="0"/>
-              <a:t>)</a:t>
-            </a:r>
-          </a:p>
-          <a:p>
-            <a:pPr marL="457200" lvl="1" indent="0">
-              <a:buNone/>
-            </a:pPr>
-            <a:r>
-              <a:rPr lang="en-US" altLang="zh-CN" dirty="0"/>
-              <a:t>. Cookies process </a:t>
-            </a:r>
-            <a:r>
-              <a:rPr lang="zh-CN" altLang="en-US" dirty="0"/>
-              <a:t> </a:t>
-            </a:r>
-            <a:r>
-              <a:rPr lang="en-NZ" altLang="zh-CN" dirty="0"/>
-              <a:t>(</a:t>
-            </a:r>
-            <a:r>
-              <a:rPr lang="en-NZ" altLang="zh-CN" dirty="0" err="1"/>
-              <a:t>javascript</a:t>
-            </a:r>
-            <a:r>
-              <a:rPr lang="en-NZ" altLang="zh-CN" dirty="0"/>
-              <a:t>)</a:t>
-            </a:r>
-            <a:endParaRPr lang="en-US" altLang="zh-CN" dirty="0"/>
-          </a:p>
-          <a:p>
-            <a:r>
-              <a:rPr lang="en-US" altLang="zh-CN" dirty="0"/>
-              <a:t>Server( Maribeth)</a:t>
-            </a:r>
-          </a:p>
-          <a:p>
-            <a:pPr lvl="1"/>
-            <a:r>
-              <a:rPr lang="en-US" altLang="zh-CN" dirty="0"/>
-              <a:t> implement of the module - Password Generator (</a:t>
-            </a:r>
-            <a:r>
-              <a:rPr lang="en-US" altLang="zh-CN" dirty="0" err="1"/>
-              <a:t>javascript</a:t>
-            </a:r>
-            <a:r>
-              <a:rPr lang="en-US" altLang="zh-CN" dirty="0"/>
-              <a:t>)</a:t>
-            </a:r>
-          </a:p>
-          <a:p>
-            <a:pPr lvl="1"/>
-            <a:endParaRPr lang="en-US" altLang="zh-CN" dirty="0"/>
-          </a:p>
-        </p:txBody>
-      </p:sp>
+        </p:nvPicPr>
+        <p:blipFill>
+          <a:blip r:embed="rId2">
+            <a:extLst>
+              <a:ext uri="{28A0092B-C50C-407E-A947-70E740481C1C}">
+                <a14:useLocalDpi xmlns:a14="http://schemas.microsoft.com/office/drawing/2010/main" val="0"/>
+              </a:ext>
+            </a:extLst>
+          </a:blip>
+          <a:stretch>
+            <a:fillRect/>
+          </a:stretch>
+        </p:blipFill>
+        <p:spPr>
+          <a:xfrm>
+            <a:off x="2644663" y="2193925"/>
+            <a:ext cx="6902674" cy="4024313"/>
+          </a:xfrm>
+        </p:spPr>
+      </p:pic>
     </p:spTree>
     <p:extLst>
       <p:ext uri="{BB962C8B-B14F-4D97-AF65-F5344CB8AC3E}">
-        <p14:creationId xmlns:p14="http://schemas.microsoft.com/office/powerpoint/2010/main" xmlns="" val="3396672449"/>
+        <p14:creationId xmlns:p14="http://schemas.microsoft.com/office/powerpoint/2010/main" val="3123407964"/>
       </p:ext>
     </p:extLst>
   </p:cSld>
@@ -6199,7 +6416,7 @@
           <p:cNvPr id="2" name="标题 1">
             <a:extLst>
               <a:ext uri="{FF2B5EF4-FFF2-40B4-BE49-F238E27FC236}">
-                <a16:creationId xmlns:a16="http://schemas.microsoft.com/office/drawing/2014/main" xmlns="" id="{BCD0B7BF-66C7-8E0C-EE6E-210BC09261AB}"/>
+                <a16:creationId xmlns:a16="http://schemas.microsoft.com/office/drawing/2014/main" id="{083AE34A-2EE8-6BAE-70F0-3E8DBE525781}"/>
               </a:ext>
             </a:extLst>
           </p:cNvPr>
@@ -6217,7 +6434,7 @@
           <a:p>
             <a:r>
               <a:rPr lang="en-NZ" dirty="0"/>
-              <a:t>Reflections</a:t>
+              <a:t>TEAM WORK</a:t>
             </a:r>
           </a:p>
         </p:txBody>
@@ -6227,7 +6444,7 @@
           <p:cNvPr id="3" name="内容占位符 2">
             <a:extLst>
               <a:ext uri="{FF2B5EF4-FFF2-40B4-BE49-F238E27FC236}">
-                <a16:creationId xmlns:a16="http://schemas.microsoft.com/office/drawing/2014/main" xmlns="" id="{99BC1E35-F9E7-1295-FBBD-ED8B0075BF59}"/>
+                <a16:creationId xmlns:a16="http://schemas.microsoft.com/office/drawing/2014/main" id="{D1631241-63E7-CCA1-C041-9CEE6DF91618}"/>
               </a:ext>
             </a:extLst>
           </p:cNvPr>
@@ -6245,39 +6462,110 @@
           <a:p>
             <a:r>
               <a:rPr lang="en-NZ" dirty="0"/>
-              <a:t>Maribeth:</a:t>
-            </a:r>
-          </a:p>
-          <a:p>
-            <a:endParaRPr lang="en-NZ" dirty="0"/>
-          </a:p>
-          <a:p>
-            <a:endParaRPr lang="en-NZ" dirty="0"/>
-          </a:p>
-          <a:p>
+              <a:t>Client (Richard)</a:t>
+            </a:r>
+          </a:p>
+          <a:p>
+            <a:pPr lvl="1"/>
             <a:r>
               <a:rPr lang="en-NZ" dirty="0"/>
-              <a:t>Richard:</a:t>
-            </a:r>
-          </a:p>
-          <a:p>
-            <a:endParaRPr lang="en-NZ" dirty="0"/>
-          </a:p>
-          <a:p>
-            <a:endParaRPr lang="en-NZ" dirty="0"/>
-          </a:p>
-          <a:p>
+              <a:t>User Interface (HTML/</a:t>
+            </a:r>
+            <a:r>
+              <a:rPr lang="en-NZ" dirty="0" err="1"/>
+              <a:t>ejs</a:t>
+            </a:r>
             <a:r>
               <a:rPr lang="en-NZ" dirty="0"/>
-              <a:t>Steven:</a:t>
-            </a:r>
+              <a:t>, CSS, embedded </a:t>
+            </a:r>
+            <a:r>
+              <a:rPr lang="en-NZ" dirty="0" err="1"/>
+              <a:t>javascript</a:t>
+            </a:r>
+            <a:r>
+              <a:rPr lang="en-NZ" dirty="0"/>
+              <a:t>)</a:t>
+            </a:r>
+          </a:p>
+          <a:p>
+            <a:r>
+              <a:rPr lang="en-US" altLang="zh-CN" dirty="0"/>
+              <a:t>Server (Steven)</a:t>
+            </a:r>
+          </a:p>
+          <a:p>
+            <a:pPr lvl="1"/>
+            <a:r>
+              <a:rPr lang="en-US" altLang="zh-CN" dirty="0"/>
+              <a:t>request process (</a:t>
+            </a:r>
+            <a:r>
+              <a:rPr lang="en-US" altLang="zh-CN" dirty="0" err="1"/>
+              <a:t>javascript</a:t>
+            </a:r>
+            <a:r>
+              <a:rPr lang="en-US" altLang="zh-CN" dirty="0"/>
+              <a:t>)</a:t>
+            </a:r>
+          </a:p>
+          <a:p>
+            <a:pPr marL="457200" lvl="1" indent="0">
+              <a:buNone/>
+            </a:pPr>
+            <a:r>
+              <a:rPr lang="en-US" altLang="zh-CN" dirty="0"/>
+              <a:t>. Cookies process </a:t>
+            </a:r>
+            <a:r>
+              <a:rPr lang="zh-CN" altLang="en-US" dirty="0"/>
+              <a:t> </a:t>
+            </a:r>
+            <a:r>
+              <a:rPr lang="en-NZ" altLang="zh-CN" dirty="0"/>
+              <a:t>(</a:t>
+            </a:r>
+            <a:r>
+              <a:rPr lang="en-NZ" altLang="zh-CN" dirty="0" err="1"/>
+              <a:t>javascript</a:t>
+            </a:r>
+            <a:r>
+              <a:rPr lang="en-NZ" altLang="zh-CN" dirty="0"/>
+              <a:t>)</a:t>
+            </a:r>
+            <a:endParaRPr lang="en-US" altLang="zh-CN" dirty="0"/>
+          </a:p>
+          <a:p>
+            <a:r>
+              <a:rPr lang="en-US" altLang="zh-CN" dirty="0"/>
+              <a:t>Server( Maribeth)</a:t>
+            </a:r>
+          </a:p>
+          <a:p>
+            <a:pPr lvl="1"/>
+            <a:r>
+              <a:rPr lang="en-US" altLang="zh-CN" dirty="0"/>
+              <a:t> implement a module for Password Generator (</a:t>
+            </a:r>
+            <a:r>
+              <a:rPr lang="en-US" altLang="zh-CN" dirty="0" err="1"/>
+              <a:t>javascript</a:t>
+            </a:r>
+            <a:r>
+              <a:rPr lang="en-US" altLang="zh-CN" dirty="0"/>
+              <a:t>)</a:t>
+            </a:r>
+          </a:p>
+          <a:p>
+            <a:pPr lvl="1"/>
+            <a:endParaRPr lang="en-US" altLang="zh-CN" dirty="0"/>
           </a:p>
         </p:txBody>
       </p:sp>
     </p:spTree>
     <p:extLst>
       <p:ext uri="{BB962C8B-B14F-4D97-AF65-F5344CB8AC3E}">
-        <p14:creationId xmlns:p14="http://schemas.microsoft.com/office/powerpoint/2010/main" xmlns="" val="358586711"/>
+        <p14:creationId xmlns:p14="http://schemas.microsoft.com/office/powerpoint/2010/main" val="3396672449"/>
       </p:ext>
     </p:extLst>
   </p:cSld>
@@ -6309,7 +6597,7 @@
           <p:cNvPr id="2" name="标题 1">
             <a:extLst>
               <a:ext uri="{FF2B5EF4-FFF2-40B4-BE49-F238E27FC236}">
-                <a16:creationId xmlns:a16="http://schemas.microsoft.com/office/drawing/2014/main" xmlns="" id="{7968832C-C89A-B085-ABDF-723E25F15B4E}"/>
+                <a16:creationId xmlns:a16="http://schemas.microsoft.com/office/drawing/2014/main" id="{BCD0B7BF-66C7-8E0C-EE6E-210BC09261AB}"/>
               </a:ext>
             </a:extLst>
           </p:cNvPr>
@@ -6327,7 +6615,7 @@
           <a:p>
             <a:r>
               <a:rPr lang="en-NZ" dirty="0"/>
-              <a:t>References</a:t>
+              <a:t>Reflections</a:t>
             </a:r>
           </a:p>
         </p:txBody>
@@ -6337,7 +6625,7 @@
           <p:cNvPr id="3" name="内容占位符 2">
             <a:extLst>
               <a:ext uri="{FF2B5EF4-FFF2-40B4-BE49-F238E27FC236}">
-                <a16:creationId xmlns:a16="http://schemas.microsoft.com/office/drawing/2014/main" xmlns="" id="{4029B2BD-2B47-E1CA-0E88-D9FBD2CA4E6C}"/>
+                <a16:creationId xmlns:a16="http://schemas.microsoft.com/office/drawing/2014/main" id="{99BC1E35-F9E7-1295-FBBD-ED8B0075BF59}"/>
               </a:ext>
             </a:extLst>
           </p:cNvPr>
@@ -6353,14 +6641,41 @@
           <a:bodyPr/>
           <a:lstStyle/>
           <a:p>
+            <a:r>
+              <a:rPr lang="en-NZ" dirty="0"/>
+              <a:t>Maribeth:</a:t>
+            </a:r>
+          </a:p>
+          <a:p>
             <a:endParaRPr lang="en-NZ" dirty="0"/>
+          </a:p>
+          <a:p>
+            <a:endParaRPr lang="en-NZ" dirty="0"/>
+          </a:p>
+          <a:p>
+            <a:r>
+              <a:rPr lang="en-NZ" dirty="0"/>
+              <a:t>Richard:</a:t>
+            </a:r>
+          </a:p>
+          <a:p>
+            <a:endParaRPr lang="en-NZ" dirty="0"/>
+          </a:p>
+          <a:p>
+            <a:endParaRPr lang="en-NZ" dirty="0"/>
+          </a:p>
+          <a:p>
+            <a:r>
+              <a:rPr lang="en-NZ" dirty="0"/>
+              <a:t>Steven:</a:t>
+            </a:r>
           </a:p>
         </p:txBody>
       </p:sp>
     </p:spTree>
     <p:extLst>
       <p:ext uri="{BB962C8B-B14F-4D97-AF65-F5344CB8AC3E}">
-        <p14:creationId xmlns:p14="http://schemas.microsoft.com/office/powerpoint/2010/main" xmlns="" val="1669517618"/>
+        <p14:creationId xmlns:p14="http://schemas.microsoft.com/office/powerpoint/2010/main" val="358586711"/>
       </p:ext>
     </p:extLst>
   </p:cSld>
@@ -6392,7 +6707,7 @@
           <p:cNvPr id="2" name="标题 1">
             <a:extLst>
               <a:ext uri="{FF2B5EF4-FFF2-40B4-BE49-F238E27FC236}">
-                <a16:creationId xmlns:a16="http://schemas.microsoft.com/office/drawing/2014/main" xmlns="" id="{931FF632-26A4-A3C5-3BFA-108378087F3B}"/>
+                <a16:creationId xmlns:a16="http://schemas.microsoft.com/office/drawing/2014/main" id="{7968832C-C89A-B085-ABDF-723E25F15B4E}"/>
               </a:ext>
             </a:extLst>
           </p:cNvPr>
@@ -6410,7 +6725,7 @@
           <a:p>
             <a:r>
               <a:rPr lang="en-NZ" dirty="0"/>
-              <a:t>Q&amp;A</a:t>
+              <a:t>References</a:t>
             </a:r>
           </a:p>
         </p:txBody>
@@ -6420,7 +6735,7 @@
           <p:cNvPr id="3" name="内容占位符 2">
             <a:extLst>
               <a:ext uri="{FF2B5EF4-FFF2-40B4-BE49-F238E27FC236}">
-                <a16:creationId xmlns:a16="http://schemas.microsoft.com/office/drawing/2014/main" xmlns="" id="{10C10AB0-F6BB-26E5-C279-0931E8572F2F}"/>
+                <a16:creationId xmlns:a16="http://schemas.microsoft.com/office/drawing/2014/main" id="{4029B2BD-2B47-E1CA-0E88-D9FBD2CA4E6C}"/>
               </a:ext>
             </a:extLst>
           </p:cNvPr>
@@ -6436,17 +6751,100 @@
           <a:bodyPr/>
           <a:lstStyle/>
           <a:p>
-            <a:r>
-              <a:rPr lang="en-NZ" dirty="0"/>
-              <a:t>Answer Questions</a:t>
-            </a:r>
+            <a:endParaRPr lang="en-NZ" dirty="0"/>
           </a:p>
         </p:txBody>
       </p:sp>
     </p:spTree>
     <p:extLst>
       <p:ext uri="{BB962C8B-B14F-4D97-AF65-F5344CB8AC3E}">
-        <p14:creationId xmlns:p14="http://schemas.microsoft.com/office/powerpoint/2010/main" xmlns="" val="1405912245"/>
+        <p14:creationId xmlns:p14="http://schemas.microsoft.com/office/powerpoint/2010/main" val="1669517618"/>
+      </p:ext>
+    </p:extLst>
+  </p:cSld>
+  <p:clrMapOvr>
+    <a:masterClrMapping/>
+  </p:clrMapOvr>
+</p:sld>
+</file>
+
+<file path=ppt/slides/slide15.xml><?xml version="1.0" encoding="utf-8"?>
+<p:sld xmlns:a="http://schemas.openxmlformats.org/drawingml/2006/main" xmlns:r="http://schemas.openxmlformats.org/officeDocument/2006/relationships" xmlns:p="http://schemas.openxmlformats.org/presentationml/2006/main">
+  <p:cSld>
+    <p:spTree>
+      <p:nvGrpSpPr>
+        <p:cNvPr id="1" name=""/>
+        <p:cNvGrpSpPr/>
+        <p:nvPr/>
+      </p:nvGrpSpPr>
+      <p:grpSpPr>
+        <a:xfrm>
+          <a:off x="0" y="0"/>
+          <a:ext cx="0" cy="0"/>
+          <a:chOff x="0" y="0"/>
+          <a:chExt cx="0" cy="0"/>
+        </a:xfrm>
+      </p:grpSpPr>
+      <p:sp>
+        <p:nvSpPr>
+          <p:cNvPr id="2" name="标题 1">
+            <a:extLst>
+              <a:ext uri="{FF2B5EF4-FFF2-40B4-BE49-F238E27FC236}">
+                <a16:creationId xmlns:a16="http://schemas.microsoft.com/office/drawing/2014/main" id="{931FF632-26A4-A3C5-3BFA-108378087F3B}"/>
+              </a:ext>
+            </a:extLst>
+          </p:cNvPr>
+          <p:cNvSpPr>
+            <a:spLocks noGrp="1"/>
+          </p:cNvSpPr>
+          <p:nvPr>
+            <p:ph type="title"/>
+          </p:nvPr>
+        </p:nvSpPr>
+        <p:spPr/>
+        <p:txBody>
+          <a:bodyPr/>
+          <a:lstStyle/>
+          <a:p>
+            <a:r>
+              <a:rPr lang="en-NZ" dirty="0"/>
+              <a:t>Q&amp;A</a:t>
+            </a:r>
+          </a:p>
+        </p:txBody>
+      </p:sp>
+      <p:sp>
+        <p:nvSpPr>
+          <p:cNvPr id="3" name="内容占位符 2">
+            <a:extLst>
+              <a:ext uri="{FF2B5EF4-FFF2-40B4-BE49-F238E27FC236}">
+                <a16:creationId xmlns:a16="http://schemas.microsoft.com/office/drawing/2014/main" id="{10C10AB0-F6BB-26E5-C279-0931E8572F2F}"/>
+              </a:ext>
+            </a:extLst>
+          </p:cNvPr>
+          <p:cNvSpPr>
+            <a:spLocks noGrp="1"/>
+          </p:cNvSpPr>
+          <p:nvPr>
+            <p:ph idx="1"/>
+          </p:nvPr>
+        </p:nvSpPr>
+        <p:spPr/>
+        <p:txBody>
+          <a:bodyPr/>
+          <a:lstStyle/>
+          <a:p>
+            <a:r>
+              <a:rPr lang="en-NZ" dirty="0"/>
+              <a:t>Answer Questions</a:t>
+            </a:r>
+          </a:p>
+        </p:txBody>
+      </p:sp>
+    </p:spTree>
+    <p:extLst>
+      <p:ext uri="{BB962C8B-B14F-4D97-AF65-F5344CB8AC3E}">
+        <p14:creationId xmlns:p14="http://schemas.microsoft.com/office/powerpoint/2010/main" val="1405912245"/>
       </p:ext>
     </p:extLst>
   </p:cSld>
@@ -6478,7 +6876,7 @@
           <p:cNvPr id="2" name="标题 1">
             <a:extLst>
               <a:ext uri="{FF2B5EF4-FFF2-40B4-BE49-F238E27FC236}">
-                <a16:creationId xmlns:a16="http://schemas.microsoft.com/office/drawing/2014/main" xmlns="" id="{3B121F95-2659-B777-A490-44CC5DFFC3A1}"/>
+                <a16:creationId xmlns:a16="http://schemas.microsoft.com/office/drawing/2014/main" id="{3B121F95-2659-B777-A490-44CC5DFFC3A1}"/>
               </a:ext>
             </a:extLst>
           </p:cNvPr>
@@ -6496,7 +6894,7 @@
           <a:p>
             <a:r>
               <a:rPr lang="en-NZ" dirty="0"/>
-              <a:t>Content</a:t>
+              <a:t>Agenda</a:t>
             </a:r>
           </a:p>
         </p:txBody>
@@ -6506,7 +6904,7 @@
           <p:cNvPr id="3" name="内容占位符 2">
             <a:extLst>
               <a:ext uri="{FF2B5EF4-FFF2-40B4-BE49-F238E27FC236}">
-                <a16:creationId xmlns:a16="http://schemas.microsoft.com/office/drawing/2014/main" xmlns="" id="{7A6FE493-6895-3F84-9D5F-AB2A89BCCCAE}"/>
+                <a16:creationId xmlns:a16="http://schemas.microsoft.com/office/drawing/2014/main" id="{7A6FE493-6895-3F84-9D5F-AB2A89BCCCAE}"/>
               </a:ext>
             </a:extLst>
           </p:cNvPr>
@@ -6530,7 +6928,7 @@
           <a:p>
             <a:r>
               <a:rPr lang="en-NZ" dirty="0"/>
-              <a:t>2. Why we choose this project</a:t>
+              <a:t>2. Why we chose this project</a:t>
             </a:r>
           </a:p>
           <a:p>
@@ -6565,13 +6963,19 @@
           <a:p>
             <a:r>
               <a:rPr lang="en-NZ" dirty="0"/>
-              <a:t>7. Q &amp; A</a:t>
+              <a:t>7. References</a:t>
             </a:r>
           </a:p>
           <a:p>
             <a:r>
               <a:rPr lang="en-NZ" dirty="0"/>
-              <a:t>8. References</a:t>
+              <a:t>8. Demo</a:t>
+            </a:r>
+          </a:p>
+          <a:p>
+            <a:r>
+              <a:rPr lang="en-NZ" dirty="0"/>
+              <a:t>9. Q &amp; A</a:t>
             </a:r>
           </a:p>
         </p:txBody>
@@ -6579,7 +6983,7 @@
     </p:spTree>
     <p:extLst>
       <p:ext uri="{BB962C8B-B14F-4D97-AF65-F5344CB8AC3E}">
-        <p14:creationId xmlns:p14="http://schemas.microsoft.com/office/powerpoint/2010/main" xmlns="" val="3104536044"/>
+        <p14:creationId xmlns:p14="http://schemas.microsoft.com/office/powerpoint/2010/main" val="3104536044"/>
       </p:ext>
     </p:extLst>
   </p:cSld>
@@ -6611,7 +7015,7 @@
           <p:cNvPr id="2" name="标题 1">
             <a:extLst>
               <a:ext uri="{FF2B5EF4-FFF2-40B4-BE49-F238E27FC236}">
-                <a16:creationId xmlns:a16="http://schemas.microsoft.com/office/drawing/2014/main" xmlns="" id="{92465190-A9B5-15FB-0CC7-52D427954EC8}"/>
+                <a16:creationId xmlns:a16="http://schemas.microsoft.com/office/drawing/2014/main" id="{92465190-A9B5-15FB-0CC7-52D427954EC8}"/>
               </a:ext>
             </a:extLst>
           </p:cNvPr>
@@ -6629,7 +7033,7 @@
           <a:p>
             <a:r>
               <a:rPr lang="en-NZ" dirty="0"/>
-              <a:t>What is Password Generator</a:t>
+              <a:t>What is A Password Generator</a:t>
             </a:r>
           </a:p>
         </p:txBody>
@@ -6639,7 +7043,7 @@
           <p:cNvPr id="3" name="内容占位符 2">
             <a:extLst>
               <a:ext uri="{FF2B5EF4-FFF2-40B4-BE49-F238E27FC236}">
-                <a16:creationId xmlns:a16="http://schemas.microsoft.com/office/drawing/2014/main" xmlns="" id="{CAC7A421-7F2F-3B65-83AB-9B04FEA923A7}"/>
+                <a16:creationId xmlns:a16="http://schemas.microsoft.com/office/drawing/2014/main" id="{CAC7A421-7F2F-3B65-83AB-9B04FEA923A7}"/>
               </a:ext>
             </a:extLst>
           </p:cNvPr>
@@ -6657,7 +7061,7 @@
           <a:p>
             <a:r>
               <a:rPr lang="en-NZ" dirty="0"/>
-              <a:t>Create a random password while we are registering or modifying in websites, apps</a:t>
+              <a:t>Create a random password for use when registering or changing passwords in websites and apps</a:t>
             </a:r>
           </a:p>
           <a:p>
@@ -6670,30 +7074,31 @@
             <a:pPr lvl="1"/>
             <a:r>
               <a:rPr lang="en-NZ" dirty="0"/>
-              <a:t>Computers/Laptop(Mac &amp; Windows), phones(IOS &amp; Android), </a:t>
+              <a:t>Computers/Laptops (Mac &amp; Windows), phones (IOS &amp; Android), </a:t>
             </a:r>
             <a:r>
               <a:rPr lang="en-US" altLang="zh-CN" dirty="0"/>
-              <a:t>tablets(</a:t>
+              <a:t>tablets (</a:t>
+            </a:r>
+            <a:r>
+              <a:rPr lang="en-NZ" altLang="zh-CN" dirty="0" err="1"/>
+              <a:t>i</a:t>
             </a:r>
             <a:r>
               <a:rPr lang="en-NZ" dirty="0" err="1"/>
-              <a:t>Ipads</a:t>
+              <a:t>pads</a:t>
             </a:r>
             <a:r>
               <a:rPr lang="en-NZ" dirty="0"/>
-              <a:t> &amp; other brand) and so on.</a:t>
-            </a:r>
-          </a:p>
-          <a:p>
-            <a:endParaRPr lang="en-NZ" dirty="0"/>
+              <a:t> &amp; other brands)</a:t>
+            </a:r>
           </a:p>
         </p:txBody>
       </p:sp>
     </p:spTree>
     <p:extLst>
       <p:ext uri="{BB962C8B-B14F-4D97-AF65-F5344CB8AC3E}">
-        <p14:creationId xmlns:p14="http://schemas.microsoft.com/office/powerpoint/2010/main" xmlns="" val="3295134947"/>
+        <p14:creationId xmlns:p14="http://schemas.microsoft.com/office/powerpoint/2010/main" val="3295134947"/>
       </p:ext>
     </p:extLst>
   </p:cSld>
@@ -6725,7 +7130,7 @@
           <p:cNvPr id="2" name="标题 1">
             <a:extLst>
               <a:ext uri="{FF2B5EF4-FFF2-40B4-BE49-F238E27FC236}">
-                <a16:creationId xmlns:a16="http://schemas.microsoft.com/office/drawing/2014/main" xmlns="" id="{FCD0B3A6-F68D-1E92-C281-AEDB26248FFD}"/>
+                <a16:creationId xmlns:a16="http://schemas.microsoft.com/office/drawing/2014/main" id="{FCD0B3A6-F68D-1E92-C281-AEDB26248FFD}"/>
               </a:ext>
             </a:extLst>
           </p:cNvPr>
@@ -6748,7 +7153,7 @@
                 <a:latin typeface="Times New Roman" panose="02020603050405020304" pitchFamily="18" charset="0"/>
                 <a:cs typeface="Times New Roman" panose="02020603050405020304" pitchFamily="18" charset="0"/>
               </a:rPr>
-              <a:t>Why we choose this project</a:t>
+              <a:t>Why we chose this project</a:t>
             </a:r>
           </a:p>
         </p:txBody>
@@ -6758,7 +7163,7 @@
           <p:cNvPr id="3" name="内容占位符 2">
             <a:extLst>
               <a:ext uri="{FF2B5EF4-FFF2-40B4-BE49-F238E27FC236}">
-                <a16:creationId xmlns:a16="http://schemas.microsoft.com/office/drawing/2014/main" xmlns="" id="{78485416-BC42-8064-E043-36117E18E39D}"/>
+                <a16:creationId xmlns:a16="http://schemas.microsoft.com/office/drawing/2014/main" id="{78485416-BC42-8064-E043-36117E18E39D}"/>
               </a:ext>
             </a:extLst>
           </p:cNvPr>
@@ -6776,7 +7181,7 @@
           <a:p>
             <a:r>
               <a:rPr lang="en-NZ" sz="3200" dirty="0"/>
-              <a:t>Hard to create an ideal password</a:t>
+              <a:t>Hard to create a complex password</a:t>
             </a:r>
           </a:p>
           <a:p>
@@ -6786,10 +7191,10 @@
       </p:sp>
       <p:pic>
         <p:nvPicPr>
-          <p:cNvPr id="5" name="图片 4">
+          <p:cNvPr id="9" name="图片 8">
             <a:extLst>
               <a:ext uri="{FF2B5EF4-FFF2-40B4-BE49-F238E27FC236}">
-                <a16:creationId xmlns:a16="http://schemas.microsoft.com/office/drawing/2014/main" xmlns="" id="{FD0FF263-82E7-8F18-CDC3-B5F66EC461C5}"/>
+                <a16:creationId xmlns:a16="http://schemas.microsoft.com/office/drawing/2014/main" id="{FF651C45-FDCD-6C22-94A4-F7073AFDB5F7}"/>
               </a:ext>
             </a:extLst>
           </p:cNvPr>
@@ -6802,7 +7207,7 @@
           <a:blip r:embed="rId2">
             <a:extLst>
               <a:ext uri="{28A0092B-C50C-407E-A947-70E740481C1C}">
-                <a14:useLocalDpi xmlns:a14="http://schemas.microsoft.com/office/drawing/2010/main" xmlns="" val="0"/>
+                <a14:useLocalDpi xmlns:a14="http://schemas.microsoft.com/office/drawing/2010/main" val="0"/>
               </a:ext>
             </a:extLst>
           </a:blip>
@@ -6812,116 +7217,8 @@
         </p:blipFill>
         <p:spPr>
           <a:xfrm>
-            <a:off x="607996" y="2747958"/>
-            <a:ext cx="4562508" cy="681042"/>
-          </a:xfrm>
-          <a:prstGeom prst="rect">
-            <a:avLst/>
-          </a:prstGeom>
-        </p:spPr>
-      </p:pic>
-      <p:pic>
-        <p:nvPicPr>
-          <p:cNvPr id="7" name="图片 6">
-            <a:extLst>
-              <a:ext uri="{FF2B5EF4-FFF2-40B4-BE49-F238E27FC236}">
-                <a16:creationId xmlns:a16="http://schemas.microsoft.com/office/drawing/2014/main" xmlns="" id="{B6D4D5DA-1838-0E59-1374-8C6526271A56}"/>
-              </a:ext>
-            </a:extLst>
-          </p:cNvPr>
-          <p:cNvPicPr>
-            <a:picLocks noChangeAspect="1"/>
-          </p:cNvPicPr>
-          <p:nvPr/>
-        </p:nvPicPr>
-        <p:blipFill>
-          <a:blip r:embed="rId3">
-            <a:extLst>
-              <a:ext uri="{28A0092B-C50C-407E-A947-70E740481C1C}">
-                <a14:useLocalDpi xmlns:a14="http://schemas.microsoft.com/office/drawing/2010/main" xmlns="" val="0"/>
-              </a:ext>
-            </a:extLst>
-          </a:blip>
-          <a:stretch>
-            <a:fillRect/>
-          </a:stretch>
-        </p:blipFill>
-        <p:spPr>
-          <a:xfrm>
-            <a:off x="1112027" y="4220342"/>
-            <a:ext cx="3231373" cy="1859783"/>
-          </a:xfrm>
-          <a:prstGeom prst="rect">
-            <a:avLst/>
-          </a:prstGeom>
-        </p:spPr>
-      </p:pic>
-      <p:pic>
-        <p:nvPicPr>
-          <p:cNvPr id="9" name="图片 8">
-            <a:extLst>
-              <a:ext uri="{FF2B5EF4-FFF2-40B4-BE49-F238E27FC236}">
-                <a16:creationId xmlns:a16="http://schemas.microsoft.com/office/drawing/2014/main" xmlns="" id="{FF651C45-FDCD-6C22-94A4-F7073AFDB5F7}"/>
-              </a:ext>
-            </a:extLst>
-          </p:cNvPr>
-          <p:cNvPicPr>
-            <a:picLocks noChangeAspect="1"/>
-          </p:cNvPicPr>
-          <p:nvPr/>
-        </p:nvPicPr>
-        <p:blipFill>
-          <a:blip r:embed="rId4">
-            <a:extLst>
-              <a:ext uri="{28A0092B-C50C-407E-A947-70E740481C1C}">
-                <a14:useLocalDpi xmlns:a14="http://schemas.microsoft.com/office/drawing/2010/main" xmlns="" val="0"/>
-              </a:ext>
-            </a:extLst>
-          </a:blip>
-          <a:stretch>
-            <a:fillRect/>
-          </a:stretch>
-        </p:blipFill>
-        <p:spPr>
-          <a:xfrm>
-            <a:off x="5740328" y="2597150"/>
-            <a:ext cx="4113938" cy="1478368"/>
-          </a:xfrm>
-          <a:prstGeom prst="rect">
-            <a:avLst/>
-          </a:prstGeom>
-        </p:spPr>
-      </p:pic>
-      <p:pic>
-        <p:nvPicPr>
-          <p:cNvPr id="11" name="图片 10">
-            <a:extLst>
-              <a:ext uri="{FF2B5EF4-FFF2-40B4-BE49-F238E27FC236}">
-                <a16:creationId xmlns:a16="http://schemas.microsoft.com/office/drawing/2014/main" xmlns="" id="{9773E204-33CE-964E-0098-1E0F62D66402}"/>
-              </a:ext>
-            </a:extLst>
-          </p:cNvPr>
-          <p:cNvPicPr>
-            <a:picLocks noChangeAspect="1"/>
-          </p:cNvPicPr>
-          <p:nvPr/>
-        </p:nvPicPr>
-        <p:blipFill>
-          <a:blip r:embed="rId5">
-            <a:extLst>
-              <a:ext uri="{28A0092B-C50C-407E-A947-70E740481C1C}">
-                <a14:useLocalDpi xmlns:a14="http://schemas.microsoft.com/office/drawing/2010/main" xmlns="" val="0"/>
-              </a:ext>
-            </a:extLst>
-          </a:blip>
-          <a:stretch>
-            <a:fillRect/>
-          </a:stretch>
-        </p:blipFill>
-        <p:spPr>
-          <a:xfrm>
-            <a:off x="6041231" y="4135765"/>
-            <a:ext cx="3477419" cy="2357110"/>
+            <a:off x="124422" y="2597149"/>
+            <a:ext cx="9729844" cy="3496477"/>
           </a:xfrm>
           <a:prstGeom prst="rect">
             <a:avLst/>
@@ -6931,7 +7228,7 @@
     </p:spTree>
     <p:extLst>
       <p:ext uri="{BB962C8B-B14F-4D97-AF65-F5344CB8AC3E}">
-        <p14:creationId xmlns:p14="http://schemas.microsoft.com/office/powerpoint/2010/main" xmlns="" val="2552742250"/>
+        <p14:creationId xmlns:p14="http://schemas.microsoft.com/office/powerpoint/2010/main" val="1071497059"/>
       </p:ext>
     </p:extLst>
   </p:cSld>
@@ -6963,7 +7260,7 @@
           <p:cNvPr id="2" name="标题 1">
             <a:extLst>
               <a:ext uri="{FF2B5EF4-FFF2-40B4-BE49-F238E27FC236}">
-                <a16:creationId xmlns:a16="http://schemas.microsoft.com/office/drawing/2014/main" xmlns="" id="{1C26FFD8-8C79-58A2-F8D7-E748D28C4407}"/>
+                <a16:creationId xmlns:a16="http://schemas.microsoft.com/office/drawing/2014/main" id="{FCD0B3A6-F68D-1E92-C281-AEDB26248FFD}"/>
               </a:ext>
             </a:extLst>
           </p:cNvPr>
@@ -6982,8 +7279,11 @@
           <a:lstStyle/>
           <a:p>
             <a:r>
-              <a:rPr lang="en-NZ" sz="2400" dirty="0"/>
-              <a:t>Why we choose this project</a:t>
+              <a:rPr lang="en-NZ" sz="2400" dirty="0">
+                <a:latin typeface="Times New Roman" panose="02020603050405020304" pitchFamily="18" charset="0"/>
+                <a:cs typeface="Times New Roman" panose="02020603050405020304" pitchFamily="18" charset="0"/>
+              </a:rPr>
+              <a:t>Why we chose this project</a:t>
             </a:r>
           </a:p>
         </p:txBody>
@@ -6993,7 +7293,7 @@
           <p:cNvPr id="3" name="内容占位符 2">
             <a:extLst>
               <a:ext uri="{FF2B5EF4-FFF2-40B4-BE49-F238E27FC236}">
-                <a16:creationId xmlns:a16="http://schemas.microsoft.com/office/drawing/2014/main" xmlns="" id="{41F1D2A7-5294-7557-9EB3-8D491A63F4EB}"/>
+                <a16:creationId xmlns:a16="http://schemas.microsoft.com/office/drawing/2014/main" id="{78485416-BC42-8064-E043-36117E18E39D}"/>
               </a:ext>
             </a:extLst>
           </p:cNvPr>
@@ -7004,12 +7304,104 @@
             <p:ph idx="1"/>
           </p:nvPr>
         </p:nvSpPr>
-        <p:spPr>
-          <a:xfrm>
-            <a:off x="838200" y="1825626"/>
-            <a:ext cx="6991350" cy="460376"/>
-          </a:xfrm>
-        </p:spPr>
+        <p:spPr/>
+        <p:txBody>
+          <a:bodyPr/>
+          <a:lstStyle/>
+          <a:p>
+            <a:r>
+              <a:rPr lang="en-NZ" sz="3200" dirty="0"/>
+              <a:t>Hard to create a complex password</a:t>
+            </a:r>
+          </a:p>
+          <a:p>
+            <a:endParaRPr lang="en-NZ" dirty="0"/>
+          </a:p>
+        </p:txBody>
+      </p:sp>
+      <p:pic>
+        <p:nvPicPr>
+          <p:cNvPr id="11" name="图片 10">
+            <a:extLst>
+              <a:ext uri="{FF2B5EF4-FFF2-40B4-BE49-F238E27FC236}">
+                <a16:creationId xmlns:a16="http://schemas.microsoft.com/office/drawing/2014/main" id="{9773E204-33CE-964E-0098-1E0F62D66402}"/>
+              </a:ext>
+            </a:extLst>
+          </p:cNvPr>
+          <p:cNvPicPr>
+            <a:picLocks noChangeAspect="1"/>
+          </p:cNvPicPr>
+          <p:nvPr/>
+        </p:nvPicPr>
+        <p:blipFill>
+          <a:blip r:embed="rId2">
+            <a:extLst>
+              <a:ext uri="{28A0092B-C50C-407E-A947-70E740481C1C}">
+                <a14:useLocalDpi xmlns:a14="http://schemas.microsoft.com/office/drawing/2010/main" val="0"/>
+              </a:ext>
+            </a:extLst>
+          </a:blip>
+          <a:stretch>
+            <a:fillRect/>
+          </a:stretch>
+        </p:blipFill>
+        <p:spPr>
+          <a:xfrm>
+            <a:off x="1428750" y="2764919"/>
+            <a:ext cx="8413749" cy="3590925"/>
+          </a:xfrm>
+          <a:prstGeom prst="rect">
+            <a:avLst/>
+          </a:prstGeom>
+        </p:spPr>
+      </p:pic>
+    </p:spTree>
+    <p:extLst>
+      <p:ext uri="{BB962C8B-B14F-4D97-AF65-F5344CB8AC3E}">
+        <p14:creationId xmlns:p14="http://schemas.microsoft.com/office/powerpoint/2010/main" val="2552742250"/>
+      </p:ext>
+    </p:extLst>
+  </p:cSld>
+  <p:clrMapOvr>
+    <a:masterClrMapping/>
+  </p:clrMapOvr>
+</p:sld>
+</file>
+
+<file path=ppt/slides/slide6.xml><?xml version="1.0" encoding="utf-8"?>
+<p:sld xmlns:a="http://schemas.openxmlformats.org/drawingml/2006/main" xmlns:r="http://schemas.openxmlformats.org/officeDocument/2006/relationships" xmlns:p="http://schemas.openxmlformats.org/presentationml/2006/main">
+  <p:cSld>
+    <p:spTree>
+      <p:nvGrpSpPr>
+        <p:cNvPr id="1" name=""/>
+        <p:cNvGrpSpPr/>
+        <p:nvPr/>
+      </p:nvGrpSpPr>
+      <p:grpSpPr>
+        <a:xfrm>
+          <a:off x="0" y="0"/>
+          <a:ext cx="0" cy="0"/>
+          <a:chOff x="0" y="0"/>
+          <a:chExt cx="0" cy="0"/>
+        </a:xfrm>
+      </p:grpSpPr>
+      <p:sp>
+        <p:nvSpPr>
+          <p:cNvPr id="2" name="标题 1">
+            <a:extLst>
+              <a:ext uri="{FF2B5EF4-FFF2-40B4-BE49-F238E27FC236}">
+                <a16:creationId xmlns:a16="http://schemas.microsoft.com/office/drawing/2014/main" id="{1C26FFD8-8C79-58A2-F8D7-E748D28C4407}"/>
+              </a:ext>
+            </a:extLst>
+          </p:cNvPr>
+          <p:cNvSpPr>
+            <a:spLocks noGrp="1"/>
+          </p:cNvSpPr>
+          <p:nvPr>
+            <p:ph type="title"/>
+          </p:nvPr>
+        </p:nvSpPr>
+        <p:spPr/>
         <p:txBody>
           <a:bodyPr>
             <a:normAutofit/>
@@ -7017,8 +7409,43 @@
           <a:lstStyle/>
           <a:p>
             <a:r>
+              <a:rPr lang="en-NZ" sz="2400" dirty="0"/>
+              <a:t>Why we chose this project</a:t>
+            </a:r>
+          </a:p>
+        </p:txBody>
+      </p:sp>
+      <p:sp>
+        <p:nvSpPr>
+          <p:cNvPr id="3" name="内容占位符 2">
+            <a:extLst>
+              <a:ext uri="{FF2B5EF4-FFF2-40B4-BE49-F238E27FC236}">
+                <a16:creationId xmlns:a16="http://schemas.microsoft.com/office/drawing/2014/main" id="{41F1D2A7-5294-7557-9EB3-8D491A63F4EB}"/>
+              </a:ext>
+            </a:extLst>
+          </p:cNvPr>
+          <p:cNvSpPr>
+            <a:spLocks noGrp="1"/>
+          </p:cNvSpPr>
+          <p:nvPr>
+            <p:ph idx="1"/>
+          </p:nvPr>
+        </p:nvSpPr>
+        <p:spPr>
+          <a:xfrm>
+            <a:off x="838200" y="1825626"/>
+            <a:ext cx="6991350" cy="460376"/>
+          </a:xfrm>
+        </p:spPr>
+        <p:txBody>
+          <a:bodyPr>
+            <a:normAutofit/>
+          </a:bodyPr>
+          <a:lstStyle/>
+          <a:p>
+            <a:r>
               <a:rPr lang="en-NZ" dirty="0"/>
-              <a:t>Unlikely to create a strong password</a:t>
+              <a:t>Users often create simple passwords like these</a:t>
             </a:r>
           </a:p>
         </p:txBody>
@@ -7028,7 +7455,7 @@
           <p:cNvPr id="4" name="内容占位符 2">
             <a:extLst>
               <a:ext uri="{FF2B5EF4-FFF2-40B4-BE49-F238E27FC236}">
-                <a16:creationId xmlns:a16="http://schemas.microsoft.com/office/drawing/2014/main" xmlns="" id="{4FF7128B-6B50-FCD4-9C75-80B7963E49CE}"/>
+                <a16:creationId xmlns:a16="http://schemas.microsoft.com/office/drawing/2014/main" id="{4FF7128B-6B50-FCD4-9C75-80B7963E49CE}"/>
               </a:ext>
             </a:extLst>
           </p:cNvPr>
@@ -7227,7 +7654,7 @@
           <p:cNvPr id="6" name="内容占位符 2">
             <a:extLst>
               <a:ext uri="{FF2B5EF4-FFF2-40B4-BE49-F238E27FC236}">
-                <a16:creationId xmlns:a16="http://schemas.microsoft.com/office/drawing/2014/main" xmlns="" id="{F12022C7-B80B-2281-9B7A-0C3246F09551}"/>
+                <a16:creationId xmlns:a16="http://schemas.microsoft.com/office/drawing/2014/main" id="{F12022C7-B80B-2281-9B7A-0C3246F09551}"/>
               </a:ext>
             </a:extLst>
           </p:cNvPr>
@@ -7435,7 +7862,7 @@
           <p:cNvPr id="8" name="内容占位符 2">
             <a:extLst>
               <a:ext uri="{FF2B5EF4-FFF2-40B4-BE49-F238E27FC236}">
-                <a16:creationId xmlns:a16="http://schemas.microsoft.com/office/drawing/2014/main" xmlns="" id="{764F7FE3-0392-CCF7-AAD7-C83EF28C73C9}"/>
+                <a16:creationId xmlns:a16="http://schemas.microsoft.com/office/drawing/2014/main" id="{764F7FE3-0392-CCF7-AAD7-C83EF28C73C9}"/>
               </a:ext>
             </a:extLst>
           </p:cNvPr>
@@ -7446,7 +7873,7 @@
         </p:nvSpPr>
         <p:spPr>
           <a:xfrm>
-            <a:off x="1454150" y="3352803"/>
+            <a:off x="1454150" y="3338510"/>
             <a:ext cx="6991350" cy="460375"/>
           </a:xfrm>
           <a:prstGeom prst="rect">
@@ -7632,161 +8059,7 @@
     </p:spTree>
     <p:extLst>
       <p:ext uri="{BB962C8B-B14F-4D97-AF65-F5344CB8AC3E}">
-        <p14:creationId xmlns:p14="http://schemas.microsoft.com/office/powerpoint/2010/main" xmlns="" val="244496848"/>
-      </p:ext>
-    </p:extLst>
-  </p:cSld>
-  <p:clrMapOvr>
-    <a:masterClrMapping/>
-  </p:clrMapOvr>
-</p:sld>
-</file>
-
-<file path=ppt/slides/slide6.xml><?xml version="1.0" encoding="utf-8"?>
-<p:sld xmlns:a="http://schemas.openxmlformats.org/drawingml/2006/main" xmlns:r="http://schemas.openxmlformats.org/officeDocument/2006/relationships" xmlns:p="http://schemas.openxmlformats.org/presentationml/2006/main">
-  <p:cSld>
-    <p:spTree>
-      <p:nvGrpSpPr>
-        <p:cNvPr id="1" name=""/>
-        <p:cNvGrpSpPr/>
-        <p:nvPr/>
-      </p:nvGrpSpPr>
-      <p:grpSpPr>
-        <a:xfrm>
-          <a:off x="0" y="0"/>
-          <a:ext cx="0" cy="0"/>
-          <a:chOff x="0" y="0"/>
-          <a:chExt cx="0" cy="0"/>
-        </a:xfrm>
-      </p:grpSpPr>
-      <p:sp>
-        <p:nvSpPr>
-          <p:cNvPr id="7" name="标题 6">
-            <a:extLst>
-              <a:ext uri="{FF2B5EF4-FFF2-40B4-BE49-F238E27FC236}">
-                <a16:creationId xmlns:a16="http://schemas.microsoft.com/office/drawing/2014/main" xmlns="" id="{CD83F32C-8A6B-5F30-3947-35CFC8F07AD6}"/>
-              </a:ext>
-            </a:extLst>
-          </p:cNvPr>
-          <p:cNvSpPr>
-            <a:spLocks noGrp="1"/>
-          </p:cNvSpPr>
-          <p:nvPr>
-            <p:ph type="title"/>
-          </p:nvPr>
-        </p:nvSpPr>
-        <p:spPr>
-          <a:xfrm>
-            <a:off x="184150" y="831850"/>
-            <a:ext cx="10515600" cy="1320800"/>
-          </a:xfrm>
-        </p:spPr>
-        <p:txBody>
-          <a:bodyPr>
-            <a:normAutofit/>
-          </a:bodyPr>
-          <a:lstStyle/>
-          <a:p>
-            <a:endParaRPr lang="en-NZ" sz="1800" dirty="0">
-              <a:latin typeface="Times New Roman" panose="02020603050405020304" pitchFamily="18" charset="0"/>
-              <a:cs typeface="Times New Roman" panose="02020603050405020304" pitchFamily="18" charset="0"/>
-            </a:endParaRPr>
-          </a:p>
-        </p:txBody>
-      </p:sp>
-      <p:pic>
-        <p:nvPicPr>
-          <p:cNvPr id="5" name="内容占位符 4">
-            <a:extLst>
-              <a:ext uri="{FF2B5EF4-FFF2-40B4-BE49-F238E27FC236}">
-                <a16:creationId xmlns:a16="http://schemas.microsoft.com/office/drawing/2014/main" xmlns="" id="{A72F22B4-E4AA-DED2-4FE8-84589D8E0072}"/>
-              </a:ext>
-            </a:extLst>
-          </p:cNvPr>
-          <p:cNvPicPr>
-            <a:picLocks noGrp="1" noChangeAspect="1"/>
-          </p:cNvPicPr>
-          <p:nvPr>
-            <p:ph idx="1"/>
-          </p:nvPr>
-        </p:nvPicPr>
-        <p:blipFill>
-          <a:blip r:embed="rId2">
-            <a:extLst>
-              <a:ext uri="{28A0092B-C50C-407E-A947-70E740481C1C}">
-                <a14:useLocalDpi xmlns:a14="http://schemas.microsoft.com/office/drawing/2010/main" xmlns="" val="0"/>
-              </a:ext>
-            </a:extLst>
-          </a:blip>
-          <a:stretch>
-            <a:fillRect/>
-          </a:stretch>
-        </p:blipFill>
-        <p:spPr>
-          <a:xfrm>
-            <a:off x="1162050" y="436458"/>
-            <a:ext cx="10064750" cy="5243344"/>
-          </a:xfrm>
-        </p:spPr>
-      </p:pic>
-      <p:sp>
-        <p:nvSpPr>
-          <p:cNvPr id="8" name="文本框 7">
-            <a:extLst>
-              <a:ext uri="{FF2B5EF4-FFF2-40B4-BE49-F238E27FC236}">
-                <a16:creationId xmlns:a16="http://schemas.microsoft.com/office/drawing/2014/main" xmlns="" id="{848B05F5-64E6-7B36-6AD3-7E4F7830C95F}"/>
-              </a:ext>
-            </a:extLst>
-          </p:cNvPr>
-          <p:cNvSpPr txBox="1"/>
-          <p:nvPr/>
-        </p:nvSpPr>
-        <p:spPr>
-          <a:xfrm>
-            <a:off x="1435100" y="5975769"/>
-            <a:ext cx="9791700" cy="369332"/>
-          </a:xfrm>
-          <a:prstGeom prst="rect">
-            <a:avLst/>
-          </a:prstGeom>
-          <a:noFill/>
-        </p:spPr>
-        <p:txBody>
-          <a:bodyPr wrap="square" rtlCol="0">
-            <a:spAutoFit/>
-          </a:bodyPr>
-          <a:lstStyle/>
-          <a:p>
-            <a:r>
-              <a:rPr lang="en-NZ" sz="1800" dirty="0" err="1">
-                <a:latin typeface="Times New Roman" panose="02020603050405020304" pitchFamily="18" charset="0"/>
-                <a:cs typeface="Times New Roman" panose="02020603050405020304" pitchFamily="18" charset="0"/>
-              </a:rPr>
-              <a:t>Retrived</a:t>
-            </a:r>
-            <a:r>
-              <a:rPr lang="en-NZ" sz="1800" dirty="0">
-                <a:latin typeface="Times New Roman" panose="02020603050405020304" pitchFamily="18" charset="0"/>
-                <a:cs typeface="Times New Roman" panose="02020603050405020304" pitchFamily="18" charset="0"/>
-              </a:rPr>
-              <a:t> from: </a:t>
-            </a:r>
-            <a:r>
-              <a:rPr lang="en-NZ" sz="1800" dirty="0">
-                <a:latin typeface="Times New Roman" panose="02020603050405020304" pitchFamily="18" charset="0"/>
-                <a:cs typeface="Times New Roman" panose="02020603050405020304" pitchFamily="18" charset="0"/>
-                <a:hlinkClick r:id="rId3"/>
-              </a:rPr>
-              <a:t>List of the most common passwords - Wikipedia</a:t>
-            </a:r>
-            <a:endParaRPr lang="en-NZ" dirty="0"/>
-          </a:p>
-        </p:txBody>
-      </p:sp>
-    </p:spTree>
-    <p:extLst>
-      <p:ext uri="{BB962C8B-B14F-4D97-AF65-F5344CB8AC3E}">
-        <p14:creationId xmlns:p14="http://schemas.microsoft.com/office/powerpoint/2010/main" xmlns="" val="4200007885"/>
+        <p14:creationId xmlns:p14="http://schemas.microsoft.com/office/powerpoint/2010/main" val="244496848"/>
       </p:ext>
     </p:extLst>
   </p:cSld>
@@ -7815,10 +8088,10 @@
       </p:grpSpPr>
       <p:sp>
         <p:nvSpPr>
-          <p:cNvPr id="2" name="标题 1">
+          <p:cNvPr id="7" name="标题 6">
             <a:extLst>
               <a:ext uri="{FF2B5EF4-FFF2-40B4-BE49-F238E27FC236}">
-                <a16:creationId xmlns:a16="http://schemas.microsoft.com/office/drawing/2014/main" xmlns="" id="{B3F13335-104A-015E-3032-EACBD2BEBA00}"/>
+                <a16:creationId xmlns:a16="http://schemas.microsoft.com/office/drawing/2014/main" id="{CD83F32C-8A6B-5F30-3947-35CFC8F07AD6}"/>
               </a:ext>
             </a:extLst>
           </p:cNvPr>
@@ -7829,15 +8102,22 @@
             <p:ph type="title"/>
           </p:nvPr>
         </p:nvSpPr>
-        <p:spPr/>
-        <p:txBody>
-          <a:bodyPr/>
-          <a:lstStyle/>
-          <a:p>
-            <a:r>
-              <a:rPr lang="en-NZ" dirty="0"/>
-              <a:t>Risks of password leaking</a:t>
-            </a:r>
+        <p:spPr>
+          <a:xfrm>
+            <a:off x="184150" y="831850"/>
+            <a:ext cx="10515600" cy="1320800"/>
+          </a:xfrm>
+        </p:spPr>
+        <p:txBody>
+          <a:bodyPr>
+            <a:normAutofit/>
+          </a:bodyPr>
+          <a:lstStyle/>
+          <a:p>
+            <a:endParaRPr lang="en-NZ" sz="1800" dirty="0">
+              <a:latin typeface="Times New Roman" panose="02020603050405020304" pitchFamily="18" charset="0"/>
+              <a:cs typeface="Times New Roman" panose="02020603050405020304" pitchFamily="18" charset="0"/>
+            </a:endParaRPr>
           </a:p>
         </p:txBody>
       </p:sp>
@@ -7846,7 +8126,7 @@
           <p:cNvPr id="5" name="内容占位符 4">
             <a:extLst>
               <a:ext uri="{FF2B5EF4-FFF2-40B4-BE49-F238E27FC236}">
-                <a16:creationId xmlns:a16="http://schemas.microsoft.com/office/drawing/2014/main" xmlns="" id="{37CA7186-F461-8768-6AB0-EDB502334978}"/>
+                <a16:creationId xmlns:a16="http://schemas.microsoft.com/office/drawing/2014/main" id="{A72F22B4-E4AA-DED2-4FE8-84589D8E0072}"/>
               </a:ext>
             </a:extLst>
           </p:cNvPr>
@@ -7858,10 +8138,10 @@
           </p:nvPr>
         </p:nvPicPr>
         <p:blipFill>
-          <a:blip r:embed="rId2" cstate="print">
+          <a:blip r:embed="rId2">
             <a:extLst>
               <a:ext uri="{28A0092B-C50C-407E-A947-70E740481C1C}">
-                <a14:useLocalDpi xmlns:a14="http://schemas.microsoft.com/office/drawing/2010/main" xmlns="" val="0"/>
+                <a14:useLocalDpi xmlns:a14="http://schemas.microsoft.com/office/drawing/2010/main" val="0"/>
               </a:ext>
             </a:extLst>
           </a:blip>
@@ -7871,92 +8151,17 @@
         </p:blipFill>
         <p:spPr>
           <a:xfrm>
-            <a:off x="5999984" y="2136775"/>
-            <a:ext cx="4192532" cy="4024313"/>
+            <a:off x="1162050" y="436458"/>
+            <a:ext cx="10064750" cy="5243344"/>
           </a:xfrm>
         </p:spPr>
       </p:pic>
       <p:sp>
         <p:nvSpPr>
-          <p:cNvPr id="6" name="标题 1">
+          <p:cNvPr id="8" name="文本框 7">
             <a:extLst>
               <a:ext uri="{FF2B5EF4-FFF2-40B4-BE49-F238E27FC236}">
-                <a16:creationId xmlns:a16="http://schemas.microsoft.com/office/drawing/2014/main" xmlns="" id="{C81291C8-DC21-C98A-E80F-705776E3EB74}"/>
-              </a:ext>
-            </a:extLst>
-          </p:cNvPr>
-          <p:cNvSpPr txBox="1">
-            <a:spLocks/>
-          </p:cNvSpPr>
-          <p:nvPr/>
-        </p:nvSpPr>
-        <p:spPr>
-          <a:xfrm>
-            <a:off x="590550" y="1577975"/>
-            <a:ext cx="5334000" cy="5032375"/>
-          </a:xfrm>
-          <a:prstGeom prst="rect">
-            <a:avLst/>
-          </a:prstGeom>
-        </p:spPr>
-        <p:txBody>
-          <a:bodyPr vert="horz" lIns="91440" tIns="45720" rIns="91440" bIns="45720" rtlCol="0" anchor="ctr">
-            <a:normAutofit/>
-          </a:bodyPr>
-          <a:lstStyle>
-            <a:lvl1pPr algn="l" defTabSz="914400" rtl="0" eaLnBrk="1" latinLnBrk="0" hangingPunct="1">
-              <a:lnSpc>
-                <a:spcPct val="90000"/>
-              </a:lnSpc>
-              <a:spcBef>
-                <a:spcPct val="0"/>
-              </a:spcBef>
-              <a:buNone/>
-              <a:defRPr sz="4400" kern="1200">
-                <a:solidFill>
-                  <a:schemeClr val="tx1"/>
-                </a:solidFill>
-                <a:latin typeface="+mj-lt"/>
-                <a:ea typeface="+mj-ea"/>
-                <a:cs typeface="+mj-cs"/>
-              </a:defRPr>
-            </a:lvl1pPr>
-          </a:lstStyle>
-          <a:p>
-            <a:r>
-              <a:rPr lang="en-NZ" sz="2800" dirty="0">
-                <a:latin typeface="Times New Roman" panose="02020603050405020304" pitchFamily="18" charset="0"/>
-                <a:cs typeface="Times New Roman" panose="02020603050405020304" pitchFamily="18" charset="0"/>
-              </a:rPr>
-              <a:t>1. Private information exposure</a:t>
-            </a:r>
-          </a:p>
-          <a:p>
-            <a:r>
-              <a:rPr lang="en-NZ" sz="2800" dirty="0">
-                <a:latin typeface="Times New Roman" panose="02020603050405020304" pitchFamily="18" charset="0"/>
-                <a:cs typeface="Times New Roman" panose="02020603050405020304" pitchFamily="18" charset="0"/>
-              </a:rPr>
-              <a:t>2. Money loss</a:t>
-            </a:r>
-          </a:p>
-          <a:p>
-            <a:r>
-              <a:rPr lang="en-NZ" sz="2800" dirty="0">
-                <a:latin typeface="Times New Roman" panose="02020603050405020304" pitchFamily="18" charset="0"/>
-                <a:cs typeface="Times New Roman" panose="02020603050405020304" pitchFamily="18" charset="0"/>
-              </a:rPr>
-              <a:t>3. Risks of ID frauds</a:t>
-            </a:r>
-          </a:p>
-        </p:txBody>
-      </p:sp>
-      <p:sp>
-        <p:nvSpPr>
-          <p:cNvPr id="7" name="文本框 6">
-            <a:extLst>
-              <a:ext uri="{FF2B5EF4-FFF2-40B4-BE49-F238E27FC236}">
-                <a16:creationId xmlns:a16="http://schemas.microsoft.com/office/drawing/2014/main" xmlns="" id="{5A115FD7-B5F6-D919-5860-BD9C52F64019}"/>
+                <a16:creationId xmlns:a16="http://schemas.microsoft.com/office/drawing/2014/main" id="{848B05F5-64E6-7B36-6AD3-7E4F7830C95F}"/>
               </a:ext>
             </a:extLst>
           </p:cNvPr>
@@ -7965,8 +8170,8 @@
         </p:nvSpPr>
         <p:spPr>
           <a:xfrm>
-            <a:off x="1016000" y="6470651"/>
-            <a:ext cx="10204450" cy="369332"/>
+            <a:off x="1435100" y="5975769"/>
+            <a:ext cx="9791700" cy="369332"/>
           </a:xfrm>
           <a:prstGeom prst="rect">
             <a:avLst/>
@@ -7980,38 +8185,35 @@
           <a:lstStyle/>
           <a:p>
             <a:r>
-              <a:rPr lang="en-NZ" dirty="0" err="1">
+              <a:rPr lang="en-NZ" sz="1800" dirty="0" err="1">
                 <a:latin typeface="Times New Roman" panose="02020603050405020304" pitchFamily="18" charset="0"/>
                 <a:cs typeface="Times New Roman" panose="02020603050405020304" pitchFamily="18" charset="0"/>
               </a:rPr>
               <a:t>Retrived</a:t>
             </a:r>
             <a:r>
-              <a:rPr lang="en-NZ" dirty="0">
+              <a:rPr lang="en-NZ" sz="1800" dirty="0">
                 <a:latin typeface="Times New Roman" panose="02020603050405020304" pitchFamily="18" charset="0"/>
                 <a:cs typeface="Times New Roman" panose="02020603050405020304" pitchFamily="18" charset="0"/>
               </a:rPr>
-              <a:t> from:</a:t>
-            </a:r>
-            <a:r>
-              <a:rPr lang="en-NZ" dirty="0">
+              <a:t> from: </a:t>
+            </a:r>
+            <a:r>
+              <a:rPr lang="en-NZ" sz="1800" dirty="0">
                 <a:latin typeface="Times New Roman" panose="02020603050405020304" pitchFamily="18" charset="0"/>
                 <a:cs typeface="Times New Roman" panose="02020603050405020304" pitchFamily="18" charset="0"/>
                 <a:hlinkClick r:id="rId3"/>
               </a:rPr>
-              <a:t> Change your password NOW! 15 million Plex passwords stolen by hackers | Express.co.uk</a:t>
-            </a:r>
-            <a:endParaRPr lang="en-NZ" dirty="0">
-              <a:latin typeface="Times New Roman" panose="02020603050405020304" pitchFamily="18" charset="0"/>
-              <a:cs typeface="Times New Roman" panose="02020603050405020304" pitchFamily="18" charset="0"/>
-            </a:endParaRPr>
+              <a:t>List of the most common passwords - Wikipedia</a:t>
+            </a:r>
+            <a:endParaRPr lang="en-NZ" dirty="0"/>
           </a:p>
         </p:txBody>
       </p:sp>
     </p:spTree>
     <p:extLst>
       <p:ext uri="{BB962C8B-B14F-4D97-AF65-F5344CB8AC3E}">
-        <p14:creationId xmlns:p14="http://schemas.microsoft.com/office/powerpoint/2010/main" xmlns="" val="1039722178"/>
+        <p14:creationId xmlns:p14="http://schemas.microsoft.com/office/powerpoint/2010/main" val="4200007885"/>
       </p:ext>
     </p:extLst>
   </p:cSld>
@@ -8043,7 +8245,7 @@
           <p:cNvPr id="2" name="标题 1">
             <a:extLst>
               <a:ext uri="{FF2B5EF4-FFF2-40B4-BE49-F238E27FC236}">
-                <a16:creationId xmlns:a16="http://schemas.microsoft.com/office/drawing/2014/main" xmlns="" id="{03477B6E-72BF-255C-BEB8-DAC7203DD43E}"/>
+                <a16:creationId xmlns:a16="http://schemas.microsoft.com/office/drawing/2014/main" id="{B3F13335-104A-015E-3032-EACBD2BEBA00}"/>
               </a:ext>
             </a:extLst>
           </p:cNvPr>
@@ -8061,100 +8263,182 @@
           <a:p>
             <a:r>
               <a:rPr lang="en-NZ" dirty="0"/>
-              <a:t>Technologies</a:t>
-            </a:r>
-          </a:p>
-        </p:txBody>
-      </p:sp>
-      <p:sp>
-        <p:nvSpPr>
-          <p:cNvPr id="3" name="内容占位符 2">
+              <a:t>Risks of password leaking</a:t>
+            </a:r>
+          </a:p>
+        </p:txBody>
+      </p:sp>
+      <p:pic>
+        <p:nvPicPr>
+          <p:cNvPr id="5" name="内容占位符 4">
             <a:extLst>
               <a:ext uri="{FF2B5EF4-FFF2-40B4-BE49-F238E27FC236}">
-                <a16:creationId xmlns:a16="http://schemas.microsoft.com/office/drawing/2014/main" xmlns="" id="{B5BDCBB6-C660-4E0C-04B9-8784DABF995E}"/>
+                <a16:creationId xmlns:a16="http://schemas.microsoft.com/office/drawing/2014/main" id="{37CA7186-F461-8768-6AB0-EDB502334978}"/>
               </a:ext>
             </a:extLst>
           </p:cNvPr>
-          <p:cNvSpPr>
-            <a:spLocks noGrp="1"/>
-          </p:cNvSpPr>
+          <p:cNvPicPr>
+            <a:picLocks noGrp="1" noChangeAspect="1"/>
+          </p:cNvPicPr>
           <p:nvPr>
             <p:ph idx="1"/>
           </p:nvPr>
-        </p:nvSpPr>
-        <p:spPr/>
-        <p:txBody>
-          <a:bodyPr/>
-          <a:lstStyle/>
-          <a:p>
-            <a:r>
-              <a:rPr lang="en-NZ" sz="3200" dirty="0"/>
-              <a:t>Web base software</a:t>
-            </a:r>
-          </a:p>
-          <a:p>
-            <a:pPr lvl="1"/>
-            <a:r>
-              <a:rPr lang="en-NZ" dirty="0"/>
-              <a:t>Tools: Apache, Nodejs</a:t>
-            </a:r>
-          </a:p>
-          <a:p>
-            <a:pPr lvl="1"/>
-            <a:r>
-              <a:rPr lang="en-NZ" dirty="0"/>
-              <a:t>Modules: express, </a:t>
-            </a:r>
-            <a:r>
-              <a:rPr lang="en-NZ" dirty="0" err="1"/>
-              <a:t>ejs</a:t>
-            </a:r>
-            <a:r>
-              <a:rPr lang="en-NZ" dirty="0"/>
-              <a:t>, cookie-parser</a:t>
-            </a:r>
-          </a:p>
-          <a:p>
-            <a:pPr lvl="1"/>
-            <a:r>
-              <a:rPr lang="en-NZ" dirty="0"/>
-              <a:t>Languages: </a:t>
-            </a:r>
-            <a:r>
-              <a:rPr lang="en-NZ" dirty="0" err="1"/>
-              <a:t>Javascript</a:t>
-            </a:r>
-            <a:r>
-              <a:rPr lang="en-NZ" dirty="0"/>
-              <a:t>, </a:t>
-            </a:r>
-            <a:r>
-              <a:rPr lang="en-NZ" dirty="0" err="1"/>
-              <a:t>Javascript</a:t>
-            </a:r>
-            <a:r>
-              <a:rPr lang="en-NZ" dirty="0"/>
-              <a:t>( embedded ), Html, </a:t>
-            </a:r>
-            <a:r>
-              <a:rPr lang="en-NZ" dirty="0" err="1"/>
-              <a:t>css</a:t>
-            </a:r>
-            <a:endParaRPr lang="en-NZ" dirty="0"/>
-          </a:p>
-          <a:p>
-            <a:pPr lvl="1"/>
-            <a:r>
-              <a:rPr lang="en-NZ" dirty="0"/>
-              <a:t>Request method: POST / GET</a:t>
-            </a:r>
+        </p:nvPicPr>
+        <p:blipFill>
+          <a:blip r:embed="rId2" cstate="print">
+            <a:extLst>
+              <a:ext uri="{28A0092B-C50C-407E-A947-70E740481C1C}">
+                <a14:useLocalDpi xmlns:a14="http://schemas.microsoft.com/office/drawing/2010/main" val="0"/>
+              </a:ext>
+            </a:extLst>
+          </a:blip>
+          <a:stretch>
+            <a:fillRect/>
+          </a:stretch>
+        </p:blipFill>
+        <p:spPr>
+          <a:xfrm>
+            <a:off x="5999984" y="2136775"/>
+            <a:ext cx="4192532" cy="4024313"/>
+          </a:xfrm>
+        </p:spPr>
+      </p:pic>
+      <p:sp>
+        <p:nvSpPr>
+          <p:cNvPr id="6" name="标题 1">
+            <a:extLst>
+              <a:ext uri="{FF2B5EF4-FFF2-40B4-BE49-F238E27FC236}">
+                <a16:creationId xmlns:a16="http://schemas.microsoft.com/office/drawing/2014/main" id="{C81291C8-DC21-C98A-E80F-705776E3EB74}"/>
+              </a:ext>
+            </a:extLst>
+          </p:cNvPr>
+          <p:cNvSpPr txBox="1">
+            <a:spLocks/>
+          </p:cNvSpPr>
+          <p:nvPr/>
+        </p:nvSpPr>
+        <p:spPr>
+          <a:xfrm>
+            <a:off x="590550" y="1577975"/>
+            <a:ext cx="5334000" cy="5032375"/>
+          </a:xfrm>
+          <a:prstGeom prst="rect">
+            <a:avLst/>
+          </a:prstGeom>
+        </p:spPr>
+        <p:txBody>
+          <a:bodyPr vert="horz" lIns="91440" tIns="45720" rIns="91440" bIns="45720" rtlCol="0" anchor="ctr">
+            <a:normAutofit/>
+          </a:bodyPr>
+          <a:lstStyle>
+            <a:lvl1pPr algn="l" defTabSz="914400" rtl="0" eaLnBrk="1" latinLnBrk="0" hangingPunct="1">
+              <a:lnSpc>
+                <a:spcPct val="90000"/>
+              </a:lnSpc>
+              <a:spcBef>
+                <a:spcPct val="0"/>
+              </a:spcBef>
+              <a:buNone/>
+              <a:defRPr sz="4400" kern="1200">
+                <a:solidFill>
+                  <a:schemeClr val="tx1"/>
+                </a:solidFill>
+                <a:latin typeface="+mj-lt"/>
+                <a:ea typeface="+mj-ea"/>
+                <a:cs typeface="+mj-cs"/>
+              </a:defRPr>
+            </a:lvl1pPr>
+          </a:lstStyle>
+          <a:p>
+            <a:r>
+              <a:rPr lang="en-NZ" sz="2800" dirty="0">
+                <a:latin typeface="Times New Roman" panose="02020603050405020304" pitchFamily="18" charset="0"/>
+                <a:cs typeface="Times New Roman" panose="02020603050405020304" pitchFamily="18" charset="0"/>
+              </a:rPr>
+              <a:t>1. Private information exposure</a:t>
+            </a:r>
+          </a:p>
+          <a:p>
+            <a:r>
+              <a:rPr lang="en-NZ" sz="2800" dirty="0">
+                <a:latin typeface="Times New Roman" panose="02020603050405020304" pitchFamily="18" charset="0"/>
+                <a:cs typeface="Times New Roman" panose="02020603050405020304" pitchFamily="18" charset="0"/>
+              </a:rPr>
+              <a:t>2. Money loss</a:t>
+            </a:r>
+          </a:p>
+          <a:p>
+            <a:r>
+              <a:rPr lang="en-NZ" sz="2800" dirty="0">
+                <a:latin typeface="Times New Roman" panose="02020603050405020304" pitchFamily="18" charset="0"/>
+                <a:cs typeface="Times New Roman" panose="02020603050405020304" pitchFamily="18" charset="0"/>
+              </a:rPr>
+              <a:t>3. Risks of ID frauds</a:t>
+            </a:r>
+          </a:p>
+        </p:txBody>
+      </p:sp>
+      <p:sp>
+        <p:nvSpPr>
+          <p:cNvPr id="7" name="文本框 6">
+            <a:extLst>
+              <a:ext uri="{FF2B5EF4-FFF2-40B4-BE49-F238E27FC236}">
+                <a16:creationId xmlns:a16="http://schemas.microsoft.com/office/drawing/2014/main" id="{5A115FD7-B5F6-D919-5860-BD9C52F64019}"/>
+              </a:ext>
+            </a:extLst>
+          </p:cNvPr>
+          <p:cNvSpPr txBox="1"/>
+          <p:nvPr/>
+        </p:nvSpPr>
+        <p:spPr>
+          <a:xfrm>
+            <a:off x="1016000" y="6470651"/>
+            <a:ext cx="10204450" cy="369332"/>
+          </a:xfrm>
+          <a:prstGeom prst="rect">
+            <a:avLst/>
+          </a:prstGeom>
+          <a:noFill/>
+        </p:spPr>
+        <p:txBody>
+          <a:bodyPr wrap="square" rtlCol="0">
+            <a:spAutoFit/>
+          </a:bodyPr>
+          <a:lstStyle/>
+          <a:p>
+            <a:r>
+              <a:rPr lang="en-NZ" dirty="0" err="1">
+                <a:latin typeface="Times New Roman" panose="02020603050405020304" pitchFamily="18" charset="0"/>
+                <a:cs typeface="Times New Roman" panose="02020603050405020304" pitchFamily="18" charset="0"/>
+              </a:rPr>
+              <a:t>Retrived</a:t>
+            </a:r>
+            <a:r>
+              <a:rPr lang="en-NZ" dirty="0">
+                <a:latin typeface="Times New Roman" panose="02020603050405020304" pitchFamily="18" charset="0"/>
+                <a:cs typeface="Times New Roman" panose="02020603050405020304" pitchFamily="18" charset="0"/>
+              </a:rPr>
+              <a:t> from:</a:t>
+            </a:r>
+            <a:r>
+              <a:rPr lang="en-NZ" dirty="0">
+                <a:latin typeface="Times New Roman" panose="02020603050405020304" pitchFamily="18" charset="0"/>
+                <a:cs typeface="Times New Roman" panose="02020603050405020304" pitchFamily="18" charset="0"/>
+                <a:hlinkClick r:id="rId3"/>
+              </a:rPr>
+              <a:t> Change your password NOW! 15 million Plex passwords stolen by hackers | Express.co.uk</a:t>
+            </a:r>
+            <a:endParaRPr lang="en-NZ" dirty="0">
+              <a:latin typeface="Times New Roman" panose="02020603050405020304" pitchFamily="18" charset="0"/>
+              <a:cs typeface="Times New Roman" panose="02020603050405020304" pitchFamily="18" charset="0"/>
+            </a:endParaRPr>
           </a:p>
         </p:txBody>
       </p:sp>
     </p:spTree>
     <p:extLst>
       <p:ext uri="{BB962C8B-B14F-4D97-AF65-F5344CB8AC3E}">
-        <p14:creationId xmlns:p14="http://schemas.microsoft.com/office/powerpoint/2010/main" xmlns="" val="1522651155"/>
+        <p14:creationId xmlns:p14="http://schemas.microsoft.com/office/powerpoint/2010/main" val="1039722178"/>
       </p:ext>
     </p:extLst>
   </p:cSld>
@@ -8186,7 +8470,7 @@
           <p:cNvPr id="2" name="标题 1">
             <a:extLst>
               <a:ext uri="{FF2B5EF4-FFF2-40B4-BE49-F238E27FC236}">
-                <a16:creationId xmlns:a16="http://schemas.microsoft.com/office/drawing/2014/main" xmlns="" id="{594441FE-9332-F0E4-7AE1-3123F39EBF02}"/>
+                <a16:creationId xmlns:a16="http://schemas.microsoft.com/office/drawing/2014/main" id="{03477B6E-72BF-255C-BEB8-DAC7203DD43E}"/>
               </a:ext>
             </a:extLst>
           </p:cNvPr>
@@ -8204,7 +8488,7 @@
           <a:p>
             <a:r>
               <a:rPr lang="en-NZ" dirty="0"/>
-              <a:t>methodology</a:t>
+              <a:t>Technologies Used</a:t>
             </a:r>
           </a:p>
         </p:txBody>
@@ -8214,7 +8498,7 @@
           <p:cNvPr id="3" name="内容占位符 2">
             <a:extLst>
               <a:ext uri="{FF2B5EF4-FFF2-40B4-BE49-F238E27FC236}">
-                <a16:creationId xmlns:a16="http://schemas.microsoft.com/office/drawing/2014/main" xmlns="" id="{C1BFAA36-BAFA-2A56-98AB-CC6300CECA0C}"/>
+                <a16:creationId xmlns:a16="http://schemas.microsoft.com/office/drawing/2014/main" id="{B5BDCBB6-C660-4E0C-04B9-8784DABF995E}"/>
               </a:ext>
             </a:extLst>
           </p:cNvPr>
@@ -8225,314 +8509,66 @@
             <p:ph idx="1"/>
           </p:nvPr>
         </p:nvSpPr>
-        <p:spPr>
-          <a:xfrm>
-            <a:off x="685800" y="2194561"/>
-            <a:ext cx="5410200" cy="3082290"/>
-          </a:xfrm>
-        </p:spPr>
-        <p:txBody>
-          <a:bodyPr>
-            <a:normAutofit/>
-          </a:bodyPr>
-          <a:lstStyle/>
-          <a:p>
-            <a:r>
-              <a:rPr lang="en-NZ" sz="2800" dirty="0">
-                <a:effectLst/>
-                <a:latin typeface="Times New Roman" panose="02020603050405020304" pitchFamily="18" charset="0"/>
-                <a:cs typeface="Times New Roman" panose="02020603050405020304" pitchFamily="18" charset="0"/>
-              </a:rPr>
-              <a:t>4 reasons for  using waterfall methodology </a:t>
+        <p:spPr/>
+        <p:txBody>
+          <a:bodyPr/>
+          <a:lstStyle/>
+          <a:p>
+            <a:r>
+              <a:rPr lang="en-NZ" sz="3200" dirty="0"/>
+              <a:t>Web-based software</a:t>
             </a:r>
           </a:p>
           <a:p>
             <a:pPr lvl="1"/>
             <a:r>
-              <a:rPr lang="en-NZ" sz="2800" dirty="0">
-                <a:effectLst/>
-                <a:latin typeface="Times New Roman" panose="02020603050405020304" pitchFamily="18" charset="0"/>
-                <a:cs typeface="Times New Roman" panose="02020603050405020304" pitchFamily="18" charset="0"/>
-              </a:rPr>
-              <a:t>The requirements are explicit. </a:t>
+              <a:rPr lang="en-NZ" dirty="0"/>
+              <a:t>Tools: Apache, Nodejs</a:t>
             </a:r>
           </a:p>
           <a:p>
             <a:pPr lvl="1"/>
             <a:r>
-              <a:rPr lang="en-US" altLang="zh-CN" sz="2800" dirty="0">
-                <a:effectLst/>
-                <a:latin typeface="Times New Roman" panose="02020603050405020304" pitchFamily="18" charset="0"/>
-                <a:cs typeface="Times New Roman" panose="02020603050405020304" pitchFamily="18" charset="0"/>
-              </a:rPr>
-              <a:t>Relatively </a:t>
-            </a:r>
-            <a:r>
-              <a:rPr lang="en-NZ" sz="2800" dirty="0">
-                <a:effectLst/>
-                <a:latin typeface="Times New Roman" panose="02020603050405020304" pitchFamily="18" charset="0"/>
-                <a:cs typeface="Times New Roman" panose="02020603050405020304" pitchFamily="18" charset="0"/>
-              </a:rPr>
-              <a:t>simple system. </a:t>
+              <a:rPr lang="en-NZ" dirty="0"/>
+              <a:t>Modules: express, </a:t>
+            </a:r>
+            <a:r>
+              <a:rPr lang="en-NZ" dirty="0" err="1"/>
+              <a:t>ejs</a:t>
+            </a:r>
+            <a:r>
+              <a:rPr lang="en-NZ" dirty="0"/>
+              <a:t>, cookie-parser</a:t>
             </a:r>
           </a:p>
           <a:p>
             <a:pPr lvl="1"/>
             <a:r>
-              <a:rPr lang="en-NZ" sz="2800" dirty="0">
-                <a:effectLst/>
-                <a:latin typeface="Times New Roman" panose="02020603050405020304" pitchFamily="18" charset="0"/>
-                <a:cs typeface="Times New Roman" panose="02020603050405020304" pitchFamily="18" charset="0"/>
-              </a:rPr>
-              <a:t>Only be used in certain circumstances </a:t>
+              <a:rPr lang="en-NZ" dirty="0"/>
+              <a:t>Languages: </a:t>
+            </a:r>
+            <a:r>
+              <a:rPr lang="en-NZ" dirty="0" err="1"/>
+              <a:t>Javascript</a:t>
+            </a:r>
+            <a:r>
+              <a:rPr lang="en-NZ" dirty="0"/>
+              <a:t>, </a:t>
+            </a:r>
+            <a:r>
+              <a:rPr lang="en-NZ" dirty="0" err="1"/>
+              <a:t>Javascript</a:t>
+            </a:r>
+            <a:r>
+              <a:rPr lang="en-NZ" dirty="0"/>
+              <a:t>( embedded ), HTML, CSS</a:t>
             </a:r>
           </a:p>
           <a:p>
             <a:pPr lvl="1"/>
             <a:r>
-              <a:rPr lang="en-US" altLang="zh-CN" sz="2800" dirty="0">
-                <a:effectLst/>
-                <a:latin typeface="Times New Roman" panose="02020603050405020304" pitchFamily="18" charset="0"/>
-                <a:cs typeface="Times New Roman" panose="02020603050405020304" pitchFamily="18" charset="0"/>
-              </a:rPr>
-              <a:t>U</a:t>
-            </a:r>
-            <a:r>
-              <a:rPr lang="en-NZ" sz="2800" dirty="0" err="1">
-                <a:effectLst/>
-                <a:latin typeface="Times New Roman" panose="02020603050405020304" pitchFamily="18" charset="0"/>
-                <a:cs typeface="Times New Roman" panose="02020603050405020304" pitchFamily="18" charset="0"/>
-              </a:rPr>
-              <a:t>nlikely</a:t>
-            </a:r>
-            <a:r>
-              <a:rPr lang="en-NZ" sz="2800" dirty="0">
-                <a:effectLst/>
-                <a:latin typeface="Times New Roman" panose="02020603050405020304" pitchFamily="18" charset="0"/>
-                <a:cs typeface="Times New Roman" panose="02020603050405020304" pitchFamily="18" charset="0"/>
-              </a:rPr>
-              <a:t> to be changed.</a:t>
-            </a:r>
-            <a:endParaRPr lang="en-NZ" sz="2800" dirty="0">
-              <a:latin typeface="Times New Roman" panose="02020603050405020304" pitchFamily="18" charset="0"/>
-              <a:cs typeface="Times New Roman" panose="02020603050405020304" pitchFamily="18" charset="0"/>
-            </a:endParaRPr>
-          </a:p>
-        </p:txBody>
-      </p:sp>
-      <p:sp>
-        <p:nvSpPr>
-          <p:cNvPr id="5" name="文本框 4">
-            <a:extLst>
-              <a:ext uri="{FF2B5EF4-FFF2-40B4-BE49-F238E27FC236}">
-                <a16:creationId xmlns:a16="http://schemas.microsoft.com/office/drawing/2014/main" xmlns="" id="{D233536E-5C4E-5A22-114B-E507F99608AF}"/>
-              </a:ext>
-            </a:extLst>
-          </p:cNvPr>
-          <p:cNvSpPr txBox="1"/>
-          <p:nvPr/>
-        </p:nvSpPr>
-        <p:spPr>
-          <a:xfrm>
-            <a:off x="6661150" y="2232542"/>
-            <a:ext cx="5099050" cy="3139321"/>
-          </a:xfrm>
-          <a:prstGeom prst="rect">
-            <a:avLst/>
-          </a:prstGeom>
-          <a:noFill/>
-        </p:spPr>
-        <p:txBody>
-          <a:bodyPr wrap="square" rtlCol="0">
-            <a:spAutoFit/>
-          </a:bodyPr>
-          <a:lstStyle/>
-          <a:p>
-            <a:pPr marL="0" algn="l" rtl="0" eaLnBrk="1" fontAlgn="b" latinLnBrk="0" hangingPunct="1">
-              <a:spcBef>
-                <a:spcPts val="0"/>
-              </a:spcBef>
-              <a:spcAft>
-                <a:spcPts val="0"/>
-              </a:spcAft>
-            </a:pPr>
-            <a:r>
-              <a:rPr lang="en-NZ" sz="1800" b="0" i="0" u="none" strike="noStrike" kern="1200" dirty="0">
-                <a:solidFill>
-                  <a:schemeClr val="tx2">
-                    <a:lumMod val="90000"/>
-                  </a:schemeClr>
-                </a:solidFill>
-                <a:effectLst/>
-                <a:latin typeface="Times New Roman" panose="02020603050405020304" pitchFamily="18" charset="0"/>
-                <a:cs typeface="Times New Roman" panose="02020603050405020304" pitchFamily="18" charset="0"/>
-              </a:rPr>
-              <a:t>1.    Allow input of various input parameters on password such as Password Length, Include Symbols, Numbers, Lower/Upper case Characters, etc</a:t>
-            </a:r>
-            <a:endParaRPr lang="en-NZ" sz="1800" b="0" i="0" u="none" strike="noStrike" dirty="0">
-              <a:solidFill>
-                <a:schemeClr val="tx2">
-                  <a:lumMod val="90000"/>
-                </a:schemeClr>
-              </a:solidFill>
-              <a:effectLst/>
-              <a:latin typeface="Times New Roman" panose="02020603050405020304" pitchFamily="18" charset="0"/>
-              <a:cs typeface="Times New Roman" panose="02020603050405020304" pitchFamily="18" charset="0"/>
-            </a:endParaRPr>
-          </a:p>
-          <a:p>
-            <a:pPr marL="0" algn="l" rtl="0" eaLnBrk="1" fontAlgn="b" latinLnBrk="0" hangingPunct="1">
-              <a:spcBef>
-                <a:spcPts val="0"/>
-              </a:spcBef>
-              <a:spcAft>
-                <a:spcPts val="0"/>
-              </a:spcAft>
-            </a:pPr>
-            <a:r>
-              <a:rPr lang="en-NZ" sz="1800" b="0" i="0" u="none" strike="noStrike" kern="1200" dirty="0">
-                <a:solidFill>
-                  <a:schemeClr val="tx2">
-                    <a:lumMod val="90000"/>
-                  </a:schemeClr>
-                </a:solidFill>
-                <a:effectLst/>
-                <a:latin typeface="Times New Roman" panose="02020603050405020304" pitchFamily="18" charset="0"/>
-                <a:cs typeface="Times New Roman" panose="02020603050405020304" pitchFamily="18" charset="0"/>
-              </a:rPr>
-              <a:t>2.    Save the above parameter :( save all the settings above for later use)</a:t>
-            </a:r>
-            <a:endParaRPr lang="en-NZ" sz="1800" b="0" i="0" u="none" strike="noStrike" dirty="0">
-              <a:solidFill>
-                <a:schemeClr val="tx2">
-                  <a:lumMod val="90000"/>
-                </a:schemeClr>
-              </a:solidFill>
-              <a:effectLst/>
-              <a:latin typeface="Times New Roman" panose="02020603050405020304" pitchFamily="18" charset="0"/>
-              <a:cs typeface="Times New Roman" panose="02020603050405020304" pitchFamily="18" charset="0"/>
-            </a:endParaRPr>
-          </a:p>
-          <a:p>
-            <a:pPr marL="0" algn="l" rtl="0" eaLnBrk="1" fontAlgn="b" latinLnBrk="0" hangingPunct="1">
-              <a:spcBef>
-                <a:spcPts val="0"/>
-              </a:spcBef>
-              <a:spcAft>
-                <a:spcPts val="0"/>
-              </a:spcAft>
-            </a:pPr>
-            <a:r>
-              <a:rPr lang="en-NZ" sz="1800" b="0" i="0" u="none" strike="noStrike" kern="1200" dirty="0">
-                <a:solidFill>
-                  <a:schemeClr val="tx2">
-                    <a:lumMod val="90000"/>
-                  </a:schemeClr>
-                </a:solidFill>
-                <a:effectLst/>
-                <a:latin typeface="Times New Roman" panose="02020603050405020304" pitchFamily="18" charset="0"/>
-                <a:cs typeface="Times New Roman" panose="02020603050405020304" pitchFamily="18" charset="0"/>
-              </a:rPr>
-              <a:t>3.    Generate a random password for based on the above parameters</a:t>
-            </a:r>
-            <a:endParaRPr lang="en-NZ" sz="1800" b="0" i="0" u="none" strike="noStrike" dirty="0">
-              <a:solidFill>
-                <a:schemeClr val="tx2">
-                  <a:lumMod val="90000"/>
-                </a:schemeClr>
-              </a:solidFill>
-              <a:effectLst/>
-              <a:latin typeface="Times New Roman" panose="02020603050405020304" pitchFamily="18" charset="0"/>
-              <a:cs typeface="Times New Roman" panose="02020603050405020304" pitchFamily="18" charset="0"/>
-            </a:endParaRPr>
-          </a:p>
-          <a:p>
-            <a:pPr marL="0" algn="l" rtl="0" eaLnBrk="1" fontAlgn="b" latinLnBrk="0" hangingPunct="1">
-              <a:spcBef>
-                <a:spcPts val="0"/>
-              </a:spcBef>
-              <a:spcAft>
-                <a:spcPts val="0"/>
-              </a:spcAft>
-            </a:pPr>
-            <a:r>
-              <a:rPr lang="en-NZ" sz="1800" b="0" i="0" u="none" strike="noStrike" kern="1200" dirty="0">
-                <a:solidFill>
-                  <a:schemeClr val="tx2">
-                    <a:lumMod val="90000"/>
-                  </a:schemeClr>
-                </a:solidFill>
-                <a:effectLst/>
-                <a:latin typeface="Times New Roman" panose="02020603050405020304" pitchFamily="18" charset="0"/>
-                <a:cs typeface="Times New Roman" panose="02020603050405020304" pitchFamily="18" charset="0"/>
-              </a:rPr>
-              <a:t>4.    Copy function to copy the generated password to the buffer (like Control + C)</a:t>
-            </a:r>
-            <a:endParaRPr lang="en-NZ" sz="1800" b="0" i="0" u="none" strike="noStrike" dirty="0">
-              <a:solidFill>
-                <a:schemeClr val="tx2">
-                  <a:lumMod val="90000"/>
-                </a:schemeClr>
-              </a:solidFill>
-              <a:effectLst/>
-              <a:latin typeface="Times New Roman" panose="02020603050405020304" pitchFamily="18" charset="0"/>
-              <a:cs typeface="Times New Roman" panose="02020603050405020304" pitchFamily="18" charset="0"/>
-            </a:endParaRPr>
-          </a:p>
-          <a:p>
-            <a:endParaRPr lang="en-NZ" dirty="0">
-              <a:solidFill>
-                <a:schemeClr val="tx2">
-                  <a:lumMod val="90000"/>
-                </a:schemeClr>
-              </a:solidFill>
-              <a:latin typeface="Times New Roman" panose="02020603050405020304" pitchFamily="18" charset="0"/>
-              <a:cs typeface="Times New Roman" panose="02020603050405020304" pitchFamily="18" charset="0"/>
-            </a:endParaRPr>
-          </a:p>
-        </p:txBody>
-      </p:sp>
-      <p:sp>
-        <p:nvSpPr>
-          <p:cNvPr id="6" name="文本框 5">
-            <a:extLst>
-              <a:ext uri="{FF2B5EF4-FFF2-40B4-BE49-F238E27FC236}">
-                <a16:creationId xmlns:a16="http://schemas.microsoft.com/office/drawing/2014/main" xmlns="" id="{4432D91B-110E-9A16-F8F5-9DE69295486D}"/>
-              </a:ext>
-            </a:extLst>
-          </p:cNvPr>
-          <p:cNvSpPr txBox="1"/>
-          <p:nvPr/>
-        </p:nvSpPr>
-        <p:spPr>
-          <a:xfrm>
-            <a:off x="6572250" y="5638800"/>
-            <a:ext cx="4724400" cy="338554"/>
-          </a:xfrm>
-          <a:prstGeom prst="rect">
-            <a:avLst/>
-          </a:prstGeom>
-          <a:noFill/>
-        </p:spPr>
-        <p:txBody>
-          <a:bodyPr wrap="square" rtlCol="0">
-            <a:spAutoFit/>
-          </a:bodyPr>
-          <a:lstStyle/>
-          <a:p>
-            <a:r>
-              <a:rPr lang="en-NZ" sz="1600" dirty="0" err="1">
-                <a:latin typeface="Times New Roman" panose="02020603050405020304" pitchFamily="18" charset="0"/>
-                <a:cs typeface="Times New Roman" panose="02020603050405020304" pitchFamily="18" charset="0"/>
-              </a:rPr>
-              <a:t>Retrived</a:t>
-            </a:r>
-            <a:r>
-              <a:rPr lang="en-NZ" sz="1600" dirty="0">
-                <a:latin typeface="Times New Roman" panose="02020603050405020304" pitchFamily="18" charset="0"/>
-                <a:cs typeface="Times New Roman" panose="02020603050405020304" pitchFamily="18" charset="0"/>
-              </a:rPr>
-              <a:t> from: project list</a:t>
+              <a:rPr lang="en-NZ" dirty="0"/>
+              <a:t>Request method: POST / GET</a:t>
             </a:r>
           </a:p>
         </p:txBody>
@@ -8540,7 +8576,7 @@
     </p:spTree>
     <p:extLst>
       <p:ext uri="{BB962C8B-B14F-4D97-AF65-F5344CB8AC3E}">
-        <p14:creationId xmlns:p14="http://schemas.microsoft.com/office/powerpoint/2010/main" xmlns="" val="2361374323"/>
+        <p14:creationId xmlns:p14="http://schemas.microsoft.com/office/powerpoint/2010/main" val="1522651155"/>
       </p:ext>
     </p:extLst>
   </p:cSld>
@@ -8814,7 +8850,7 @@
   <a:extraClrSchemeLst/>
   <a:extLst>
     <a:ext uri="{05A4C25C-085E-4340-85A3-A5531E510DB2}">
-      <thm15:themeFamily xmlns:thm15="http://schemas.microsoft.com/office/thememl/2012/main" xmlns="" name="Vapor Trail" id="{4FDF2955-7D9C-493C-B9F9-C205151B46CD}" vid="{8F31A783-2159-4870-BC29-2BA7D038EA44}"/>
+      <thm15:themeFamily xmlns:thm15="http://schemas.microsoft.com/office/thememl/2012/main" name="Vapor Trail" id="{4FDF2955-7D9C-493C-B9F9-C205151B46CD}" vid="{8F31A783-2159-4870-BC29-2BA7D038EA44}"/>
     </a:ext>
   </a:extLst>
 </a:theme>

</xml_diff>

<commit_message>
Update Presentation Password Generator.pptx
</commit_message>
<xml_diff>
--- a/document/Presentation Password Generator.pptx
+++ b/document/Presentation Password Generator.pptx
@@ -120,7 +120,7 @@
   </p:defaultTextStyle>
   <p:extLst>
     <p:ext uri="{EFAFB233-063F-42B5-8137-9DF3F51BA10A}">
-      <p15:sldGuideLst xmlns:p15="http://schemas.microsoft.com/office/powerpoint/2012/main">
+      <p15:sldGuideLst xmlns:p15="http://schemas.microsoft.com/office/powerpoint/2012/main" xmlns="">
         <p15:guide id="1" orient="horz" pos="2160">
           <p15:clr>
             <a:srgbClr val="A4A3A4"/>
@@ -166,7 +166,7 @@
           <a:blip r:embed="rId2">
             <a:extLst>
               <a:ext uri="{28A0092B-C50C-407E-A947-70E740481C1C}">
-                <a14:useLocalDpi xmlns:a14="http://schemas.microsoft.com/office/drawing/2010/main" val="0"/>
+                <a14:useLocalDpi xmlns:a14="http://schemas.microsoft.com/office/drawing/2010/main" xmlns="" val="0"/>
               </a:ext>
             </a:extLst>
           </a:blip>
@@ -308,7 +308,7 @@
             <a:fld id="{F1FEB44C-43DA-42AA-B9E9-395B842E5567}" type="datetimeFigureOut">
               <a:rPr lang="en-NZ" smtClean="0"/>
               <a:pPr/>
-              <a:t>7/09/2022</a:t>
+              <a:t>14/09/2022</a:t>
             </a:fld>
             <a:endParaRPr lang="en-NZ"/>
           </a:p>
@@ -370,7 +370,7 @@
     </p:spTree>
     <p:extLst>
       <p:ext uri="{BB962C8B-B14F-4D97-AF65-F5344CB8AC3E}">
-        <p14:creationId xmlns:p14="http://schemas.microsoft.com/office/powerpoint/2010/main" val="3646990326"/>
+        <p14:creationId xmlns:p14="http://schemas.microsoft.com/office/powerpoint/2010/main" xmlns="" val="3646990326"/>
       </p:ext>
     </p:extLst>
   </p:cSld>
@@ -577,7 +577,7 @@
             <a:fld id="{F1FEB44C-43DA-42AA-B9E9-395B842E5567}" type="datetimeFigureOut">
               <a:rPr lang="en-NZ" smtClean="0"/>
               <a:pPr/>
-              <a:t>7/09/2022</a:t>
+              <a:t>14/09/2022</a:t>
             </a:fld>
             <a:endParaRPr lang="en-NZ"/>
           </a:p>
@@ -629,7 +629,7 @@
     </p:spTree>
     <p:extLst>
       <p:ext uri="{BB962C8B-B14F-4D97-AF65-F5344CB8AC3E}">
-        <p14:creationId xmlns:p14="http://schemas.microsoft.com/office/powerpoint/2010/main" val="71176386"/>
+        <p14:creationId xmlns:p14="http://schemas.microsoft.com/office/powerpoint/2010/main" xmlns="" val="71176386"/>
       </p:ext>
     </p:extLst>
   </p:cSld>
@@ -668,7 +668,7 @@
           <a:blip r:embed="rId2">
             <a:extLst>
               <a:ext uri="{28A0092B-C50C-407E-A947-70E740481C1C}">
-                <a14:useLocalDpi xmlns:a14="http://schemas.microsoft.com/office/drawing/2010/main" val="0"/>
+                <a14:useLocalDpi xmlns:a14="http://schemas.microsoft.com/office/drawing/2010/main" xmlns="" val="0"/>
               </a:ext>
             </a:extLst>
           </a:blip>
@@ -810,7 +810,7 @@
             <a:fld id="{F1FEB44C-43DA-42AA-B9E9-395B842E5567}" type="datetimeFigureOut">
               <a:rPr lang="en-NZ" smtClean="0"/>
               <a:pPr/>
-              <a:t>7/09/2022</a:t>
+              <a:t>14/09/2022</a:t>
             </a:fld>
             <a:endParaRPr lang="en-NZ"/>
           </a:p>
@@ -872,7 +872,7 @@
     </p:spTree>
     <p:extLst>
       <p:ext uri="{BB962C8B-B14F-4D97-AF65-F5344CB8AC3E}">
-        <p14:creationId xmlns:p14="http://schemas.microsoft.com/office/powerpoint/2010/main" val="1798571661"/>
+        <p14:creationId xmlns:p14="http://schemas.microsoft.com/office/powerpoint/2010/main" xmlns="" val="1798571661"/>
       </p:ext>
     </p:extLst>
   </p:cSld>
@@ -911,7 +911,7 @@
           <a:blip r:embed="rId2">
             <a:extLst>
               <a:ext uri="{28A0092B-C50C-407E-A947-70E740481C1C}">
-                <a14:useLocalDpi xmlns:a14="http://schemas.microsoft.com/office/drawing/2010/main" val="0"/>
+                <a14:useLocalDpi xmlns:a14="http://schemas.microsoft.com/office/drawing/2010/main" xmlns="" val="0"/>
               </a:ext>
             </a:extLst>
           </a:blip>
@@ -1122,7 +1122,7 @@
             <a:fld id="{F1FEB44C-43DA-42AA-B9E9-395B842E5567}" type="datetimeFigureOut">
               <a:rPr lang="en-NZ" smtClean="0"/>
               <a:pPr/>
-              <a:t>7/09/2022</a:t>
+              <a:t>14/09/2022</a:t>
             </a:fld>
             <a:endParaRPr lang="en-NZ"/>
           </a:p>
@@ -1416,7 +1416,7 @@
     </p:spTree>
     <p:extLst>
       <p:ext uri="{BB962C8B-B14F-4D97-AF65-F5344CB8AC3E}">
-        <p14:creationId xmlns:p14="http://schemas.microsoft.com/office/powerpoint/2010/main" val="2241860457"/>
+        <p14:creationId xmlns:p14="http://schemas.microsoft.com/office/powerpoint/2010/main" xmlns="" val="2241860457"/>
       </p:ext>
     </p:extLst>
   </p:cSld>
@@ -1455,7 +1455,7 @@
           <a:blip r:embed="rId2">
             <a:extLst>
               <a:ext uri="{28A0092B-C50C-407E-A947-70E740481C1C}">
-                <a14:useLocalDpi xmlns:a14="http://schemas.microsoft.com/office/drawing/2010/main" val="0"/>
+                <a14:useLocalDpi xmlns:a14="http://schemas.microsoft.com/office/drawing/2010/main" xmlns="" val="0"/>
               </a:ext>
             </a:extLst>
           </a:blip>
@@ -1597,7 +1597,7 @@
             <a:fld id="{F1FEB44C-43DA-42AA-B9E9-395B842E5567}" type="datetimeFigureOut">
               <a:rPr lang="en-NZ" smtClean="0"/>
               <a:pPr/>
-              <a:t>7/09/2022</a:t>
+              <a:t>14/09/2022</a:t>
             </a:fld>
             <a:endParaRPr lang="en-NZ"/>
           </a:p>
@@ -1659,7 +1659,7 @@
     </p:spTree>
     <p:extLst>
       <p:ext uri="{BB962C8B-B14F-4D97-AF65-F5344CB8AC3E}">
-        <p14:creationId xmlns:p14="http://schemas.microsoft.com/office/powerpoint/2010/main" val="3785431333"/>
+        <p14:creationId xmlns:p14="http://schemas.microsoft.com/office/powerpoint/2010/main" xmlns="" val="3785431333"/>
       </p:ext>
     </p:extLst>
   </p:cSld>
@@ -2146,7 +2146,7 @@
             <a:fld id="{F1FEB44C-43DA-42AA-B9E9-395B842E5567}" type="datetimeFigureOut">
               <a:rPr lang="en-NZ" smtClean="0"/>
               <a:pPr/>
-              <a:t>7/09/2022</a:t>
+              <a:t>14/09/2022</a:t>
             </a:fld>
             <a:endParaRPr lang="en-NZ"/>
           </a:p>
@@ -2198,7 +2198,7 @@
     </p:spTree>
     <p:extLst>
       <p:ext uri="{BB962C8B-B14F-4D97-AF65-F5344CB8AC3E}">
-        <p14:creationId xmlns:p14="http://schemas.microsoft.com/office/powerpoint/2010/main" val="3188093362"/>
+        <p14:creationId xmlns:p14="http://schemas.microsoft.com/office/powerpoint/2010/main" xmlns="" val="3188093362"/>
       </p:ext>
     </p:extLst>
   </p:cSld>
@@ -2922,7 +2922,7 @@
             <a:fld id="{F1FEB44C-43DA-42AA-B9E9-395B842E5567}" type="datetimeFigureOut">
               <a:rPr lang="en-NZ" smtClean="0"/>
               <a:pPr/>
-              <a:t>7/09/2022</a:t>
+              <a:t>14/09/2022</a:t>
             </a:fld>
             <a:endParaRPr lang="en-NZ"/>
           </a:p>
@@ -2974,7 +2974,7 @@
     </p:spTree>
     <p:extLst>
       <p:ext uri="{BB962C8B-B14F-4D97-AF65-F5344CB8AC3E}">
-        <p14:creationId xmlns:p14="http://schemas.microsoft.com/office/powerpoint/2010/main" val="1247721429"/>
+        <p14:creationId xmlns:p14="http://schemas.microsoft.com/office/powerpoint/2010/main" xmlns="" val="1247721429"/>
       </p:ext>
     </p:extLst>
   </p:cSld>
@@ -3099,7 +3099,7 @@
             <a:fld id="{F1FEB44C-43DA-42AA-B9E9-395B842E5567}" type="datetimeFigureOut">
               <a:rPr lang="en-NZ" smtClean="0"/>
               <a:pPr/>
-              <a:t>7/09/2022</a:t>
+              <a:t>14/09/2022</a:t>
             </a:fld>
             <a:endParaRPr lang="en-NZ"/>
           </a:p>
@@ -3151,7 +3151,7 @@
     </p:spTree>
     <p:extLst>
       <p:ext uri="{BB962C8B-B14F-4D97-AF65-F5344CB8AC3E}">
-        <p14:creationId xmlns:p14="http://schemas.microsoft.com/office/powerpoint/2010/main" val="1314504317"/>
+        <p14:creationId xmlns:p14="http://schemas.microsoft.com/office/powerpoint/2010/main" xmlns="" val="1314504317"/>
       </p:ext>
     </p:extLst>
   </p:cSld>
@@ -3190,7 +3190,7 @@
           <a:blip r:embed="rId2">
             <a:extLst>
               <a:ext uri="{28A0092B-C50C-407E-A947-70E740481C1C}">
-                <a14:useLocalDpi xmlns:a14="http://schemas.microsoft.com/office/drawing/2010/main" val="0"/>
+                <a14:useLocalDpi xmlns:a14="http://schemas.microsoft.com/office/drawing/2010/main" xmlns="" val="0"/>
               </a:ext>
             </a:extLst>
           </a:blip>
@@ -3324,7 +3324,7 @@
             <a:fld id="{F1FEB44C-43DA-42AA-B9E9-395B842E5567}" type="datetimeFigureOut">
               <a:rPr lang="en-NZ" smtClean="0"/>
               <a:pPr/>
-              <a:t>7/09/2022</a:t>
+              <a:t>14/09/2022</a:t>
             </a:fld>
             <a:endParaRPr lang="en-NZ"/>
           </a:p>
@@ -3386,7 +3386,7 @@
     </p:spTree>
     <p:extLst>
       <p:ext uri="{BB962C8B-B14F-4D97-AF65-F5344CB8AC3E}">
-        <p14:creationId xmlns:p14="http://schemas.microsoft.com/office/powerpoint/2010/main" val="3268017753"/>
+        <p14:creationId xmlns:p14="http://schemas.microsoft.com/office/powerpoint/2010/main" xmlns="" val="3268017753"/>
       </p:ext>
     </p:extLst>
   </p:cSld>
@@ -3506,7 +3506,7 @@
             <a:fld id="{F1FEB44C-43DA-42AA-B9E9-395B842E5567}" type="datetimeFigureOut">
               <a:rPr lang="en-NZ" smtClean="0"/>
               <a:pPr/>
-              <a:t>7/09/2022</a:t>
+              <a:t>14/09/2022</a:t>
             </a:fld>
             <a:endParaRPr lang="en-NZ"/>
           </a:p>
@@ -3558,7 +3558,7 @@
     </p:spTree>
     <p:extLst>
       <p:ext uri="{BB962C8B-B14F-4D97-AF65-F5344CB8AC3E}">
-        <p14:creationId xmlns:p14="http://schemas.microsoft.com/office/powerpoint/2010/main" val="900410543"/>
+        <p14:creationId xmlns:p14="http://schemas.microsoft.com/office/powerpoint/2010/main" xmlns="" val="900410543"/>
       </p:ext>
     </p:extLst>
   </p:cSld>
@@ -3597,7 +3597,7 @@
           <a:blip r:embed="rId2">
             <a:extLst>
               <a:ext uri="{28A0092B-C50C-407E-A947-70E740481C1C}">
-                <a14:useLocalDpi xmlns:a14="http://schemas.microsoft.com/office/drawing/2010/main" val="0"/>
+                <a14:useLocalDpi xmlns:a14="http://schemas.microsoft.com/office/drawing/2010/main" xmlns="" val="0"/>
               </a:ext>
             </a:extLst>
           </a:blip>
@@ -3797,7 +3797,7 @@
             <a:fld id="{F1FEB44C-43DA-42AA-B9E9-395B842E5567}" type="datetimeFigureOut">
               <a:rPr lang="en-NZ" smtClean="0"/>
               <a:pPr/>
-              <a:t>7/09/2022</a:t>
+              <a:t>14/09/2022</a:t>
             </a:fld>
             <a:endParaRPr lang="en-NZ"/>
           </a:p>
@@ -3859,7 +3859,7 @@
     </p:spTree>
     <p:extLst>
       <p:ext uri="{BB962C8B-B14F-4D97-AF65-F5344CB8AC3E}">
-        <p14:creationId xmlns:p14="http://schemas.microsoft.com/office/powerpoint/2010/main" val="2811421413"/>
+        <p14:creationId xmlns:p14="http://schemas.microsoft.com/office/powerpoint/2010/main" xmlns="" val="2811421413"/>
       </p:ext>
     </p:extLst>
   </p:cSld>
@@ -4041,7 +4041,7 @@
             <a:fld id="{F1FEB44C-43DA-42AA-B9E9-395B842E5567}" type="datetimeFigureOut">
               <a:rPr lang="en-NZ" smtClean="0"/>
               <a:pPr/>
-              <a:t>7/09/2022</a:t>
+              <a:t>14/09/2022</a:t>
             </a:fld>
             <a:endParaRPr lang="en-NZ"/>
           </a:p>
@@ -4093,7 +4093,7 @@
     </p:spTree>
     <p:extLst>
       <p:ext uri="{BB962C8B-B14F-4D97-AF65-F5344CB8AC3E}">
-        <p14:creationId xmlns:p14="http://schemas.microsoft.com/office/powerpoint/2010/main" val="2818974999"/>
+        <p14:creationId xmlns:p14="http://schemas.microsoft.com/office/powerpoint/2010/main" xmlns="" val="2818974999"/>
       </p:ext>
     </p:extLst>
   </p:cSld>
@@ -4422,7 +4422,7 @@
             <a:fld id="{F1FEB44C-43DA-42AA-B9E9-395B842E5567}" type="datetimeFigureOut">
               <a:rPr lang="en-NZ" smtClean="0"/>
               <a:pPr/>
-              <a:t>7/09/2022</a:t>
+              <a:t>14/09/2022</a:t>
             </a:fld>
             <a:endParaRPr lang="en-NZ"/>
           </a:p>
@@ -4474,7 +4474,7 @@
     </p:spTree>
     <p:extLst>
       <p:ext uri="{BB962C8B-B14F-4D97-AF65-F5344CB8AC3E}">
-        <p14:creationId xmlns:p14="http://schemas.microsoft.com/office/powerpoint/2010/main" val="3602584676"/>
+        <p14:creationId xmlns:p14="http://schemas.microsoft.com/office/powerpoint/2010/main" xmlns="" val="3602584676"/>
       </p:ext>
     </p:extLst>
   </p:cSld>
@@ -4542,7 +4542,7 @@
             <a:fld id="{F1FEB44C-43DA-42AA-B9E9-395B842E5567}" type="datetimeFigureOut">
               <a:rPr lang="en-NZ" smtClean="0"/>
               <a:pPr/>
-              <a:t>7/09/2022</a:t>
+              <a:t>14/09/2022</a:t>
             </a:fld>
             <a:endParaRPr lang="en-NZ"/>
           </a:p>
@@ -4594,7 +4594,7 @@
     </p:spTree>
     <p:extLst>
       <p:ext uri="{BB962C8B-B14F-4D97-AF65-F5344CB8AC3E}">
-        <p14:creationId xmlns:p14="http://schemas.microsoft.com/office/powerpoint/2010/main" val="3525800094"/>
+        <p14:creationId xmlns:p14="http://schemas.microsoft.com/office/powerpoint/2010/main" xmlns="" val="3525800094"/>
       </p:ext>
     </p:extLst>
   </p:cSld>
@@ -4639,7 +4639,7 @@
             <a:fld id="{F1FEB44C-43DA-42AA-B9E9-395B842E5567}" type="datetimeFigureOut">
               <a:rPr lang="en-NZ" smtClean="0"/>
               <a:pPr/>
-              <a:t>7/09/2022</a:t>
+              <a:t>14/09/2022</a:t>
             </a:fld>
             <a:endParaRPr lang="en-NZ"/>
           </a:p>
@@ -4691,7 +4691,7 @@
     </p:spTree>
     <p:extLst>
       <p:ext uri="{BB962C8B-B14F-4D97-AF65-F5344CB8AC3E}">
-        <p14:creationId xmlns:p14="http://schemas.microsoft.com/office/powerpoint/2010/main" val="900002222"/>
+        <p14:creationId xmlns:p14="http://schemas.microsoft.com/office/powerpoint/2010/main" xmlns="" val="900002222"/>
       </p:ext>
     </p:extLst>
   </p:cSld>
@@ -4890,7 +4890,7 @@
             <a:fld id="{F1FEB44C-43DA-42AA-B9E9-395B842E5567}" type="datetimeFigureOut">
               <a:rPr lang="en-NZ" smtClean="0"/>
               <a:pPr/>
-              <a:t>7/09/2022</a:t>
+              <a:t>14/09/2022</a:t>
             </a:fld>
             <a:endParaRPr lang="en-NZ"/>
           </a:p>
@@ -4942,7 +4942,7 @@
     </p:spTree>
     <p:extLst>
       <p:ext uri="{BB962C8B-B14F-4D97-AF65-F5344CB8AC3E}">
-        <p14:creationId xmlns:p14="http://schemas.microsoft.com/office/powerpoint/2010/main" val="1979681908"/>
+        <p14:creationId xmlns:p14="http://schemas.microsoft.com/office/powerpoint/2010/main" xmlns="" val="1979681908"/>
       </p:ext>
     </p:extLst>
   </p:cSld>
@@ -5149,7 +5149,7 @@
             <a:fld id="{F1FEB44C-43DA-42AA-B9E9-395B842E5567}" type="datetimeFigureOut">
               <a:rPr lang="en-NZ" smtClean="0"/>
               <a:pPr/>
-              <a:t>7/09/2022</a:t>
+              <a:t>14/09/2022</a:t>
             </a:fld>
             <a:endParaRPr lang="en-NZ"/>
           </a:p>
@@ -5201,7 +5201,7 @@
     </p:spTree>
     <p:extLst>
       <p:ext uri="{BB962C8B-B14F-4D97-AF65-F5344CB8AC3E}">
-        <p14:creationId xmlns:p14="http://schemas.microsoft.com/office/powerpoint/2010/main" val="3490336120"/>
+        <p14:creationId xmlns:p14="http://schemas.microsoft.com/office/powerpoint/2010/main" xmlns="" val="3490336120"/>
       </p:ext>
     </p:extLst>
   </p:cSld>
@@ -5245,7 +5245,7 @@
           <a:blip r:embed="rId19">
             <a:extLst>
               <a:ext uri="{28A0092B-C50C-407E-A947-70E740481C1C}">
-                <a14:useLocalDpi xmlns:a14="http://schemas.microsoft.com/office/drawing/2010/main" val="0"/>
+                <a14:useLocalDpi xmlns:a14="http://schemas.microsoft.com/office/drawing/2010/main" xmlns="" val="0"/>
               </a:ext>
             </a:extLst>
           </a:blip>
@@ -5394,7 +5394,7 @@
             <a:fld id="{F1FEB44C-43DA-42AA-B9E9-395B842E5567}" type="datetimeFigureOut">
               <a:rPr lang="en-NZ" smtClean="0"/>
               <a:pPr/>
-              <a:t>7/09/2022</a:t>
+              <a:t>14/09/2022</a:t>
             </a:fld>
             <a:endParaRPr lang="en-NZ"/>
           </a:p>
@@ -5482,7 +5482,7 @@
     </p:spTree>
     <p:extLst>
       <p:ext uri="{BB962C8B-B14F-4D97-AF65-F5344CB8AC3E}">
-        <p14:creationId xmlns:p14="http://schemas.microsoft.com/office/powerpoint/2010/main" val="475220722"/>
+        <p14:creationId xmlns:p14="http://schemas.microsoft.com/office/powerpoint/2010/main" xmlns="" val="475220722"/>
       </p:ext>
     </p:extLst>
   </p:cSld>
@@ -5811,7 +5811,7 @@
           <p:cNvPr id="2" name="标题 1">
             <a:extLst>
               <a:ext uri="{FF2B5EF4-FFF2-40B4-BE49-F238E27FC236}">
-                <a16:creationId xmlns:a16="http://schemas.microsoft.com/office/drawing/2014/main" id="{9378BB5D-5C77-1E3D-912F-AA79F30B85B4}"/>
+                <a16:creationId xmlns:a16="http://schemas.microsoft.com/office/drawing/2014/main" xmlns="" id="{9378BB5D-5C77-1E3D-912F-AA79F30B85B4}"/>
               </a:ext>
             </a:extLst>
           </p:cNvPr>
@@ -5842,7 +5842,7 @@
           <p:cNvPr id="3" name="副标题 2">
             <a:extLst>
               <a:ext uri="{FF2B5EF4-FFF2-40B4-BE49-F238E27FC236}">
-                <a16:creationId xmlns:a16="http://schemas.microsoft.com/office/drawing/2014/main" id="{BE25738F-A275-37A7-AD92-00E90E767875}"/>
+                <a16:creationId xmlns:a16="http://schemas.microsoft.com/office/drawing/2014/main" xmlns="" id="{BE25738F-A275-37A7-AD92-00E90E767875}"/>
               </a:ext>
             </a:extLst>
           </p:cNvPr>
@@ -5915,7 +5915,7 @@
     </p:spTree>
     <p:extLst>
       <p:ext uri="{BB962C8B-B14F-4D97-AF65-F5344CB8AC3E}">
-        <p14:creationId xmlns:p14="http://schemas.microsoft.com/office/powerpoint/2010/main" val="467902368"/>
+        <p14:creationId xmlns:p14="http://schemas.microsoft.com/office/powerpoint/2010/main" xmlns="" val="467902368"/>
       </p:ext>
     </p:extLst>
   </p:cSld>
@@ -5947,7 +5947,7 @@
           <p:cNvPr id="2" name="标题 1">
             <a:extLst>
               <a:ext uri="{FF2B5EF4-FFF2-40B4-BE49-F238E27FC236}">
-                <a16:creationId xmlns:a16="http://schemas.microsoft.com/office/drawing/2014/main" id="{594441FE-9332-F0E4-7AE1-3123F39EBF02}"/>
+                <a16:creationId xmlns:a16="http://schemas.microsoft.com/office/drawing/2014/main" xmlns="" id="{594441FE-9332-F0E4-7AE1-3123F39EBF02}"/>
               </a:ext>
             </a:extLst>
           </p:cNvPr>
@@ -5975,7 +5975,7 @@
           <p:cNvPr id="3" name="内容占位符 2">
             <a:extLst>
               <a:ext uri="{FF2B5EF4-FFF2-40B4-BE49-F238E27FC236}">
-                <a16:creationId xmlns:a16="http://schemas.microsoft.com/office/drawing/2014/main" id="{C1BFAA36-BAFA-2A56-98AB-CC6300CECA0C}"/>
+                <a16:creationId xmlns:a16="http://schemas.microsoft.com/office/drawing/2014/main" xmlns="" id="{C1BFAA36-BAFA-2A56-98AB-CC6300CECA0C}"/>
               </a:ext>
             </a:extLst>
           </p:cNvPr>
@@ -6086,7 +6086,7 @@
           <p:cNvPr id="5" name="文本框 4">
             <a:extLst>
               <a:ext uri="{FF2B5EF4-FFF2-40B4-BE49-F238E27FC236}">
-                <a16:creationId xmlns:a16="http://schemas.microsoft.com/office/drawing/2014/main" id="{D233536E-5C4E-5A22-114B-E507F99608AF}"/>
+                <a16:creationId xmlns:a16="http://schemas.microsoft.com/office/drawing/2014/main" xmlns="" id="{D233536E-5C4E-5A22-114B-E507F99608AF}"/>
               </a:ext>
             </a:extLst>
           </p:cNvPr>
@@ -6248,7 +6248,7 @@
           <p:cNvPr id="6" name="文本框 5">
             <a:extLst>
               <a:ext uri="{FF2B5EF4-FFF2-40B4-BE49-F238E27FC236}">
-                <a16:creationId xmlns:a16="http://schemas.microsoft.com/office/drawing/2014/main" id="{4432D91B-110E-9A16-F8F5-9DE69295486D}"/>
+                <a16:creationId xmlns:a16="http://schemas.microsoft.com/office/drawing/2014/main" xmlns="" id="{4432D91B-110E-9A16-F8F5-9DE69295486D}"/>
               </a:ext>
             </a:extLst>
           </p:cNvPr>
@@ -6291,7 +6291,7 @@
     </p:spTree>
     <p:extLst>
       <p:ext uri="{BB962C8B-B14F-4D97-AF65-F5344CB8AC3E}">
-        <p14:creationId xmlns:p14="http://schemas.microsoft.com/office/powerpoint/2010/main" val="2361374323"/>
+        <p14:creationId xmlns:p14="http://schemas.microsoft.com/office/powerpoint/2010/main" xmlns="" val="2361374323"/>
       </p:ext>
     </p:extLst>
   </p:cSld>
@@ -6323,7 +6323,7 @@
           <p:cNvPr id="2" name="标题 1">
             <a:extLst>
               <a:ext uri="{FF2B5EF4-FFF2-40B4-BE49-F238E27FC236}">
-                <a16:creationId xmlns:a16="http://schemas.microsoft.com/office/drawing/2014/main" id="{B26EBC45-122C-5FE6-01A0-0B6F24E25785}"/>
+                <a16:creationId xmlns:a16="http://schemas.microsoft.com/office/drawing/2014/main" xmlns="" id="{B26EBC45-122C-5FE6-01A0-0B6F24E25785}"/>
               </a:ext>
             </a:extLst>
           </p:cNvPr>
@@ -6351,7 +6351,7 @@
           <p:cNvPr id="5" name="内容占位符 4">
             <a:extLst>
               <a:ext uri="{FF2B5EF4-FFF2-40B4-BE49-F238E27FC236}">
-                <a16:creationId xmlns:a16="http://schemas.microsoft.com/office/drawing/2014/main" id="{B34579D3-B1D0-FFDD-242D-00F815568178}"/>
+                <a16:creationId xmlns:a16="http://schemas.microsoft.com/office/drawing/2014/main" xmlns="" id="{B34579D3-B1D0-FFDD-242D-00F815568178}"/>
               </a:ext>
             </a:extLst>
           </p:cNvPr>
@@ -6366,7 +6366,7 @@
           <a:blip r:embed="rId2">
             <a:extLst>
               <a:ext uri="{28A0092B-C50C-407E-A947-70E740481C1C}">
-                <a14:useLocalDpi xmlns:a14="http://schemas.microsoft.com/office/drawing/2010/main" val="0"/>
+                <a14:useLocalDpi xmlns:a14="http://schemas.microsoft.com/office/drawing/2010/main" xmlns="" val="0"/>
               </a:ext>
             </a:extLst>
           </a:blip>
@@ -6384,7 +6384,7 @@
     </p:spTree>
     <p:extLst>
       <p:ext uri="{BB962C8B-B14F-4D97-AF65-F5344CB8AC3E}">
-        <p14:creationId xmlns:p14="http://schemas.microsoft.com/office/powerpoint/2010/main" val="3123407964"/>
+        <p14:creationId xmlns:p14="http://schemas.microsoft.com/office/powerpoint/2010/main" xmlns="" val="3123407964"/>
       </p:ext>
     </p:extLst>
   </p:cSld>
@@ -6416,7 +6416,7 @@
           <p:cNvPr id="2" name="标题 1">
             <a:extLst>
               <a:ext uri="{FF2B5EF4-FFF2-40B4-BE49-F238E27FC236}">
-                <a16:creationId xmlns:a16="http://schemas.microsoft.com/office/drawing/2014/main" id="{083AE34A-2EE8-6BAE-70F0-3E8DBE525781}"/>
+                <a16:creationId xmlns:a16="http://schemas.microsoft.com/office/drawing/2014/main" xmlns="" id="{083AE34A-2EE8-6BAE-70F0-3E8DBE525781}"/>
               </a:ext>
             </a:extLst>
           </p:cNvPr>
@@ -6444,7 +6444,7 @@
           <p:cNvPr id="3" name="内容占位符 2">
             <a:extLst>
               <a:ext uri="{FF2B5EF4-FFF2-40B4-BE49-F238E27FC236}">
-                <a16:creationId xmlns:a16="http://schemas.microsoft.com/office/drawing/2014/main" id="{D1631241-63E7-CCA1-C041-9CEE6DF91618}"/>
+                <a16:creationId xmlns:a16="http://schemas.microsoft.com/office/drawing/2014/main" xmlns="" id="{D1631241-63E7-CCA1-C041-9CEE6DF91618}"/>
               </a:ext>
             </a:extLst>
           </p:cNvPr>
@@ -6565,7 +6565,7 @@
     </p:spTree>
     <p:extLst>
       <p:ext uri="{BB962C8B-B14F-4D97-AF65-F5344CB8AC3E}">
-        <p14:creationId xmlns:p14="http://schemas.microsoft.com/office/powerpoint/2010/main" val="3396672449"/>
+        <p14:creationId xmlns:p14="http://schemas.microsoft.com/office/powerpoint/2010/main" xmlns="" val="3396672449"/>
       </p:ext>
     </p:extLst>
   </p:cSld>
@@ -6597,7 +6597,7 @@
           <p:cNvPr id="2" name="标题 1">
             <a:extLst>
               <a:ext uri="{FF2B5EF4-FFF2-40B4-BE49-F238E27FC236}">
-                <a16:creationId xmlns:a16="http://schemas.microsoft.com/office/drawing/2014/main" id="{BCD0B7BF-66C7-8E0C-EE6E-210BC09261AB}"/>
+                <a16:creationId xmlns:a16="http://schemas.microsoft.com/office/drawing/2014/main" xmlns="" id="{BCD0B7BF-66C7-8E0C-EE6E-210BC09261AB}"/>
               </a:ext>
             </a:extLst>
           </p:cNvPr>
@@ -6625,7 +6625,7 @@
           <p:cNvPr id="3" name="内容占位符 2">
             <a:extLst>
               <a:ext uri="{FF2B5EF4-FFF2-40B4-BE49-F238E27FC236}">
-                <a16:creationId xmlns:a16="http://schemas.microsoft.com/office/drawing/2014/main" id="{99BC1E35-F9E7-1295-FBBD-ED8B0075BF59}"/>
+                <a16:creationId xmlns:a16="http://schemas.microsoft.com/office/drawing/2014/main" xmlns="" id="{99BC1E35-F9E7-1295-FBBD-ED8B0075BF59}"/>
               </a:ext>
             </a:extLst>
           </p:cNvPr>
@@ -6642,9 +6642,18 @@
           <a:lstStyle/>
           <a:p>
             <a:r>
-              <a:rPr lang="en-NZ" dirty="0"/>
-              <a:t>Maribeth:</a:t>
-            </a:r>
+              <a:rPr lang="en-NZ" dirty="0" err="1"/>
+              <a:t>Maribeth</a:t>
+            </a:r>
+            <a:r>
+              <a:rPr lang="en-NZ" dirty="0" smtClean="0"/>
+              <a:t>: </a:t>
+            </a:r>
+            <a:r>
+              <a:rPr lang="en-NZ" smtClean="0"/>
+              <a:t>mamamam</a:t>
+            </a:r>
+            <a:endParaRPr lang="en-NZ" dirty="0"/>
           </a:p>
           <a:p>
             <a:endParaRPr lang="en-NZ" dirty="0"/>
@@ -6675,7 +6684,7 @@
     </p:spTree>
     <p:extLst>
       <p:ext uri="{BB962C8B-B14F-4D97-AF65-F5344CB8AC3E}">
-        <p14:creationId xmlns:p14="http://schemas.microsoft.com/office/powerpoint/2010/main" val="358586711"/>
+        <p14:creationId xmlns:p14="http://schemas.microsoft.com/office/powerpoint/2010/main" xmlns="" val="358586711"/>
       </p:ext>
     </p:extLst>
   </p:cSld>
@@ -6707,7 +6716,7 @@
           <p:cNvPr id="2" name="标题 1">
             <a:extLst>
               <a:ext uri="{FF2B5EF4-FFF2-40B4-BE49-F238E27FC236}">
-                <a16:creationId xmlns:a16="http://schemas.microsoft.com/office/drawing/2014/main" id="{7968832C-C89A-B085-ABDF-723E25F15B4E}"/>
+                <a16:creationId xmlns:a16="http://schemas.microsoft.com/office/drawing/2014/main" xmlns="" id="{7968832C-C89A-B085-ABDF-723E25F15B4E}"/>
               </a:ext>
             </a:extLst>
           </p:cNvPr>
@@ -6735,7 +6744,7 @@
           <p:cNvPr id="3" name="内容占位符 2">
             <a:extLst>
               <a:ext uri="{FF2B5EF4-FFF2-40B4-BE49-F238E27FC236}">
-                <a16:creationId xmlns:a16="http://schemas.microsoft.com/office/drawing/2014/main" id="{4029B2BD-2B47-E1CA-0E88-D9FBD2CA4E6C}"/>
+                <a16:creationId xmlns:a16="http://schemas.microsoft.com/office/drawing/2014/main" xmlns="" id="{4029B2BD-2B47-E1CA-0E88-D9FBD2CA4E6C}"/>
               </a:ext>
             </a:extLst>
           </p:cNvPr>
@@ -6758,7 +6767,7 @@
     </p:spTree>
     <p:extLst>
       <p:ext uri="{BB962C8B-B14F-4D97-AF65-F5344CB8AC3E}">
-        <p14:creationId xmlns:p14="http://schemas.microsoft.com/office/powerpoint/2010/main" val="1669517618"/>
+        <p14:creationId xmlns:p14="http://schemas.microsoft.com/office/powerpoint/2010/main" xmlns="" val="1669517618"/>
       </p:ext>
     </p:extLst>
   </p:cSld>
@@ -6790,7 +6799,7 @@
           <p:cNvPr id="2" name="标题 1">
             <a:extLst>
               <a:ext uri="{FF2B5EF4-FFF2-40B4-BE49-F238E27FC236}">
-                <a16:creationId xmlns:a16="http://schemas.microsoft.com/office/drawing/2014/main" id="{931FF632-26A4-A3C5-3BFA-108378087F3B}"/>
+                <a16:creationId xmlns:a16="http://schemas.microsoft.com/office/drawing/2014/main" xmlns="" id="{931FF632-26A4-A3C5-3BFA-108378087F3B}"/>
               </a:ext>
             </a:extLst>
           </p:cNvPr>
@@ -6818,7 +6827,7 @@
           <p:cNvPr id="3" name="内容占位符 2">
             <a:extLst>
               <a:ext uri="{FF2B5EF4-FFF2-40B4-BE49-F238E27FC236}">
-                <a16:creationId xmlns:a16="http://schemas.microsoft.com/office/drawing/2014/main" id="{10C10AB0-F6BB-26E5-C279-0931E8572F2F}"/>
+                <a16:creationId xmlns:a16="http://schemas.microsoft.com/office/drawing/2014/main" xmlns="" id="{10C10AB0-F6BB-26E5-C279-0931E8572F2F}"/>
               </a:ext>
             </a:extLst>
           </p:cNvPr>
@@ -6844,7 +6853,7 @@
     </p:spTree>
     <p:extLst>
       <p:ext uri="{BB962C8B-B14F-4D97-AF65-F5344CB8AC3E}">
-        <p14:creationId xmlns:p14="http://schemas.microsoft.com/office/powerpoint/2010/main" val="1405912245"/>
+        <p14:creationId xmlns:p14="http://schemas.microsoft.com/office/powerpoint/2010/main" xmlns="" val="1405912245"/>
       </p:ext>
     </p:extLst>
   </p:cSld>
@@ -6876,7 +6885,7 @@
           <p:cNvPr id="2" name="标题 1">
             <a:extLst>
               <a:ext uri="{FF2B5EF4-FFF2-40B4-BE49-F238E27FC236}">
-                <a16:creationId xmlns:a16="http://schemas.microsoft.com/office/drawing/2014/main" id="{3B121F95-2659-B777-A490-44CC5DFFC3A1}"/>
+                <a16:creationId xmlns:a16="http://schemas.microsoft.com/office/drawing/2014/main" xmlns="" id="{3B121F95-2659-B777-A490-44CC5DFFC3A1}"/>
               </a:ext>
             </a:extLst>
           </p:cNvPr>
@@ -6904,7 +6913,7 @@
           <p:cNvPr id="3" name="内容占位符 2">
             <a:extLst>
               <a:ext uri="{FF2B5EF4-FFF2-40B4-BE49-F238E27FC236}">
-                <a16:creationId xmlns:a16="http://schemas.microsoft.com/office/drawing/2014/main" id="{7A6FE493-6895-3F84-9D5F-AB2A89BCCCAE}"/>
+                <a16:creationId xmlns:a16="http://schemas.microsoft.com/office/drawing/2014/main" xmlns="" id="{7A6FE493-6895-3F84-9D5F-AB2A89BCCCAE}"/>
               </a:ext>
             </a:extLst>
           </p:cNvPr>
@@ -6983,7 +6992,7 @@
     </p:spTree>
     <p:extLst>
       <p:ext uri="{BB962C8B-B14F-4D97-AF65-F5344CB8AC3E}">
-        <p14:creationId xmlns:p14="http://schemas.microsoft.com/office/powerpoint/2010/main" val="3104536044"/>
+        <p14:creationId xmlns:p14="http://schemas.microsoft.com/office/powerpoint/2010/main" xmlns="" val="3104536044"/>
       </p:ext>
     </p:extLst>
   </p:cSld>
@@ -7015,7 +7024,7 @@
           <p:cNvPr id="2" name="标题 1">
             <a:extLst>
               <a:ext uri="{FF2B5EF4-FFF2-40B4-BE49-F238E27FC236}">
-                <a16:creationId xmlns:a16="http://schemas.microsoft.com/office/drawing/2014/main" id="{92465190-A9B5-15FB-0CC7-52D427954EC8}"/>
+                <a16:creationId xmlns:a16="http://schemas.microsoft.com/office/drawing/2014/main" xmlns="" id="{92465190-A9B5-15FB-0CC7-52D427954EC8}"/>
               </a:ext>
             </a:extLst>
           </p:cNvPr>
@@ -7043,7 +7052,7 @@
           <p:cNvPr id="3" name="内容占位符 2">
             <a:extLst>
               <a:ext uri="{FF2B5EF4-FFF2-40B4-BE49-F238E27FC236}">
-                <a16:creationId xmlns:a16="http://schemas.microsoft.com/office/drawing/2014/main" id="{CAC7A421-7F2F-3B65-83AB-9B04FEA923A7}"/>
+                <a16:creationId xmlns:a16="http://schemas.microsoft.com/office/drawing/2014/main" xmlns="" id="{CAC7A421-7F2F-3B65-83AB-9B04FEA923A7}"/>
               </a:ext>
             </a:extLst>
           </p:cNvPr>
@@ -7098,7 +7107,7 @@
     </p:spTree>
     <p:extLst>
       <p:ext uri="{BB962C8B-B14F-4D97-AF65-F5344CB8AC3E}">
-        <p14:creationId xmlns:p14="http://schemas.microsoft.com/office/powerpoint/2010/main" val="3295134947"/>
+        <p14:creationId xmlns:p14="http://schemas.microsoft.com/office/powerpoint/2010/main" xmlns="" val="3295134947"/>
       </p:ext>
     </p:extLst>
   </p:cSld>
@@ -7130,7 +7139,7 @@
           <p:cNvPr id="2" name="标题 1">
             <a:extLst>
               <a:ext uri="{FF2B5EF4-FFF2-40B4-BE49-F238E27FC236}">
-                <a16:creationId xmlns:a16="http://schemas.microsoft.com/office/drawing/2014/main" id="{FCD0B3A6-F68D-1E92-C281-AEDB26248FFD}"/>
+                <a16:creationId xmlns:a16="http://schemas.microsoft.com/office/drawing/2014/main" xmlns="" id="{FCD0B3A6-F68D-1E92-C281-AEDB26248FFD}"/>
               </a:ext>
             </a:extLst>
           </p:cNvPr>
@@ -7163,7 +7172,7 @@
           <p:cNvPr id="3" name="内容占位符 2">
             <a:extLst>
               <a:ext uri="{FF2B5EF4-FFF2-40B4-BE49-F238E27FC236}">
-                <a16:creationId xmlns:a16="http://schemas.microsoft.com/office/drawing/2014/main" id="{78485416-BC42-8064-E043-36117E18E39D}"/>
+                <a16:creationId xmlns:a16="http://schemas.microsoft.com/office/drawing/2014/main" xmlns="" id="{78485416-BC42-8064-E043-36117E18E39D}"/>
               </a:ext>
             </a:extLst>
           </p:cNvPr>
@@ -7194,7 +7203,7 @@
           <p:cNvPr id="9" name="图片 8">
             <a:extLst>
               <a:ext uri="{FF2B5EF4-FFF2-40B4-BE49-F238E27FC236}">
-                <a16:creationId xmlns:a16="http://schemas.microsoft.com/office/drawing/2014/main" id="{FF651C45-FDCD-6C22-94A4-F7073AFDB5F7}"/>
+                <a16:creationId xmlns:a16="http://schemas.microsoft.com/office/drawing/2014/main" xmlns="" id="{FF651C45-FDCD-6C22-94A4-F7073AFDB5F7}"/>
               </a:ext>
             </a:extLst>
           </p:cNvPr>
@@ -7207,7 +7216,7 @@
           <a:blip r:embed="rId2">
             <a:extLst>
               <a:ext uri="{28A0092B-C50C-407E-A947-70E740481C1C}">
-                <a14:useLocalDpi xmlns:a14="http://schemas.microsoft.com/office/drawing/2010/main" val="0"/>
+                <a14:useLocalDpi xmlns:a14="http://schemas.microsoft.com/office/drawing/2010/main" xmlns="" val="0"/>
               </a:ext>
             </a:extLst>
           </a:blip>
@@ -7228,7 +7237,7 @@
     </p:spTree>
     <p:extLst>
       <p:ext uri="{BB962C8B-B14F-4D97-AF65-F5344CB8AC3E}">
-        <p14:creationId xmlns:p14="http://schemas.microsoft.com/office/powerpoint/2010/main" val="1071497059"/>
+        <p14:creationId xmlns:p14="http://schemas.microsoft.com/office/powerpoint/2010/main" xmlns="" val="1071497059"/>
       </p:ext>
     </p:extLst>
   </p:cSld>
@@ -7260,7 +7269,7 @@
           <p:cNvPr id="2" name="标题 1">
             <a:extLst>
               <a:ext uri="{FF2B5EF4-FFF2-40B4-BE49-F238E27FC236}">
-                <a16:creationId xmlns:a16="http://schemas.microsoft.com/office/drawing/2014/main" id="{FCD0B3A6-F68D-1E92-C281-AEDB26248FFD}"/>
+                <a16:creationId xmlns:a16="http://schemas.microsoft.com/office/drawing/2014/main" xmlns="" id="{FCD0B3A6-F68D-1E92-C281-AEDB26248FFD}"/>
               </a:ext>
             </a:extLst>
           </p:cNvPr>
@@ -7293,7 +7302,7 @@
           <p:cNvPr id="3" name="内容占位符 2">
             <a:extLst>
               <a:ext uri="{FF2B5EF4-FFF2-40B4-BE49-F238E27FC236}">
-                <a16:creationId xmlns:a16="http://schemas.microsoft.com/office/drawing/2014/main" id="{78485416-BC42-8064-E043-36117E18E39D}"/>
+                <a16:creationId xmlns:a16="http://schemas.microsoft.com/office/drawing/2014/main" xmlns="" id="{78485416-BC42-8064-E043-36117E18E39D}"/>
               </a:ext>
             </a:extLst>
           </p:cNvPr>
@@ -7324,7 +7333,7 @@
           <p:cNvPr id="11" name="图片 10">
             <a:extLst>
               <a:ext uri="{FF2B5EF4-FFF2-40B4-BE49-F238E27FC236}">
-                <a16:creationId xmlns:a16="http://schemas.microsoft.com/office/drawing/2014/main" id="{9773E204-33CE-964E-0098-1E0F62D66402}"/>
+                <a16:creationId xmlns:a16="http://schemas.microsoft.com/office/drawing/2014/main" xmlns="" id="{9773E204-33CE-964E-0098-1E0F62D66402}"/>
               </a:ext>
             </a:extLst>
           </p:cNvPr>
@@ -7337,7 +7346,7 @@
           <a:blip r:embed="rId2">
             <a:extLst>
               <a:ext uri="{28A0092B-C50C-407E-A947-70E740481C1C}">
-                <a14:useLocalDpi xmlns:a14="http://schemas.microsoft.com/office/drawing/2010/main" val="0"/>
+                <a14:useLocalDpi xmlns:a14="http://schemas.microsoft.com/office/drawing/2010/main" xmlns="" val="0"/>
               </a:ext>
             </a:extLst>
           </a:blip>
@@ -7358,7 +7367,7 @@
     </p:spTree>
     <p:extLst>
       <p:ext uri="{BB962C8B-B14F-4D97-AF65-F5344CB8AC3E}">
-        <p14:creationId xmlns:p14="http://schemas.microsoft.com/office/powerpoint/2010/main" val="2552742250"/>
+        <p14:creationId xmlns:p14="http://schemas.microsoft.com/office/powerpoint/2010/main" xmlns="" val="2552742250"/>
       </p:ext>
     </p:extLst>
   </p:cSld>
@@ -7390,7 +7399,7 @@
           <p:cNvPr id="2" name="标题 1">
             <a:extLst>
               <a:ext uri="{FF2B5EF4-FFF2-40B4-BE49-F238E27FC236}">
-                <a16:creationId xmlns:a16="http://schemas.microsoft.com/office/drawing/2014/main" id="{1C26FFD8-8C79-58A2-F8D7-E748D28C4407}"/>
+                <a16:creationId xmlns:a16="http://schemas.microsoft.com/office/drawing/2014/main" xmlns="" id="{1C26FFD8-8C79-58A2-F8D7-E748D28C4407}"/>
               </a:ext>
             </a:extLst>
           </p:cNvPr>
@@ -7420,7 +7429,7 @@
           <p:cNvPr id="3" name="内容占位符 2">
             <a:extLst>
               <a:ext uri="{FF2B5EF4-FFF2-40B4-BE49-F238E27FC236}">
-                <a16:creationId xmlns:a16="http://schemas.microsoft.com/office/drawing/2014/main" id="{41F1D2A7-5294-7557-9EB3-8D491A63F4EB}"/>
+                <a16:creationId xmlns:a16="http://schemas.microsoft.com/office/drawing/2014/main" xmlns="" id="{41F1D2A7-5294-7557-9EB3-8D491A63F4EB}"/>
               </a:ext>
             </a:extLst>
           </p:cNvPr>
@@ -7455,7 +7464,7 @@
           <p:cNvPr id="4" name="内容占位符 2">
             <a:extLst>
               <a:ext uri="{FF2B5EF4-FFF2-40B4-BE49-F238E27FC236}">
-                <a16:creationId xmlns:a16="http://schemas.microsoft.com/office/drawing/2014/main" id="{4FF7128B-6B50-FCD4-9C75-80B7963E49CE}"/>
+                <a16:creationId xmlns:a16="http://schemas.microsoft.com/office/drawing/2014/main" xmlns="" id="{4FF7128B-6B50-FCD4-9C75-80B7963E49CE}"/>
               </a:ext>
             </a:extLst>
           </p:cNvPr>
@@ -7654,7 +7663,7 @@
           <p:cNvPr id="6" name="内容占位符 2">
             <a:extLst>
               <a:ext uri="{FF2B5EF4-FFF2-40B4-BE49-F238E27FC236}">
-                <a16:creationId xmlns:a16="http://schemas.microsoft.com/office/drawing/2014/main" id="{F12022C7-B80B-2281-9B7A-0C3246F09551}"/>
+                <a16:creationId xmlns:a16="http://schemas.microsoft.com/office/drawing/2014/main" xmlns="" id="{F12022C7-B80B-2281-9B7A-0C3246F09551}"/>
               </a:ext>
             </a:extLst>
           </p:cNvPr>
@@ -7862,7 +7871,7 @@
           <p:cNvPr id="8" name="内容占位符 2">
             <a:extLst>
               <a:ext uri="{FF2B5EF4-FFF2-40B4-BE49-F238E27FC236}">
-                <a16:creationId xmlns:a16="http://schemas.microsoft.com/office/drawing/2014/main" id="{764F7FE3-0392-CCF7-AAD7-C83EF28C73C9}"/>
+                <a16:creationId xmlns:a16="http://schemas.microsoft.com/office/drawing/2014/main" xmlns="" id="{764F7FE3-0392-CCF7-AAD7-C83EF28C73C9}"/>
               </a:ext>
             </a:extLst>
           </p:cNvPr>
@@ -8059,7 +8068,7 @@
     </p:spTree>
     <p:extLst>
       <p:ext uri="{BB962C8B-B14F-4D97-AF65-F5344CB8AC3E}">
-        <p14:creationId xmlns:p14="http://schemas.microsoft.com/office/powerpoint/2010/main" val="244496848"/>
+        <p14:creationId xmlns:p14="http://schemas.microsoft.com/office/powerpoint/2010/main" xmlns="" val="244496848"/>
       </p:ext>
     </p:extLst>
   </p:cSld>
@@ -8091,7 +8100,7 @@
           <p:cNvPr id="7" name="标题 6">
             <a:extLst>
               <a:ext uri="{FF2B5EF4-FFF2-40B4-BE49-F238E27FC236}">
-                <a16:creationId xmlns:a16="http://schemas.microsoft.com/office/drawing/2014/main" id="{CD83F32C-8A6B-5F30-3947-35CFC8F07AD6}"/>
+                <a16:creationId xmlns:a16="http://schemas.microsoft.com/office/drawing/2014/main" xmlns="" id="{CD83F32C-8A6B-5F30-3947-35CFC8F07AD6}"/>
               </a:ext>
             </a:extLst>
           </p:cNvPr>
@@ -8126,7 +8135,7 @@
           <p:cNvPr id="5" name="内容占位符 4">
             <a:extLst>
               <a:ext uri="{FF2B5EF4-FFF2-40B4-BE49-F238E27FC236}">
-                <a16:creationId xmlns:a16="http://schemas.microsoft.com/office/drawing/2014/main" id="{A72F22B4-E4AA-DED2-4FE8-84589D8E0072}"/>
+                <a16:creationId xmlns:a16="http://schemas.microsoft.com/office/drawing/2014/main" xmlns="" id="{A72F22B4-E4AA-DED2-4FE8-84589D8E0072}"/>
               </a:ext>
             </a:extLst>
           </p:cNvPr>
@@ -8141,7 +8150,7 @@
           <a:blip r:embed="rId2">
             <a:extLst>
               <a:ext uri="{28A0092B-C50C-407E-A947-70E740481C1C}">
-                <a14:useLocalDpi xmlns:a14="http://schemas.microsoft.com/office/drawing/2010/main" val="0"/>
+                <a14:useLocalDpi xmlns:a14="http://schemas.microsoft.com/office/drawing/2010/main" xmlns="" val="0"/>
               </a:ext>
             </a:extLst>
           </a:blip>
@@ -8161,7 +8170,7 @@
           <p:cNvPr id="8" name="文本框 7">
             <a:extLst>
               <a:ext uri="{FF2B5EF4-FFF2-40B4-BE49-F238E27FC236}">
-                <a16:creationId xmlns:a16="http://schemas.microsoft.com/office/drawing/2014/main" id="{848B05F5-64E6-7B36-6AD3-7E4F7830C95F}"/>
+                <a16:creationId xmlns:a16="http://schemas.microsoft.com/office/drawing/2014/main" xmlns="" id="{848B05F5-64E6-7B36-6AD3-7E4F7830C95F}"/>
               </a:ext>
             </a:extLst>
           </p:cNvPr>
@@ -8213,7 +8222,7 @@
     </p:spTree>
     <p:extLst>
       <p:ext uri="{BB962C8B-B14F-4D97-AF65-F5344CB8AC3E}">
-        <p14:creationId xmlns:p14="http://schemas.microsoft.com/office/powerpoint/2010/main" val="4200007885"/>
+        <p14:creationId xmlns:p14="http://schemas.microsoft.com/office/powerpoint/2010/main" xmlns="" val="4200007885"/>
       </p:ext>
     </p:extLst>
   </p:cSld>
@@ -8245,7 +8254,7 @@
           <p:cNvPr id="2" name="标题 1">
             <a:extLst>
               <a:ext uri="{FF2B5EF4-FFF2-40B4-BE49-F238E27FC236}">
-                <a16:creationId xmlns:a16="http://schemas.microsoft.com/office/drawing/2014/main" id="{B3F13335-104A-015E-3032-EACBD2BEBA00}"/>
+                <a16:creationId xmlns:a16="http://schemas.microsoft.com/office/drawing/2014/main" xmlns="" id="{B3F13335-104A-015E-3032-EACBD2BEBA00}"/>
               </a:ext>
             </a:extLst>
           </p:cNvPr>
@@ -8273,7 +8282,7 @@
           <p:cNvPr id="5" name="内容占位符 4">
             <a:extLst>
               <a:ext uri="{FF2B5EF4-FFF2-40B4-BE49-F238E27FC236}">
-                <a16:creationId xmlns:a16="http://schemas.microsoft.com/office/drawing/2014/main" id="{37CA7186-F461-8768-6AB0-EDB502334978}"/>
+                <a16:creationId xmlns:a16="http://schemas.microsoft.com/office/drawing/2014/main" xmlns="" id="{37CA7186-F461-8768-6AB0-EDB502334978}"/>
               </a:ext>
             </a:extLst>
           </p:cNvPr>
@@ -8288,7 +8297,7 @@
           <a:blip r:embed="rId2" cstate="print">
             <a:extLst>
               <a:ext uri="{28A0092B-C50C-407E-A947-70E740481C1C}">
-                <a14:useLocalDpi xmlns:a14="http://schemas.microsoft.com/office/drawing/2010/main" val="0"/>
+                <a14:useLocalDpi xmlns:a14="http://schemas.microsoft.com/office/drawing/2010/main" xmlns="" val="0"/>
               </a:ext>
             </a:extLst>
           </a:blip>
@@ -8308,7 +8317,7 @@
           <p:cNvPr id="6" name="标题 1">
             <a:extLst>
               <a:ext uri="{FF2B5EF4-FFF2-40B4-BE49-F238E27FC236}">
-                <a16:creationId xmlns:a16="http://schemas.microsoft.com/office/drawing/2014/main" id="{C81291C8-DC21-C98A-E80F-705776E3EB74}"/>
+                <a16:creationId xmlns:a16="http://schemas.microsoft.com/office/drawing/2014/main" xmlns="" id="{C81291C8-DC21-C98A-E80F-705776E3EB74}"/>
               </a:ext>
             </a:extLst>
           </p:cNvPr>
@@ -8383,7 +8392,7 @@
           <p:cNvPr id="7" name="文本框 6">
             <a:extLst>
               <a:ext uri="{FF2B5EF4-FFF2-40B4-BE49-F238E27FC236}">
-                <a16:creationId xmlns:a16="http://schemas.microsoft.com/office/drawing/2014/main" id="{5A115FD7-B5F6-D919-5860-BD9C52F64019}"/>
+                <a16:creationId xmlns:a16="http://schemas.microsoft.com/office/drawing/2014/main" xmlns="" id="{5A115FD7-B5F6-D919-5860-BD9C52F64019}"/>
               </a:ext>
             </a:extLst>
           </p:cNvPr>
@@ -8438,7 +8447,7 @@
     </p:spTree>
     <p:extLst>
       <p:ext uri="{BB962C8B-B14F-4D97-AF65-F5344CB8AC3E}">
-        <p14:creationId xmlns:p14="http://schemas.microsoft.com/office/powerpoint/2010/main" val="1039722178"/>
+        <p14:creationId xmlns:p14="http://schemas.microsoft.com/office/powerpoint/2010/main" xmlns="" val="1039722178"/>
       </p:ext>
     </p:extLst>
   </p:cSld>
@@ -8470,7 +8479,7 @@
           <p:cNvPr id="2" name="标题 1">
             <a:extLst>
               <a:ext uri="{FF2B5EF4-FFF2-40B4-BE49-F238E27FC236}">
-                <a16:creationId xmlns:a16="http://schemas.microsoft.com/office/drawing/2014/main" id="{03477B6E-72BF-255C-BEB8-DAC7203DD43E}"/>
+                <a16:creationId xmlns:a16="http://schemas.microsoft.com/office/drawing/2014/main" xmlns="" id="{03477B6E-72BF-255C-BEB8-DAC7203DD43E}"/>
               </a:ext>
             </a:extLst>
           </p:cNvPr>
@@ -8498,7 +8507,7 @@
           <p:cNvPr id="3" name="内容占位符 2">
             <a:extLst>
               <a:ext uri="{FF2B5EF4-FFF2-40B4-BE49-F238E27FC236}">
-                <a16:creationId xmlns:a16="http://schemas.microsoft.com/office/drawing/2014/main" id="{B5BDCBB6-C660-4E0C-04B9-8784DABF995E}"/>
+                <a16:creationId xmlns:a16="http://schemas.microsoft.com/office/drawing/2014/main" xmlns="" id="{B5BDCBB6-C660-4E0C-04B9-8784DABF995E}"/>
               </a:ext>
             </a:extLst>
           </p:cNvPr>
@@ -8576,7 +8585,7 @@
     </p:spTree>
     <p:extLst>
       <p:ext uri="{BB962C8B-B14F-4D97-AF65-F5344CB8AC3E}">
-        <p14:creationId xmlns:p14="http://schemas.microsoft.com/office/powerpoint/2010/main" val="1522651155"/>
+        <p14:creationId xmlns:p14="http://schemas.microsoft.com/office/powerpoint/2010/main" xmlns="" val="1522651155"/>
       </p:ext>
     </p:extLst>
   </p:cSld>
@@ -8850,7 +8859,7 @@
   <a:extraClrSchemeLst/>
   <a:extLst>
     <a:ext uri="{05A4C25C-085E-4340-85A3-A5531E510DB2}">
-      <thm15:themeFamily xmlns:thm15="http://schemas.microsoft.com/office/thememl/2012/main" name="Vapor Trail" id="{4FDF2955-7D9C-493C-B9F9-C205151B46CD}" vid="{8F31A783-2159-4870-BC29-2BA7D038EA44}"/>
+      <thm15:themeFamily xmlns:thm15="http://schemas.microsoft.com/office/thememl/2012/main" xmlns="" name="Vapor Trail" id="{4FDF2955-7D9C-493C-B9F9-C205151B46CD}" vid="{8F31A783-2159-4870-BC29-2BA7D038EA44}"/>
     </a:ext>
   </a:extLst>
 </a:theme>

</xml_diff>